<commit_message>
Updated Word and PowerPoint
</commit_message>
<xml_diff>
--- a/SUPER RESOLUTION A SPATIAL SUBPIXEL INTERPOLATION TECHNIQUE_sprint_1.pptx
+++ b/SUPER RESOLUTION A SPATIAL SUBPIXEL INTERPOLATION TECHNIQUE_sprint_1.pptx
@@ -12,11 +12,12 @@
     <p:sldId id="274" r:id="rId6"/>
     <p:sldId id="259" r:id="rId7"/>
     <p:sldId id="276" r:id="rId8"/>
-    <p:sldId id="268" r:id="rId9"/>
-    <p:sldId id="272" r:id="rId10"/>
-    <p:sldId id="270" r:id="rId11"/>
-    <p:sldId id="273" r:id="rId12"/>
-    <p:sldId id="271" r:id="rId13"/>
+    <p:sldId id="277" r:id="rId9"/>
+    <p:sldId id="268" r:id="rId10"/>
+    <p:sldId id="272" r:id="rId11"/>
+    <p:sldId id="270" r:id="rId12"/>
+    <p:sldId id="273" r:id="rId13"/>
+    <p:sldId id="271" r:id="rId14"/>
   </p:sldIdLst>
   <p:sldSz cx="12192000" cy="6858000"/>
   <p:notesSz cx="6858000" cy="9144000"/>
@@ -901,28 +902,28 @@
         <a:p>
           <a:pPr algn="ctr"/>
           <a:r>
-            <a:rPr lang="ro-RO" sz="2800" dirty="0" smtClean="0"/>
+            <a:rPr lang="ro-RO" sz="2800" dirty="0"/>
             <a:t>Sprint 1</a:t>
           </a:r>
         </a:p>
         <a:p>
           <a:pPr algn="l"/>
           <a:r>
-            <a:rPr lang="ro-RO" sz="1100" dirty="0" smtClean="0"/>
+            <a:rPr lang="ro-RO" sz="1100" dirty="0"/>
             <a:t>- Identificarea problemei</a:t>
           </a:r>
         </a:p>
         <a:p>
           <a:pPr algn="l"/>
           <a:r>
-            <a:rPr lang="ro-RO" sz="1100" dirty="0" smtClean="0"/>
+            <a:rPr lang="ro-RO" sz="1100" dirty="0"/>
             <a:t>- Soluția propusă</a:t>
           </a:r>
         </a:p>
         <a:p>
           <a:pPr algn="l"/>
           <a:r>
-            <a:rPr lang="ro-RO" sz="1100" dirty="0" smtClean="0"/>
+            <a:rPr lang="ro-RO" sz="1100" dirty="0"/>
             <a:t>- Analiza de fezabilitate</a:t>
           </a:r>
           <a:endParaRPr lang="en-US" sz="1100" dirty="0"/>
@@ -960,21 +961,21 @@
         <a:p>
           <a:pPr algn="ctr"/>
           <a:r>
-            <a:rPr lang="ro-RO" sz="2800" dirty="0" smtClean="0"/>
+            <a:rPr lang="ro-RO" sz="2800" dirty="0"/>
             <a:t>Sprint 2</a:t>
           </a:r>
         </a:p>
         <a:p>
           <a:pPr algn="l"/>
           <a:r>
-            <a:rPr lang="ro-RO" sz="1100" dirty="0" smtClean="0"/>
+            <a:rPr lang="ro-RO" sz="1100" dirty="0"/>
             <a:t>- Implementare MVP</a:t>
           </a:r>
         </a:p>
         <a:p>
           <a:pPr algn="l"/>
           <a:r>
-            <a:rPr lang="ro-RO" sz="1100" dirty="0" smtClean="0"/>
+            <a:rPr lang="ro-RO" sz="1100" dirty="0"/>
             <a:t>- Documentatie</a:t>
           </a:r>
         </a:p>
@@ -1011,21 +1012,21 @@
         <a:p>
           <a:pPr algn="ctr"/>
           <a:r>
-            <a:rPr lang="ro-RO" sz="2800" dirty="0" smtClean="0"/>
+            <a:rPr lang="ro-RO" sz="2800" dirty="0"/>
             <a:t>Sprint 4</a:t>
           </a:r>
         </a:p>
         <a:p>
           <a:pPr algn="l"/>
           <a:r>
-            <a:rPr lang="ro-RO" sz="1100" dirty="0" smtClean="0"/>
+            <a:rPr lang="ro-RO" sz="1100" dirty="0"/>
             <a:t>- Raport final</a:t>
           </a:r>
         </a:p>
         <a:p>
           <a:pPr algn="l"/>
           <a:r>
-            <a:rPr lang="ro-RO" sz="1100" dirty="0" smtClean="0"/>
+            <a:rPr lang="ro-RO" sz="1100" dirty="0"/>
             <a:t>- Articol revistă</a:t>
           </a:r>
           <a:endParaRPr lang="en-US" sz="1100" dirty="0"/>
@@ -1063,21 +1064,21 @@
         <a:p>
           <a:pPr algn="ctr"/>
           <a:r>
-            <a:rPr lang="ro-RO" sz="2800" dirty="0" smtClean="0"/>
+            <a:rPr lang="ro-RO" sz="2800" dirty="0"/>
             <a:t>Sprint 3</a:t>
           </a:r>
         </a:p>
         <a:p>
           <a:pPr algn="l"/>
           <a:r>
-            <a:rPr lang="ro-RO" sz="1100" dirty="0" smtClean="0"/>
+            <a:rPr lang="ro-RO" sz="1100" dirty="0"/>
             <a:t>- Optimizări/Beyond state of the art</a:t>
           </a:r>
         </a:p>
         <a:p>
           <a:pPr algn="l"/>
           <a:r>
-            <a:rPr lang="ro-RO" sz="1100" dirty="0" smtClean="0"/>
+            <a:rPr lang="ro-RO" sz="1100" dirty="0"/>
             <a:t>- Validarea rezultatelor obținute</a:t>
           </a:r>
           <a:endParaRPr lang="en-US" sz="1100" dirty="0"/>
@@ -1134,13 +1135,6 @@
         </dgm:presLayoutVars>
       </dgm:prSet>
       <dgm:spPr/>
-      <dgm:t>
-        <a:bodyPr/>
-        <a:lstStyle/>
-        <a:p>
-          <a:endParaRPr lang="en-US"/>
-        </a:p>
-      </dgm:t>
     </dgm:pt>
     <dgm:pt modelId="{80BCABE4-00EE-4FC3-848A-2356D404F8EE}" type="pres">
       <dgm:prSet presAssocID="{B093EBB4-CA57-4FC7-87F8-1B4942BD5DB3}" presName="circleA" presStyleLbl="node1" presStyleIdx="0" presStyleCnt="4"/>
@@ -1165,13 +1159,6 @@
         </dgm:presLayoutVars>
       </dgm:prSet>
       <dgm:spPr/>
-      <dgm:t>
-        <a:bodyPr/>
-        <a:lstStyle/>
-        <a:p>
-          <a:endParaRPr lang="en-US"/>
-        </a:p>
-      </dgm:t>
     </dgm:pt>
     <dgm:pt modelId="{CA7A90CA-427C-4833-80B2-AEBA5B559F35}" type="pres">
       <dgm:prSet presAssocID="{D207576D-F1AE-44B3-B41E-2EB34C4B9A4D}" presName="circleB" presStyleLbl="node1" presStyleIdx="1" presStyleCnt="4"/>
@@ -1196,13 +1183,6 @@
         </dgm:presLayoutVars>
       </dgm:prSet>
       <dgm:spPr/>
-      <dgm:t>
-        <a:bodyPr/>
-        <a:lstStyle/>
-        <a:p>
-          <a:endParaRPr lang="en-US"/>
-        </a:p>
-      </dgm:t>
     </dgm:pt>
     <dgm:pt modelId="{18C672A2-44A7-4897-AACB-572B0EA3B11F}" type="pres">
       <dgm:prSet presAssocID="{E5E0756C-C5A7-4B1E-8D75-700A7056605D}" presName="circleA" presStyleLbl="node1" presStyleIdx="2" presStyleCnt="4"/>
@@ -1227,13 +1207,6 @@
         </dgm:presLayoutVars>
       </dgm:prSet>
       <dgm:spPr/>
-      <dgm:t>
-        <a:bodyPr/>
-        <a:lstStyle/>
-        <a:p>
-          <a:endParaRPr lang="en-US"/>
-        </a:p>
-      </dgm:t>
     </dgm:pt>
     <dgm:pt modelId="{9626F961-E3D9-4D0D-AFC6-44C91624FF7B}" type="pres">
       <dgm:prSet presAssocID="{C84B7B7F-950E-4EC4-9205-A1C2934E2BC7}" presName="circleB" presStyleLbl="node1" presStyleIdx="3" presStyleCnt="4"/>
@@ -1245,14 +1218,14 @@
     </dgm:pt>
   </dgm:ptLst>
   <dgm:cxnLst>
-    <dgm:cxn modelId="{DE0E9ADF-5DE0-43CA-B275-46A5B9D91C28}" srcId="{02E4B288-630F-4BED-B8E5-518E334E0987}" destId="{D207576D-F1AE-44B3-B41E-2EB34C4B9A4D}" srcOrd="1" destOrd="0" parTransId="{52AFC437-E2A7-4B7F-A2F4-F1A2652BCA7F}" sibTransId="{EA385F1D-D6B1-4227-BB6E-1D13BC1227DD}"/>
+    <dgm:cxn modelId="{A2C53E02-11EC-4C7B-BA55-D4C519C6627C}" type="presOf" srcId="{B093EBB4-CA57-4FC7-87F8-1B4942BD5DB3}" destId="{AF890D11-33E8-43AC-BA34-484E088B95EF}" srcOrd="0" destOrd="0" presId="urn:microsoft.com/office/officeart/2005/8/layout/hProcess11"/>
     <dgm:cxn modelId="{A3694C5F-135B-41F2-B71F-94286ACF5EAF}" srcId="{02E4B288-630F-4BED-B8E5-518E334E0987}" destId="{C84B7B7F-950E-4EC4-9205-A1C2934E2BC7}" srcOrd="3" destOrd="0" parTransId="{26CEB5C0-9BBD-4447-83FE-96E2DAEBE0AC}" sibTransId="{857F7C61-3153-4642-972D-FBAB543B762C}"/>
     <dgm:cxn modelId="{64068667-281C-4730-A0D3-63F8CBE1A61C}" type="presOf" srcId="{C84B7B7F-950E-4EC4-9205-A1C2934E2BC7}" destId="{959B68E8-4C2E-4FB3-9564-0567A877267F}" srcOrd="0" destOrd="0" presId="urn:microsoft.com/office/officeart/2005/8/layout/hProcess11"/>
+    <dgm:cxn modelId="{E23F1950-6D10-4BB2-86D7-823D1946E8D1}" srcId="{02E4B288-630F-4BED-B8E5-518E334E0987}" destId="{E5E0756C-C5A7-4B1E-8D75-700A7056605D}" srcOrd="2" destOrd="0" parTransId="{EDE22949-C4F0-4EFD-BFDF-E8BEA44913C0}" sibTransId="{36D277AF-874B-4674-A74A-1C19AD810C9D}"/>
+    <dgm:cxn modelId="{55FDA48E-3384-4316-9BB0-9E092CF6EBBA}" type="presOf" srcId="{E5E0756C-C5A7-4B1E-8D75-700A7056605D}" destId="{81A495E0-7E59-411B-8238-01C780AD2D62}" srcOrd="0" destOrd="0" presId="urn:microsoft.com/office/officeart/2005/8/layout/hProcess11"/>
     <dgm:cxn modelId="{03C508CE-0F8C-4EC6-A5D4-7DB731A563F6}" type="presOf" srcId="{D207576D-F1AE-44B3-B41E-2EB34C4B9A4D}" destId="{73B07B9A-B89A-4B87-901D-3820998D087F}" srcOrd="0" destOrd="0" presId="urn:microsoft.com/office/officeart/2005/8/layout/hProcess11"/>
-    <dgm:cxn modelId="{A2C53E02-11EC-4C7B-BA55-D4C519C6627C}" type="presOf" srcId="{B093EBB4-CA57-4FC7-87F8-1B4942BD5DB3}" destId="{AF890D11-33E8-43AC-BA34-484E088B95EF}" srcOrd="0" destOrd="0" presId="urn:microsoft.com/office/officeart/2005/8/layout/hProcess11"/>
+    <dgm:cxn modelId="{DE0E9ADF-5DE0-43CA-B275-46A5B9D91C28}" srcId="{02E4B288-630F-4BED-B8E5-518E334E0987}" destId="{D207576D-F1AE-44B3-B41E-2EB34C4B9A4D}" srcOrd="1" destOrd="0" parTransId="{52AFC437-E2A7-4B7F-A2F4-F1A2652BCA7F}" sibTransId="{EA385F1D-D6B1-4227-BB6E-1D13BC1227DD}"/>
     <dgm:cxn modelId="{95DB4BE0-4F88-49C5-8226-D59F9390523D}" type="presOf" srcId="{02E4B288-630F-4BED-B8E5-518E334E0987}" destId="{295D31C4-C824-4ABD-820F-2371100D26A3}" srcOrd="0" destOrd="0" presId="urn:microsoft.com/office/officeart/2005/8/layout/hProcess11"/>
-    <dgm:cxn modelId="{55FDA48E-3384-4316-9BB0-9E092CF6EBBA}" type="presOf" srcId="{E5E0756C-C5A7-4B1E-8D75-700A7056605D}" destId="{81A495E0-7E59-411B-8238-01C780AD2D62}" srcOrd="0" destOrd="0" presId="urn:microsoft.com/office/officeart/2005/8/layout/hProcess11"/>
-    <dgm:cxn modelId="{E23F1950-6D10-4BB2-86D7-823D1946E8D1}" srcId="{02E4B288-630F-4BED-B8E5-518E334E0987}" destId="{E5E0756C-C5A7-4B1E-8D75-700A7056605D}" srcOrd="2" destOrd="0" parTransId="{EDE22949-C4F0-4EFD-BFDF-E8BEA44913C0}" sibTransId="{36D277AF-874B-4674-A74A-1C19AD810C9D}"/>
     <dgm:cxn modelId="{1F06AAF6-6F87-4C4B-8813-01F7F99BEFF4}" srcId="{02E4B288-630F-4BED-B8E5-518E334E0987}" destId="{B093EBB4-CA57-4FC7-87F8-1B4942BD5DB3}" srcOrd="0" destOrd="0" parTransId="{15CA1CA6-6A8D-47EA-B081-2BB52A6C4D31}" sibTransId="{C4049946-14CA-42FC-9B41-C7F59EE339F4}"/>
     <dgm:cxn modelId="{A6232A5F-6555-495B-A9CB-F53B1F17613B}" type="presParOf" srcId="{295D31C4-C824-4ABD-820F-2371100D26A3}" destId="{C43680D1-882F-4F7D-8AAC-EBC503F990DF}" srcOrd="0" destOrd="0" presId="urn:microsoft.com/office/officeart/2005/8/layout/hProcess11"/>
     <dgm:cxn modelId="{7210B01B-1C47-4DE3-BEC1-1EE4C8A30005}" type="presParOf" srcId="{295D31C4-C824-4ABD-820F-2371100D26A3}" destId="{8E22B78D-23C6-4A0B-8E14-8B5BA83885E3}" srcOrd="1" destOrd="0" presId="urn:microsoft.com/office/officeart/2005/8/layout/hProcess11"/>
@@ -1391,7 +1364,7 @@
         </a:bodyPr>
         <a:lstStyle/>
         <a:p>
-          <a:pPr lvl="0" algn="ctr" defTabSz="1244600">
+          <a:pPr marL="0" lvl="0" indent="0" algn="ctr" defTabSz="1244600">
             <a:lnSpc>
               <a:spcPct val="90000"/>
             </a:lnSpc>
@@ -1401,14 +1374,15 @@
             <a:spcAft>
               <a:spcPct val="35000"/>
             </a:spcAft>
+            <a:buNone/>
           </a:pPr>
           <a:r>
-            <a:rPr lang="ro-RO" sz="2800" kern="1200" dirty="0" smtClean="0"/>
+            <a:rPr lang="ro-RO" sz="2800" kern="1200" dirty="0"/>
             <a:t>Sprint 1</a:t>
           </a:r>
         </a:p>
         <a:p>
-          <a:pPr lvl="0" algn="l" defTabSz="1244600">
+          <a:pPr marL="0" lvl="0" indent="0" algn="l" defTabSz="1244600">
             <a:lnSpc>
               <a:spcPct val="90000"/>
             </a:lnSpc>
@@ -1418,14 +1392,15 @@
             <a:spcAft>
               <a:spcPct val="35000"/>
             </a:spcAft>
+            <a:buNone/>
           </a:pPr>
           <a:r>
-            <a:rPr lang="ro-RO" sz="1100" kern="1200" dirty="0" smtClean="0"/>
+            <a:rPr lang="ro-RO" sz="1100" kern="1200" dirty="0"/>
             <a:t>- Identificarea problemei</a:t>
           </a:r>
         </a:p>
         <a:p>
-          <a:pPr lvl="0" algn="l" defTabSz="1244600">
+          <a:pPr marL="0" lvl="0" indent="0" algn="l" defTabSz="1244600">
             <a:lnSpc>
               <a:spcPct val="90000"/>
             </a:lnSpc>
@@ -1435,14 +1410,15 @@
             <a:spcAft>
               <a:spcPct val="35000"/>
             </a:spcAft>
+            <a:buNone/>
           </a:pPr>
           <a:r>
-            <a:rPr lang="ro-RO" sz="1100" kern="1200" dirty="0" smtClean="0"/>
+            <a:rPr lang="ro-RO" sz="1100" kern="1200" dirty="0"/>
             <a:t>- Soluția propusă</a:t>
           </a:r>
         </a:p>
         <a:p>
-          <a:pPr lvl="0" algn="l" defTabSz="1244600">
+          <a:pPr marL="0" lvl="0" indent="0" algn="l" defTabSz="1244600">
             <a:lnSpc>
               <a:spcPct val="90000"/>
             </a:lnSpc>
@@ -1452,9 +1428,10 @@
             <a:spcAft>
               <a:spcPct val="35000"/>
             </a:spcAft>
+            <a:buNone/>
           </a:pPr>
           <a:r>
-            <a:rPr lang="ro-RO" sz="1100" kern="1200" dirty="0" smtClean="0"/>
+            <a:rPr lang="ro-RO" sz="1100" kern="1200" dirty="0"/>
             <a:t>- Analiza de fezabilitate</a:t>
           </a:r>
           <a:endParaRPr lang="en-US" sz="1100" kern="1200" dirty="0"/>
@@ -1551,7 +1528,7 @@
         </a:bodyPr>
         <a:lstStyle/>
         <a:p>
-          <a:pPr lvl="0" algn="ctr" defTabSz="1244600">
+          <a:pPr marL="0" lvl="0" indent="0" algn="ctr" defTabSz="1244600">
             <a:lnSpc>
               <a:spcPct val="90000"/>
             </a:lnSpc>
@@ -1561,14 +1538,15 @@
             <a:spcAft>
               <a:spcPct val="35000"/>
             </a:spcAft>
+            <a:buNone/>
           </a:pPr>
           <a:r>
-            <a:rPr lang="ro-RO" sz="2800" kern="1200" dirty="0" smtClean="0"/>
+            <a:rPr lang="ro-RO" sz="2800" kern="1200" dirty="0"/>
             <a:t>Sprint 2</a:t>
           </a:r>
         </a:p>
         <a:p>
-          <a:pPr lvl="0" algn="l" defTabSz="1244600">
+          <a:pPr marL="0" lvl="0" indent="0" algn="l" defTabSz="1244600">
             <a:lnSpc>
               <a:spcPct val="90000"/>
             </a:lnSpc>
@@ -1578,14 +1556,15 @@
             <a:spcAft>
               <a:spcPct val="35000"/>
             </a:spcAft>
+            <a:buNone/>
           </a:pPr>
           <a:r>
-            <a:rPr lang="ro-RO" sz="1100" kern="1200" dirty="0" smtClean="0"/>
+            <a:rPr lang="ro-RO" sz="1100" kern="1200" dirty="0"/>
             <a:t>- Implementare MVP</a:t>
           </a:r>
         </a:p>
         <a:p>
-          <a:pPr lvl="0" algn="l" defTabSz="1244600">
+          <a:pPr marL="0" lvl="0" indent="0" algn="l" defTabSz="1244600">
             <a:lnSpc>
               <a:spcPct val="90000"/>
             </a:lnSpc>
@@ -1595,9 +1574,10 @@
             <a:spcAft>
               <a:spcPct val="35000"/>
             </a:spcAft>
+            <a:buNone/>
           </a:pPr>
           <a:r>
-            <a:rPr lang="ro-RO" sz="1100" kern="1200" dirty="0" smtClean="0"/>
+            <a:rPr lang="ro-RO" sz="1100" kern="1200" dirty="0"/>
             <a:t>- Documentatie</a:t>
           </a:r>
         </a:p>
@@ -1693,7 +1673,7 @@
         </a:bodyPr>
         <a:lstStyle/>
         <a:p>
-          <a:pPr lvl="0" algn="ctr" defTabSz="1244600">
+          <a:pPr marL="0" lvl="0" indent="0" algn="ctr" defTabSz="1244600">
             <a:lnSpc>
               <a:spcPct val="90000"/>
             </a:lnSpc>
@@ -1703,14 +1683,15 @@
             <a:spcAft>
               <a:spcPct val="35000"/>
             </a:spcAft>
+            <a:buNone/>
           </a:pPr>
           <a:r>
-            <a:rPr lang="ro-RO" sz="2800" kern="1200" dirty="0" smtClean="0"/>
+            <a:rPr lang="ro-RO" sz="2800" kern="1200" dirty="0"/>
             <a:t>Sprint 3</a:t>
           </a:r>
         </a:p>
         <a:p>
-          <a:pPr lvl="0" algn="l" defTabSz="1244600">
+          <a:pPr marL="0" lvl="0" indent="0" algn="l" defTabSz="1244600">
             <a:lnSpc>
               <a:spcPct val="90000"/>
             </a:lnSpc>
@@ -1720,14 +1701,15 @@
             <a:spcAft>
               <a:spcPct val="35000"/>
             </a:spcAft>
+            <a:buNone/>
           </a:pPr>
           <a:r>
-            <a:rPr lang="ro-RO" sz="1100" kern="1200" dirty="0" smtClean="0"/>
+            <a:rPr lang="ro-RO" sz="1100" kern="1200" dirty="0"/>
             <a:t>- Optimizări/Beyond state of the art</a:t>
           </a:r>
         </a:p>
         <a:p>
-          <a:pPr lvl="0" algn="l" defTabSz="1244600">
+          <a:pPr marL="0" lvl="0" indent="0" algn="l" defTabSz="1244600">
             <a:lnSpc>
               <a:spcPct val="90000"/>
             </a:lnSpc>
@@ -1737,9 +1719,10 @@
             <a:spcAft>
               <a:spcPct val="35000"/>
             </a:spcAft>
+            <a:buNone/>
           </a:pPr>
           <a:r>
-            <a:rPr lang="ro-RO" sz="1100" kern="1200" dirty="0" smtClean="0"/>
+            <a:rPr lang="ro-RO" sz="1100" kern="1200" dirty="0"/>
             <a:t>- Validarea rezultatelor obținute</a:t>
           </a:r>
           <a:endParaRPr lang="en-US" sz="1100" kern="1200" dirty="0"/>
@@ -1836,7 +1819,7 @@
         </a:bodyPr>
         <a:lstStyle/>
         <a:p>
-          <a:pPr lvl="0" algn="ctr" defTabSz="1244600">
+          <a:pPr marL="0" lvl="0" indent="0" algn="ctr" defTabSz="1244600">
             <a:lnSpc>
               <a:spcPct val="90000"/>
             </a:lnSpc>
@@ -1846,14 +1829,15 @@
             <a:spcAft>
               <a:spcPct val="35000"/>
             </a:spcAft>
+            <a:buNone/>
           </a:pPr>
           <a:r>
-            <a:rPr lang="ro-RO" sz="2800" kern="1200" dirty="0" smtClean="0"/>
+            <a:rPr lang="ro-RO" sz="2800" kern="1200" dirty="0"/>
             <a:t>Sprint 4</a:t>
           </a:r>
         </a:p>
         <a:p>
-          <a:pPr lvl="0" algn="l" defTabSz="1244600">
+          <a:pPr marL="0" lvl="0" indent="0" algn="l" defTabSz="1244600">
             <a:lnSpc>
               <a:spcPct val="90000"/>
             </a:lnSpc>
@@ -1863,14 +1847,15 @@
             <a:spcAft>
               <a:spcPct val="35000"/>
             </a:spcAft>
+            <a:buNone/>
           </a:pPr>
           <a:r>
-            <a:rPr lang="ro-RO" sz="1100" kern="1200" dirty="0" smtClean="0"/>
+            <a:rPr lang="ro-RO" sz="1100" kern="1200" dirty="0"/>
             <a:t>- Raport final</a:t>
           </a:r>
         </a:p>
         <a:p>
-          <a:pPr lvl="0" algn="l" defTabSz="1244600">
+          <a:pPr marL="0" lvl="0" indent="0" algn="l" defTabSz="1244600">
             <a:lnSpc>
               <a:spcPct val="90000"/>
             </a:lnSpc>
@@ -1880,9 +1865,10 @@
             <a:spcAft>
               <a:spcPct val="35000"/>
             </a:spcAft>
+            <a:buNone/>
           </a:pPr>
           <a:r>
-            <a:rPr lang="ro-RO" sz="1100" kern="1200" dirty="0" smtClean="0"/>
+            <a:rPr lang="ro-RO" sz="1100" kern="1200" dirty="0"/>
             <a:t>- Articol revistă</a:t>
           </a:r>
           <a:endParaRPr lang="en-US" sz="1100" kern="1200" dirty="0"/>
@@ -3830,7 +3816,7 @@
           </a:lstStyle>
           <a:p>
             <a:r>
-              <a:rPr lang="en-US" smtClean="0"/>
+              <a:rPr lang="en-US"/>
               <a:t>Click to edit Master title style</a:t>
             </a:r>
             <a:endParaRPr lang="en-US" dirty="0"/>
@@ -3950,7 +3936,7 @@
           </a:lstStyle>
           <a:p>
             <a:r>
-              <a:rPr lang="en-US" smtClean="0"/>
+              <a:rPr lang="en-US"/>
               <a:t>Click to edit Master subtitle style</a:t>
             </a:r>
             <a:endParaRPr lang="en-US" dirty="0"/>
@@ -3974,7 +3960,7 @@
           <a:p>
             <a:fld id="{4A30D792-577E-4294-AC98-BDD92C8FEA57}" type="datetimeFigureOut">
               <a:rPr lang="en-US" smtClean="0"/>
-              <a:t>11/1/2020</a:t>
+              <a:t>11/2/2020</a:t>
             </a:fld>
             <a:endParaRPr lang="en-US"/>
           </a:p>
@@ -4079,7 +4065,7 @@
           </a:lstStyle>
           <a:p>
             <a:r>
-              <a:rPr lang="en-US" smtClean="0"/>
+              <a:rPr lang="en-US"/>
               <a:t>Click to edit Master title style</a:t>
             </a:r>
             <a:endParaRPr lang="en-US" dirty="0"/>
@@ -4202,7 +4188,7 @@
           <a:p>
             <a:pPr lvl="0"/>
             <a:r>
-              <a:rPr lang="en-US" smtClean="0"/>
+              <a:rPr lang="en-US"/>
               <a:t>Edit Master text styles</a:t>
             </a:r>
           </a:p>
@@ -4225,7 +4211,7 @@
           <a:p>
             <a:fld id="{4A30D792-577E-4294-AC98-BDD92C8FEA57}" type="datetimeFigureOut">
               <a:rPr lang="en-US" smtClean="0"/>
-              <a:t>11/1/2020</a:t>
+              <a:t>11/2/2020</a:t>
             </a:fld>
             <a:endParaRPr lang="en-US"/>
           </a:p>
@@ -4330,7 +4316,7 @@
           </a:lstStyle>
           <a:p>
             <a:r>
-              <a:rPr lang="en-US" smtClean="0"/>
+              <a:rPr lang="en-US"/>
               <a:t>Click to edit Master title style</a:t>
             </a:r>
             <a:endParaRPr lang="en-US" dirty="0"/>
@@ -4394,7 +4380,7 @@
           <a:p>
             <a:pPr lvl="0"/>
             <a:r>
-              <a:rPr lang="en-US" smtClean="0"/>
+              <a:rPr lang="en-US"/>
               <a:t>Edit Master text styles</a:t>
             </a:r>
           </a:p>
@@ -4516,7 +4502,7 @@
           <a:p>
             <a:pPr lvl="0"/>
             <a:r>
-              <a:rPr lang="en-US" smtClean="0"/>
+              <a:rPr lang="en-US"/>
               <a:t>Edit Master text styles</a:t>
             </a:r>
           </a:p>
@@ -4539,7 +4525,7 @@
           <a:p>
             <a:fld id="{4A30D792-577E-4294-AC98-BDD92C8FEA57}" type="datetimeFigureOut">
               <a:rPr lang="en-US" smtClean="0"/>
-              <a:t>11/1/2020</a:t>
+              <a:t>11/2/2020</a:t>
             </a:fld>
             <a:endParaRPr lang="en-US"/>
           </a:p>
@@ -4734,7 +4720,7 @@
           </a:lstStyle>
           <a:p>
             <a:r>
-              <a:rPr lang="en-US" smtClean="0"/>
+              <a:rPr lang="en-US"/>
               <a:t>Click to edit Master title style</a:t>
             </a:r>
             <a:endParaRPr lang="en-US" dirty="0"/>
@@ -4857,7 +4843,7 @@
           <a:p>
             <a:pPr lvl="0"/>
             <a:r>
-              <a:rPr lang="en-US" smtClean="0"/>
+              <a:rPr lang="en-US"/>
               <a:t>Edit Master text styles</a:t>
             </a:r>
           </a:p>
@@ -4880,7 +4866,7 @@
           <a:p>
             <a:fld id="{4A30D792-577E-4294-AC98-BDD92C8FEA57}" type="datetimeFigureOut">
               <a:rPr lang="en-US" smtClean="0"/>
-              <a:t>11/1/2020</a:t>
+              <a:t>11/2/2020</a:t>
             </a:fld>
             <a:endParaRPr lang="en-US"/>
           </a:p>
@@ -4985,7 +4971,7 @@
           </a:lstStyle>
           <a:p>
             <a:r>
-              <a:rPr lang="en-US" smtClean="0"/>
+              <a:rPr lang="en-US"/>
               <a:t>Click to edit Master title style</a:t>
             </a:r>
             <a:endParaRPr lang="en-US" dirty="0"/>
@@ -5049,7 +5035,7 @@
           <a:p>
             <a:pPr lvl="0"/>
             <a:r>
-              <a:rPr lang="en-US" smtClean="0"/>
+              <a:rPr lang="en-US"/>
               <a:t>Edit Master text styles</a:t>
             </a:r>
           </a:p>
@@ -5171,7 +5157,7 @@
           <a:p>
             <a:pPr lvl="0"/>
             <a:r>
-              <a:rPr lang="en-US" smtClean="0"/>
+              <a:rPr lang="en-US"/>
               <a:t>Edit Master text styles</a:t>
             </a:r>
           </a:p>
@@ -5194,7 +5180,7 @@
           <a:p>
             <a:fld id="{4A30D792-577E-4294-AC98-BDD92C8FEA57}" type="datetimeFigureOut">
               <a:rPr lang="en-US" smtClean="0"/>
-              <a:t>11/1/2020</a:t>
+              <a:t>11/2/2020</a:t>
             </a:fld>
             <a:endParaRPr lang="en-US"/>
           </a:p>
@@ -5381,7 +5367,7 @@
           </a:lstStyle>
           <a:p>
             <a:r>
-              <a:rPr lang="en-US" smtClean="0"/>
+              <a:rPr lang="en-US"/>
               <a:t>Click to edit Master title style</a:t>
             </a:r>
             <a:endParaRPr lang="en-US" dirty="0"/>
@@ -5442,7 +5428,7 @@
           <a:p>
             <a:pPr lvl="0"/>
             <a:r>
-              <a:rPr lang="en-US" smtClean="0"/>
+              <a:rPr lang="en-US"/>
               <a:t>Edit Master text styles</a:t>
             </a:r>
           </a:p>
@@ -5564,7 +5550,7 @@
           <a:p>
             <a:pPr lvl="0"/>
             <a:r>
-              <a:rPr lang="en-US" smtClean="0"/>
+              <a:rPr lang="en-US"/>
               <a:t>Edit Master text styles</a:t>
             </a:r>
           </a:p>
@@ -5587,7 +5573,7 @@
           <a:p>
             <a:fld id="{4A30D792-577E-4294-AC98-BDD92C8FEA57}" type="datetimeFigureOut">
               <a:rPr lang="en-US" smtClean="0"/>
-              <a:t>11/1/2020</a:t>
+              <a:t>11/2/2020</a:t>
             </a:fld>
             <a:endParaRPr lang="en-US"/>
           </a:p>
@@ -5681,7 +5667,7 @@
           <a:lstStyle/>
           <a:p>
             <a:r>
-              <a:rPr lang="en-US" smtClean="0"/>
+              <a:rPr lang="en-US"/>
               <a:t>Click to edit Master title style</a:t>
             </a:r>
             <a:endParaRPr lang="en-US" dirty="0"/>
@@ -5705,35 +5691,35 @@
           <a:p>
             <a:pPr lvl="0"/>
             <a:r>
-              <a:rPr lang="en-US" smtClean="0"/>
+              <a:rPr lang="en-US"/>
               <a:t>Edit Master text styles</a:t>
             </a:r>
           </a:p>
           <a:p>
             <a:pPr lvl="1"/>
             <a:r>
-              <a:rPr lang="en-US" smtClean="0"/>
+              <a:rPr lang="en-US"/>
               <a:t>Second level</a:t>
             </a:r>
           </a:p>
           <a:p>
             <a:pPr lvl="2"/>
             <a:r>
-              <a:rPr lang="en-US" smtClean="0"/>
+              <a:rPr lang="en-US"/>
               <a:t>Third level</a:t>
             </a:r>
           </a:p>
           <a:p>
             <a:pPr lvl="3"/>
             <a:r>
-              <a:rPr lang="en-US" smtClean="0"/>
+              <a:rPr lang="en-US"/>
               <a:t>Fourth level</a:t>
             </a:r>
           </a:p>
           <a:p>
             <a:pPr lvl="4"/>
             <a:r>
-              <a:rPr lang="en-US" smtClean="0"/>
+              <a:rPr lang="en-US"/>
               <a:t>Fifth level</a:t>
             </a:r>
             <a:endParaRPr lang="en-US" dirty="0"/>
@@ -5757,7 +5743,7 @@
           <a:p>
             <a:fld id="{4A30D792-577E-4294-AC98-BDD92C8FEA57}" type="datetimeFigureOut">
               <a:rPr lang="en-US" smtClean="0"/>
-              <a:t>11/1/2020</a:t>
+              <a:t>11/2/2020</a:t>
             </a:fld>
             <a:endParaRPr lang="en-US"/>
           </a:p>
@@ -5856,7 +5842,7 @@
           <a:lstStyle/>
           <a:p>
             <a:r>
-              <a:rPr lang="en-US" smtClean="0"/>
+              <a:rPr lang="en-US"/>
               <a:t>Click to edit Master title style</a:t>
             </a:r>
             <a:endParaRPr lang="en-US" dirty="0"/>
@@ -5885,35 +5871,35 @@
           <a:p>
             <a:pPr lvl="0"/>
             <a:r>
-              <a:rPr lang="en-US" smtClean="0"/>
+              <a:rPr lang="en-US"/>
               <a:t>Edit Master text styles</a:t>
             </a:r>
           </a:p>
           <a:p>
             <a:pPr lvl="1"/>
             <a:r>
-              <a:rPr lang="en-US" smtClean="0"/>
+              <a:rPr lang="en-US"/>
               <a:t>Second level</a:t>
             </a:r>
           </a:p>
           <a:p>
             <a:pPr lvl="2"/>
             <a:r>
-              <a:rPr lang="en-US" smtClean="0"/>
+              <a:rPr lang="en-US"/>
               <a:t>Third level</a:t>
             </a:r>
           </a:p>
           <a:p>
             <a:pPr lvl="3"/>
             <a:r>
-              <a:rPr lang="en-US" smtClean="0"/>
+              <a:rPr lang="en-US"/>
               <a:t>Fourth level</a:t>
             </a:r>
           </a:p>
           <a:p>
             <a:pPr lvl="4"/>
             <a:r>
-              <a:rPr lang="en-US" smtClean="0"/>
+              <a:rPr lang="en-US"/>
               <a:t>Fifth level</a:t>
             </a:r>
             <a:endParaRPr lang="en-US" dirty="0"/>
@@ -5937,7 +5923,7 @@
           <a:p>
             <a:fld id="{4A30D792-577E-4294-AC98-BDD92C8FEA57}" type="datetimeFigureOut">
               <a:rPr lang="en-US" smtClean="0"/>
-              <a:t>11/1/2020</a:t>
+              <a:t>11/2/2020</a:t>
             </a:fld>
             <a:endParaRPr lang="en-US"/>
           </a:p>
@@ -6037,7 +6023,7 @@
           </a:lstStyle>
           <a:p>
             <a:r>
-              <a:rPr lang="en-US" smtClean="0"/>
+              <a:rPr lang="en-US"/>
               <a:t>Click to edit Master title style</a:t>
             </a:r>
             <a:endParaRPr lang="en-US" dirty="0"/>
@@ -6061,35 +6047,35 @@
           <a:p>
             <a:pPr lvl="0"/>
             <a:r>
-              <a:rPr lang="en-US" smtClean="0"/>
+              <a:rPr lang="en-US"/>
               <a:t>Edit Master text styles</a:t>
             </a:r>
           </a:p>
           <a:p>
             <a:pPr lvl="1"/>
             <a:r>
-              <a:rPr lang="en-US" smtClean="0"/>
+              <a:rPr lang="en-US"/>
               <a:t>Second level</a:t>
             </a:r>
           </a:p>
           <a:p>
             <a:pPr lvl="2"/>
             <a:r>
-              <a:rPr lang="en-US" smtClean="0"/>
+              <a:rPr lang="en-US"/>
               <a:t>Third level</a:t>
             </a:r>
           </a:p>
           <a:p>
             <a:pPr lvl="3"/>
             <a:r>
-              <a:rPr lang="en-US" smtClean="0"/>
+              <a:rPr lang="en-US"/>
               <a:t>Fourth level</a:t>
             </a:r>
           </a:p>
           <a:p>
             <a:pPr lvl="4"/>
             <a:r>
-              <a:rPr lang="en-US" smtClean="0"/>
+              <a:rPr lang="en-US"/>
               <a:t>Fifth level</a:t>
             </a:r>
             <a:endParaRPr lang="en-US" dirty="0"/>
@@ -6113,7 +6099,7 @@
           <a:p>
             <a:fld id="{4A30D792-577E-4294-AC98-BDD92C8FEA57}" type="datetimeFigureOut">
               <a:rPr lang="en-US" smtClean="0"/>
-              <a:t>11/1/2020</a:t>
+              <a:t>11/2/2020</a:t>
             </a:fld>
             <a:endParaRPr lang="en-US"/>
           </a:p>
@@ -6216,7 +6202,7 @@
           </a:lstStyle>
           <a:p>
             <a:r>
-              <a:rPr lang="en-US" smtClean="0"/>
+              <a:rPr lang="en-US"/>
               <a:t>Click to edit Master title style</a:t>
             </a:r>
             <a:endParaRPr lang="en-US" dirty="0"/>
@@ -6337,7 +6323,7 @@
           <a:p>
             <a:pPr lvl="0"/>
             <a:r>
-              <a:rPr lang="en-US" smtClean="0"/>
+              <a:rPr lang="en-US"/>
               <a:t>Edit Master text styles</a:t>
             </a:r>
           </a:p>
@@ -6360,7 +6346,7 @@
           <a:p>
             <a:fld id="{4A30D792-577E-4294-AC98-BDD92C8FEA57}" type="datetimeFigureOut">
               <a:rPr lang="en-US" smtClean="0"/>
-              <a:t>11/1/2020</a:t>
+              <a:t>11/2/2020</a:t>
             </a:fld>
             <a:endParaRPr lang="en-US"/>
           </a:p>
@@ -6454,7 +6440,7 @@
           <a:lstStyle/>
           <a:p>
             <a:r>
-              <a:rPr lang="en-US" smtClean="0"/>
+              <a:rPr lang="en-US"/>
               <a:t>Click to edit Master title style</a:t>
             </a:r>
             <a:endParaRPr lang="en-US" dirty="0"/>
@@ -6483,35 +6469,35 @@
           <a:p>
             <a:pPr lvl="0"/>
             <a:r>
-              <a:rPr lang="en-US" smtClean="0"/>
+              <a:rPr lang="en-US"/>
               <a:t>Edit Master text styles</a:t>
             </a:r>
           </a:p>
           <a:p>
             <a:pPr lvl="1"/>
             <a:r>
-              <a:rPr lang="en-US" smtClean="0"/>
+              <a:rPr lang="en-US"/>
               <a:t>Second level</a:t>
             </a:r>
           </a:p>
           <a:p>
             <a:pPr lvl="2"/>
             <a:r>
-              <a:rPr lang="en-US" smtClean="0"/>
+              <a:rPr lang="en-US"/>
               <a:t>Third level</a:t>
             </a:r>
           </a:p>
           <a:p>
             <a:pPr lvl="3"/>
             <a:r>
-              <a:rPr lang="en-US" smtClean="0"/>
+              <a:rPr lang="en-US"/>
               <a:t>Fourth level</a:t>
             </a:r>
           </a:p>
           <a:p>
             <a:pPr lvl="4"/>
             <a:r>
-              <a:rPr lang="en-US" smtClean="0"/>
+              <a:rPr lang="en-US"/>
               <a:t>Fifth level</a:t>
             </a:r>
             <a:endParaRPr lang="en-US" dirty="0"/>
@@ -6540,35 +6526,35 @@
           <a:p>
             <a:pPr lvl="0"/>
             <a:r>
-              <a:rPr lang="en-US" smtClean="0"/>
+              <a:rPr lang="en-US"/>
               <a:t>Edit Master text styles</a:t>
             </a:r>
           </a:p>
           <a:p>
             <a:pPr lvl="1"/>
             <a:r>
-              <a:rPr lang="en-US" smtClean="0"/>
+              <a:rPr lang="en-US"/>
               <a:t>Second level</a:t>
             </a:r>
           </a:p>
           <a:p>
             <a:pPr lvl="2"/>
             <a:r>
-              <a:rPr lang="en-US" smtClean="0"/>
+              <a:rPr lang="en-US"/>
               <a:t>Third level</a:t>
             </a:r>
           </a:p>
           <a:p>
             <a:pPr lvl="3"/>
             <a:r>
-              <a:rPr lang="en-US" smtClean="0"/>
+              <a:rPr lang="en-US"/>
               <a:t>Fourth level</a:t>
             </a:r>
           </a:p>
           <a:p>
             <a:pPr lvl="4"/>
             <a:r>
-              <a:rPr lang="en-US" smtClean="0"/>
+              <a:rPr lang="en-US"/>
               <a:t>Fifth level</a:t>
             </a:r>
             <a:endParaRPr lang="en-US" dirty="0"/>
@@ -6592,7 +6578,7 @@
           <a:p>
             <a:fld id="{4A30D792-577E-4294-AC98-BDD92C8FEA57}" type="datetimeFigureOut">
               <a:rPr lang="en-US" smtClean="0"/>
-              <a:t>11/1/2020</a:t>
+              <a:t>11/2/2020</a:t>
             </a:fld>
             <a:endParaRPr lang="en-US"/>
           </a:p>
@@ -6690,7 +6676,7 @@
           </a:lstStyle>
           <a:p>
             <a:r>
-              <a:rPr lang="en-US" smtClean="0"/>
+              <a:rPr lang="en-US"/>
               <a:t>Click to edit Master title style</a:t>
             </a:r>
             <a:endParaRPr lang="en-US" dirty="0"/>
@@ -6758,7 +6744,7 @@
           <a:p>
             <a:pPr lvl="0"/>
             <a:r>
-              <a:rPr lang="en-US" smtClean="0"/>
+              <a:rPr lang="en-US"/>
               <a:t>Edit Master text styles</a:t>
             </a:r>
           </a:p>
@@ -6788,35 +6774,35 @@
           <a:p>
             <a:pPr lvl="0"/>
             <a:r>
-              <a:rPr lang="en-US" smtClean="0"/>
+              <a:rPr lang="en-US"/>
               <a:t>Edit Master text styles</a:t>
             </a:r>
           </a:p>
           <a:p>
             <a:pPr lvl="1"/>
             <a:r>
-              <a:rPr lang="en-US" smtClean="0"/>
+              <a:rPr lang="en-US"/>
               <a:t>Second level</a:t>
             </a:r>
           </a:p>
           <a:p>
             <a:pPr lvl="2"/>
             <a:r>
-              <a:rPr lang="en-US" smtClean="0"/>
+              <a:rPr lang="en-US"/>
               <a:t>Third level</a:t>
             </a:r>
           </a:p>
           <a:p>
             <a:pPr lvl="3"/>
             <a:r>
-              <a:rPr lang="en-US" smtClean="0"/>
+              <a:rPr lang="en-US"/>
               <a:t>Fourth level</a:t>
             </a:r>
           </a:p>
           <a:p>
             <a:pPr lvl="4"/>
             <a:r>
-              <a:rPr lang="en-US" smtClean="0"/>
+              <a:rPr lang="en-US"/>
               <a:t>Fifth level</a:t>
             </a:r>
             <a:endParaRPr lang="en-US" dirty="0"/>
@@ -6884,7 +6870,7 @@
           <a:p>
             <a:pPr lvl="0"/>
             <a:r>
-              <a:rPr lang="en-US" smtClean="0"/>
+              <a:rPr lang="en-US"/>
               <a:t>Edit Master text styles</a:t>
             </a:r>
           </a:p>
@@ -6914,35 +6900,35 @@
           <a:p>
             <a:pPr lvl="0"/>
             <a:r>
-              <a:rPr lang="en-US" smtClean="0"/>
+              <a:rPr lang="en-US"/>
               <a:t>Edit Master text styles</a:t>
             </a:r>
           </a:p>
           <a:p>
             <a:pPr lvl="1"/>
             <a:r>
-              <a:rPr lang="en-US" smtClean="0"/>
+              <a:rPr lang="en-US"/>
               <a:t>Second level</a:t>
             </a:r>
           </a:p>
           <a:p>
             <a:pPr lvl="2"/>
             <a:r>
-              <a:rPr lang="en-US" smtClean="0"/>
+              <a:rPr lang="en-US"/>
               <a:t>Third level</a:t>
             </a:r>
           </a:p>
           <a:p>
             <a:pPr lvl="3"/>
             <a:r>
-              <a:rPr lang="en-US" smtClean="0"/>
+              <a:rPr lang="en-US"/>
               <a:t>Fourth level</a:t>
             </a:r>
           </a:p>
           <a:p>
             <a:pPr lvl="4"/>
             <a:r>
-              <a:rPr lang="en-US" smtClean="0"/>
+              <a:rPr lang="en-US"/>
               <a:t>Fifth level</a:t>
             </a:r>
             <a:endParaRPr lang="en-US" dirty="0"/>
@@ -6966,7 +6952,7 @@
           <a:p>
             <a:fld id="{4A30D792-577E-4294-AC98-BDD92C8FEA57}" type="datetimeFigureOut">
               <a:rPr lang="en-US" smtClean="0"/>
-              <a:t>11/1/2020</a:t>
+              <a:t>11/2/2020</a:t>
             </a:fld>
             <a:endParaRPr lang="en-US"/>
           </a:p>
@@ -7065,7 +7051,7 @@
           <a:lstStyle/>
           <a:p>
             <a:r>
-              <a:rPr lang="en-US" smtClean="0"/>
+              <a:rPr lang="en-US"/>
               <a:t>Click to edit Master title style</a:t>
             </a:r>
             <a:endParaRPr lang="en-US" dirty="0"/>
@@ -7089,7 +7075,7 @@
           <a:p>
             <a:fld id="{4A30D792-577E-4294-AC98-BDD92C8FEA57}" type="datetimeFigureOut">
               <a:rPr lang="en-US" smtClean="0"/>
-              <a:t>11/1/2020</a:t>
+              <a:t>11/2/2020</a:t>
             </a:fld>
             <a:endParaRPr lang="en-US"/>
           </a:p>
@@ -7184,7 +7170,7 @@
           <a:p>
             <a:fld id="{4A30D792-577E-4294-AC98-BDD92C8FEA57}" type="datetimeFigureOut">
               <a:rPr lang="en-US" smtClean="0"/>
-              <a:t>11/1/2020</a:t>
+              <a:t>11/2/2020</a:t>
             </a:fld>
             <a:endParaRPr lang="en-US"/>
           </a:p>
@@ -7289,7 +7275,7 @@
           </a:lstStyle>
           <a:p>
             <a:r>
-              <a:rPr lang="en-US" smtClean="0"/>
+              <a:rPr lang="en-US"/>
               <a:t>Click to edit Master title style</a:t>
             </a:r>
             <a:endParaRPr lang="en-US" dirty="0"/>
@@ -7320,35 +7306,35 @@
           <a:p>
             <a:pPr lvl="0"/>
             <a:r>
-              <a:rPr lang="en-US" smtClean="0"/>
+              <a:rPr lang="en-US"/>
               <a:t>Edit Master text styles</a:t>
             </a:r>
           </a:p>
           <a:p>
             <a:pPr lvl="1"/>
             <a:r>
-              <a:rPr lang="en-US" smtClean="0"/>
+              <a:rPr lang="en-US"/>
               <a:t>Second level</a:t>
             </a:r>
           </a:p>
           <a:p>
             <a:pPr lvl="2"/>
             <a:r>
-              <a:rPr lang="en-US" smtClean="0"/>
+              <a:rPr lang="en-US"/>
               <a:t>Third level</a:t>
             </a:r>
           </a:p>
           <a:p>
             <a:pPr lvl="3"/>
             <a:r>
-              <a:rPr lang="en-US" smtClean="0"/>
+              <a:rPr lang="en-US"/>
               <a:t>Fourth level</a:t>
             </a:r>
           </a:p>
           <a:p>
             <a:pPr lvl="4"/>
             <a:r>
-              <a:rPr lang="en-US" smtClean="0"/>
+              <a:rPr lang="en-US"/>
               <a:t>Fifth level</a:t>
             </a:r>
             <a:endParaRPr lang="en-US" dirty="0"/>
@@ -7416,7 +7402,7 @@
           <a:p>
             <a:pPr lvl="0"/>
             <a:r>
-              <a:rPr lang="en-US" smtClean="0"/>
+              <a:rPr lang="en-US"/>
               <a:t>Edit Master text styles</a:t>
             </a:r>
           </a:p>
@@ -7439,7 +7425,7 @@
           <a:p>
             <a:fld id="{4A30D792-577E-4294-AC98-BDD92C8FEA57}" type="datetimeFigureOut">
               <a:rPr lang="en-US" smtClean="0"/>
-              <a:t>11/1/2020</a:t>
+              <a:t>11/2/2020</a:t>
             </a:fld>
             <a:endParaRPr lang="en-US"/>
           </a:p>
@@ -7544,7 +7530,7 @@
           </a:lstStyle>
           <a:p>
             <a:r>
-              <a:rPr lang="en-US" smtClean="0"/>
+              <a:rPr lang="en-US"/>
               <a:t>Click to edit Master title style</a:t>
             </a:r>
             <a:endParaRPr lang="en-US" dirty="0"/>
@@ -7611,7 +7597,7 @@
           </a:lstStyle>
           <a:p>
             <a:r>
-              <a:rPr lang="en-US" smtClean="0"/>
+              <a:rPr lang="en-US"/>
               <a:t>Click icon to add picture</a:t>
             </a:r>
             <a:endParaRPr lang="en-US" dirty="0"/>
@@ -7679,7 +7665,7 @@
           <a:p>
             <a:pPr lvl="0"/>
             <a:r>
-              <a:rPr lang="en-US" smtClean="0"/>
+              <a:rPr lang="en-US"/>
               <a:t>Edit Master text styles</a:t>
             </a:r>
           </a:p>
@@ -7702,7 +7688,7 @@
           <a:p>
             <a:fld id="{4A30D792-577E-4294-AC98-BDD92C8FEA57}" type="datetimeFigureOut">
               <a:rPr lang="en-US" smtClean="0"/>
-              <a:t>11/1/2020</a:t>
+              <a:t>11/2/2020</a:t>
             </a:fld>
             <a:endParaRPr lang="en-US"/>
           </a:p>
@@ -8341,7 +8327,7 @@
           <a:lstStyle/>
           <a:p>
             <a:r>
-              <a:rPr lang="en-US" smtClean="0"/>
+              <a:rPr lang="en-US"/>
               <a:t>Click to edit Master title style</a:t>
             </a:r>
             <a:endParaRPr lang="en-US" dirty="0"/>
@@ -8375,35 +8361,35 @@
           <a:p>
             <a:pPr lvl="0"/>
             <a:r>
-              <a:rPr lang="en-US" smtClean="0"/>
+              <a:rPr lang="en-US"/>
               <a:t>Edit Master text styles</a:t>
             </a:r>
           </a:p>
           <a:p>
             <a:pPr lvl="1"/>
             <a:r>
-              <a:rPr lang="en-US" smtClean="0"/>
+              <a:rPr lang="en-US"/>
               <a:t>Second level</a:t>
             </a:r>
           </a:p>
           <a:p>
             <a:pPr lvl="2"/>
             <a:r>
-              <a:rPr lang="en-US" smtClean="0"/>
+              <a:rPr lang="en-US"/>
               <a:t>Third level</a:t>
             </a:r>
           </a:p>
           <a:p>
             <a:pPr lvl="3"/>
             <a:r>
-              <a:rPr lang="en-US" smtClean="0"/>
+              <a:rPr lang="en-US"/>
               <a:t>Fourth level</a:t>
             </a:r>
           </a:p>
           <a:p>
             <a:pPr lvl="4"/>
             <a:r>
-              <a:rPr lang="en-US" smtClean="0"/>
+              <a:rPr lang="en-US"/>
               <a:t>Fifth level</a:t>
             </a:r>
             <a:endParaRPr lang="en-US" dirty="0"/>
@@ -8445,7 +8431,7 @@
           <a:p>
             <a:fld id="{4A30D792-577E-4294-AC98-BDD92C8FEA57}" type="datetimeFigureOut">
               <a:rPr lang="en-US" smtClean="0"/>
-              <a:t>11/1/2020</a:t>
+              <a:t>11/2/2020</a:t>
             </a:fld>
             <a:endParaRPr lang="en-US"/>
           </a:p>
@@ -8993,24 +8979,12 @@
               <a:rPr lang="en-US" sz="4000" b="1" dirty="0"/>
               <a:t>SUPER RESOLUTION: </a:t>
             </a:r>
-            <a:r>
-              <a:rPr lang="en-US" sz="4000" b="1" dirty="0" smtClean="0"/>
-              <a:t/>
-            </a:r>
             <a:br>
-              <a:rPr lang="en-US" sz="4000" b="1" dirty="0" smtClean="0"/>
+              <a:rPr lang="en-US" sz="4000" b="1" dirty="0"/>
             </a:br>
             <a:r>
-              <a:rPr lang="en-US" sz="4000" b="1" dirty="0" smtClean="0"/>
-              <a:t>A </a:t>
-            </a:r>
-            <a:r>
               <a:rPr lang="en-US" sz="4000" b="1" dirty="0"/>
-              <a:t>SPATIAL SUBPIXEL INTERPOLATION </a:t>
-            </a:r>
-            <a:r>
-              <a:rPr lang="en-US" sz="4000" b="1" dirty="0" smtClean="0"/>
-              <a:t>TECHNIQUE</a:t>
+              <a:t>A SPATIAL SUBPIXEL INTERPOLATION TECHNIQUE</a:t>
             </a:r>
             <a:endParaRPr lang="en-US" sz="4000" dirty="0"/>
           </a:p>
@@ -9032,7 +9006,7 @@
           <a:lstStyle/>
           <a:p>
             <a:r>
-              <a:rPr lang="en-US" dirty="0" err="1" smtClean="0">
+              <a:rPr lang="en-US" dirty="0" err="1">
                 <a:solidFill>
                   <a:schemeClr val="tx1">
                     <a:lumMod val="75000"/>
@@ -9043,7 +9017,7 @@
               <a:t>Popescu</a:t>
             </a:r>
             <a:r>
-              <a:rPr lang="en-US" dirty="0" smtClean="0">
+              <a:rPr lang="en-US" dirty="0">
                 <a:solidFill>
                   <a:schemeClr val="tx1">
                     <a:lumMod val="75000"/>
@@ -9056,7 +9030,7 @@
           </a:p>
           <a:p>
             <a:r>
-              <a:rPr lang="en-US" dirty="0" err="1" smtClean="0">
+              <a:rPr lang="en-US" dirty="0" err="1">
                 <a:solidFill>
                   <a:schemeClr val="tx1">
                     <a:lumMod val="75000"/>
@@ -9067,7 +9041,7 @@
               <a:t>Busuioc</a:t>
             </a:r>
             <a:r>
-              <a:rPr lang="en-US" dirty="0" smtClean="0">
+              <a:rPr lang="en-US" dirty="0">
                 <a:solidFill>
                   <a:schemeClr val="tx1">
                     <a:lumMod val="75000"/>
@@ -9078,7 +9052,7 @@
               <a:t> </a:t>
             </a:r>
             <a:r>
-              <a:rPr lang="en-US" dirty="0" err="1" smtClean="0">
+              <a:rPr lang="en-US" dirty="0" err="1">
                 <a:solidFill>
                   <a:schemeClr val="tx1">
                     <a:lumMod val="75000"/>
@@ -9089,7 +9063,7 @@
               <a:t>Dragos</a:t>
             </a:r>
             <a:r>
-              <a:rPr lang="en-US" dirty="0" smtClean="0">
+              <a:rPr lang="en-US" dirty="0">
                 <a:solidFill>
                   <a:schemeClr val="tx1">
                     <a:lumMod val="75000"/>
@@ -9099,14 +9073,6 @@
               </a:rPr>
               <a:t>-Andrei</a:t>
             </a:r>
-            <a:endParaRPr lang="en-US" dirty="0">
-              <a:solidFill>
-                <a:schemeClr val="tx1">
-                  <a:lumMod val="75000"/>
-                  <a:lumOff val="25000"/>
-                </a:schemeClr>
-              </a:solidFill>
-            </a:endParaRPr>
           </a:p>
         </p:txBody>
       </p:sp>
@@ -9156,14 +9122,91 @@
           <a:lstStyle/>
           <a:p>
             <a:r>
-              <a:rPr lang="ro-RO" dirty="0" smtClean="0"/>
+              <a:rPr lang="ro-RO" dirty="0"/>
+              <a:t>ETAPE VIITOARE</a:t>
+            </a:r>
+            <a:endParaRPr lang="en-US" dirty="0"/>
+          </a:p>
+        </p:txBody>
+      </p:sp>
+      <p:graphicFrame>
+        <p:nvGraphicFramePr>
+          <p:cNvPr id="4" name="Content Placeholder 3"/>
+          <p:cNvGraphicFramePr>
+            <a:graphicFrameLocks noGrp="1"/>
+          </p:cNvGraphicFramePr>
+          <p:nvPr>
+            <p:ph idx="1"/>
+            <p:extLst>
+              <p:ext uri="{D42A27DB-BD31-4B8C-83A1-F6EECF244321}">
+                <p14:modId xmlns:p14="http://schemas.microsoft.com/office/powerpoint/2010/main" val="4155484168"/>
+              </p:ext>
+            </p:extLst>
+          </p:nvPr>
+        </p:nvGraphicFramePr>
+        <p:xfrm>
+          <a:off x="677863" y="2160588"/>
+          <a:ext cx="8596312" cy="3881437"/>
+        </p:xfrm>
+        <a:graphic>
+          <a:graphicData uri="http://schemas.openxmlformats.org/drawingml/2006/diagram">
+            <dgm:relIds xmlns:dgm="http://schemas.openxmlformats.org/drawingml/2006/diagram" xmlns:r="http://schemas.openxmlformats.org/officeDocument/2006/relationships" r:dm="rId2" r:lo="rId3" r:qs="rId4" r:cs="rId5"/>
+          </a:graphicData>
+        </a:graphic>
+      </p:graphicFrame>
+    </p:spTree>
+    <p:extLst>
+      <p:ext uri="{BB962C8B-B14F-4D97-AF65-F5344CB8AC3E}">
+        <p14:creationId xmlns:p14="http://schemas.microsoft.com/office/powerpoint/2010/main" val="4201970213"/>
+      </p:ext>
+    </p:extLst>
+  </p:cSld>
+  <p:clrMapOvr>
+    <a:masterClrMapping/>
+  </p:clrMapOvr>
+</p:sld>
+</file>
+
+<file path=ppt/slides/slide11.xml><?xml version="1.0" encoding="utf-8"?>
+<p:sld xmlns:a="http://schemas.openxmlformats.org/drawingml/2006/main" xmlns:r="http://schemas.openxmlformats.org/officeDocument/2006/relationships" xmlns:p="http://schemas.openxmlformats.org/presentationml/2006/main">
+  <p:cSld>
+    <p:spTree>
+      <p:nvGrpSpPr>
+        <p:cNvPr id="1" name=""/>
+        <p:cNvGrpSpPr/>
+        <p:nvPr/>
+      </p:nvGrpSpPr>
+      <p:grpSpPr>
+        <a:xfrm>
+          <a:off x="0" y="0"/>
+          <a:ext cx="0" cy="0"/>
+          <a:chOff x="0" y="0"/>
+          <a:chExt cx="0" cy="0"/>
+        </a:xfrm>
+      </p:grpSpPr>
+      <p:sp>
+        <p:nvSpPr>
+          <p:cNvPr id="2" name="Title 1"/>
+          <p:cNvSpPr>
+            <a:spLocks noGrp="1"/>
+          </p:cNvSpPr>
+          <p:nvPr>
+            <p:ph type="title"/>
+          </p:nvPr>
+        </p:nvSpPr>
+        <p:spPr/>
+        <p:txBody>
+          <a:bodyPr/>
+          <a:lstStyle/>
+          <a:p>
+            <a:r>
+              <a:rPr lang="ro-RO" dirty="0"/>
               <a:t>ÎNTREBĂRI</a:t>
             </a:r>
             <a:r>
-              <a:rPr lang="en-US" dirty="0" smtClean="0"/>
+              <a:rPr lang="en-US" dirty="0"/>
               <a:t>?</a:t>
             </a:r>
-            <a:endParaRPr lang="en-US" dirty="0"/>
           </a:p>
         </p:txBody>
       </p:sp>
@@ -9209,100 +9252,6 @@
 </p:sld>
 </file>
 
-<file path=ppt/slides/slide11.xml><?xml version="1.0" encoding="utf-8"?>
-<p:sld xmlns:a="http://schemas.openxmlformats.org/drawingml/2006/main" xmlns:r="http://schemas.openxmlformats.org/officeDocument/2006/relationships" xmlns:p="http://schemas.openxmlformats.org/presentationml/2006/main">
-  <p:cSld>
-    <p:spTree>
-      <p:nvGrpSpPr>
-        <p:cNvPr id="1" name=""/>
-        <p:cNvGrpSpPr/>
-        <p:nvPr/>
-      </p:nvGrpSpPr>
-      <p:grpSpPr>
-        <a:xfrm>
-          <a:off x="0" y="0"/>
-          <a:ext cx="0" cy="0"/>
-          <a:chOff x="0" y="0"/>
-          <a:chExt cx="0" cy="0"/>
-        </a:xfrm>
-      </p:grpSpPr>
-      <p:sp>
-        <p:nvSpPr>
-          <p:cNvPr id="2" name="Title 1"/>
-          <p:cNvSpPr>
-            <a:spLocks noGrp="1"/>
-          </p:cNvSpPr>
-          <p:nvPr>
-            <p:ph type="title"/>
-          </p:nvPr>
-        </p:nvSpPr>
-        <p:spPr/>
-        <p:txBody>
-          <a:bodyPr/>
-          <a:lstStyle/>
-          <a:p>
-            <a:r>
-              <a:rPr lang="ro-RO" dirty="0" smtClean="0"/>
-              <a:t>REFERINȚE</a:t>
-            </a:r>
-            <a:endParaRPr lang="en-US" dirty="0"/>
-          </a:p>
-        </p:txBody>
-      </p:sp>
-      <p:sp>
-        <p:nvSpPr>
-          <p:cNvPr id="3" name="Content Placeholder 2"/>
-          <p:cNvSpPr>
-            <a:spLocks noGrp="1"/>
-          </p:cNvSpPr>
-          <p:nvPr>
-            <p:ph idx="1"/>
-          </p:nvPr>
-        </p:nvSpPr>
-        <p:spPr/>
-        <p:txBody>
-          <a:bodyPr/>
-          <a:lstStyle/>
-          <a:p>
-            <a:r>
-              <a:rPr lang="en-US" dirty="0">
-                <a:hlinkClick r:id="rId2"/>
-              </a:rPr>
-              <a:t>https://www.videosurveillance.com/blog/technology/surveillance-cameras</a:t>
-            </a:r>
-            <a:r>
-              <a:rPr lang="en-US" dirty="0" smtClean="0">
-                <a:hlinkClick r:id="rId2"/>
-              </a:rPr>
-              <a:t>/</a:t>
-            </a:r>
-            <a:endParaRPr lang="ro-RO" dirty="0" smtClean="0"/>
-          </a:p>
-          <a:p>
-            <a:r>
-              <a:rPr lang="en-US" dirty="0" err="1"/>
-              <a:t>Jianchao</a:t>
-            </a:r>
-            <a:r>
-              <a:rPr lang="en-US" dirty="0"/>
-              <a:t> Yang, Thomas Huang, Image super-resolution: Historical overview and future challenges, pages 6, 2017</a:t>
-            </a:r>
-          </a:p>
-        </p:txBody>
-      </p:sp>
-    </p:spTree>
-    <p:extLst>
-      <p:ext uri="{BB962C8B-B14F-4D97-AF65-F5344CB8AC3E}">
-        <p14:creationId xmlns:p14="http://schemas.microsoft.com/office/powerpoint/2010/main" val="2159485716"/>
-      </p:ext>
-    </p:extLst>
-  </p:cSld>
-  <p:clrMapOvr>
-    <a:masterClrMapping/>
-  </p:clrMapOvr>
-</p:sld>
-</file>
-
 <file path=ppt/slides/slide12.xml><?xml version="1.0" encoding="utf-8"?>
 <p:sld xmlns:a="http://schemas.openxmlformats.org/drawingml/2006/main" xmlns:r="http://schemas.openxmlformats.org/officeDocument/2006/relationships" xmlns:p="http://schemas.openxmlformats.org/presentationml/2006/main">
   <p:cSld>
@@ -9330,6 +9279,94 @@
             <p:ph type="title"/>
           </p:nvPr>
         </p:nvSpPr>
+        <p:spPr/>
+        <p:txBody>
+          <a:bodyPr/>
+          <a:lstStyle/>
+          <a:p>
+            <a:r>
+              <a:rPr lang="ro-RO" dirty="0"/>
+              <a:t>REFERINȚE</a:t>
+            </a:r>
+            <a:endParaRPr lang="en-US" dirty="0"/>
+          </a:p>
+        </p:txBody>
+      </p:sp>
+      <p:sp>
+        <p:nvSpPr>
+          <p:cNvPr id="3" name="Content Placeholder 2"/>
+          <p:cNvSpPr>
+            <a:spLocks noGrp="1"/>
+          </p:cNvSpPr>
+          <p:nvPr>
+            <p:ph idx="1"/>
+          </p:nvPr>
+        </p:nvSpPr>
+        <p:spPr/>
+        <p:txBody>
+          <a:bodyPr/>
+          <a:lstStyle/>
+          <a:p>
+            <a:r>
+              <a:rPr lang="en-US" dirty="0">
+                <a:hlinkClick r:id="rId2"/>
+              </a:rPr>
+              <a:t>https://www.videosurveillance.com/blog/technology/surveillance-cameras/</a:t>
+            </a:r>
+            <a:endParaRPr lang="ro-RO" dirty="0"/>
+          </a:p>
+          <a:p>
+            <a:r>
+              <a:rPr lang="en-US" dirty="0" err="1"/>
+              <a:t>Jianchao</a:t>
+            </a:r>
+            <a:r>
+              <a:rPr lang="en-US" dirty="0"/>
+              <a:t> Yang, Thomas Huang, Image super-resolution: Historical overview and future challenges, pages 6, 2017</a:t>
+            </a:r>
+          </a:p>
+        </p:txBody>
+      </p:sp>
+    </p:spTree>
+    <p:extLst>
+      <p:ext uri="{BB962C8B-B14F-4D97-AF65-F5344CB8AC3E}">
+        <p14:creationId xmlns:p14="http://schemas.microsoft.com/office/powerpoint/2010/main" val="2159485716"/>
+      </p:ext>
+    </p:extLst>
+  </p:cSld>
+  <p:clrMapOvr>
+    <a:masterClrMapping/>
+  </p:clrMapOvr>
+</p:sld>
+</file>
+
+<file path=ppt/slides/slide13.xml><?xml version="1.0" encoding="utf-8"?>
+<p:sld xmlns:a="http://schemas.openxmlformats.org/drawingml/2006/main" xmlns:r="http://schemas.openxmlformats.org/officeDocument/2006/relationships" xmlns:p="http://schemas.openxmlformats.org/presentationml/2006/main">
+  <p:cSld>
+    <p:spTree>
+      <p:nvGrpSpPr>
+        <p:cNvPr id="1" name=""/>
+        <p:cNvGrpSpPr/>
+        <p:nvPr/>
+      </p:nvGrpSpPr>
+      <p:grpSpPr>
+        <a:xfrm>
+          <a:off x="0" y="0"/>
+          <a:ext cx="0" cy="0"/>
+          <a:chOff x="0" y="0"/>
+          <a:chExt cx="0" cy="0"/>
+        </a:xfrm>
+      </p:grpSpPr>
+      <p:sp>
+        <p:nvSpPr>
+          <p:cNvPr id="2" name="Title 1"/>
+          <p:cNvSpPr>
+            <a:spLocks noGrp="1"/>
+          </p:cNvSpPr>
+          <p:nvPr>
+            <p:ph type="title"/>
+          </p:nvPr>
+        </p:nvSpPr>
         <p:spPr>
           <a:xfrm>
             <a:off x="851902" y="2754283"/>
@@ -9342,11 +9379,11 @@
           <a:p>
             <a:pPr algn="ctr"/>
             <a:r>
-              <a:rPr lang="en-US" dirty="0" smtClean="0"/>
+              <a:rPr lang="en-US" dirty="0"/>
               <a:t>MUL</a:t>
             </a:r>
             <a:r>
-              <a:rPr lang="ro-RO" dirty="0" smtClean="0"/>
+              <a:rPr lang="ro-RO" dirty="0"/>
               <a:t>ȚUMIM PENTRU ATENȚIE</a:t>
             </a:r>
             <a:r>
@@ -9402,7 +9439,7 @@
           <a:lstStyle/>
           <a:p>
             <a:r>
-              <a:rPr lang="ro-RO" dirty="0" smtClean="0"/>
+              <a:rPr lang="ro-RO" dirty="0"/>
               <a:t>SUBIECTELE PREZENTĂRII</a:t>
             </a:r>
             <a:endParaRPr lang="en-US" dirty="0"/>
@@ -9425,54 +9462,54 @@
           <a:lstStyle/>
           <a:p>
             <a:r>
-              <a:rPr lang="ro-RO" dirty="0" smtClean="0"/>
+              <a:rPr lang="ro-RO" dirty="0"/>
               <a:t>PROBLEMA EXISTENTĂ</a:t>
             </a:r>
           </a:p>
           <a:p>
-            <a:endParaRPr lang="ro-RO" dirty="0" smtClean="0"/>
-          </a:p>
-          <a:p>
-            <a:r>
-              <a:rPr lang="ro-RO" dirty="0" smtClean="0"/>
+            <a:endParaRPr lang="ro-RO" dirty="0"/>
+          </a:p>
+          <a:p>
+            <a:r>
+              <a:rPr lang="ro-RO" dirty="0"/>
               <a:t>SOLUȚIA PROPUSĂ</a:t>
             </a:r>
           </a:p>
           <a:p>
-            <a:endParaRPr lang="ro-RO" dirty="0" smtClean="0"/>
-          </a:p>
-          <a:p>
-            <a:r>
-              <a:rPr lang="ro-RO" dirty="0" smtClean="0"/>
+            <a:endParaRPr lang="ro-RO" dirty="0"/>
+          </a:p>
+          <a:p>
+            <a:r>
+              <a:rPr lang="ro-RO" dirty="0"/>
               <a:t>SOLUȚII EXISTENTE</a:t>
             </a:r>
           </a:p>
           <a:p>
-            <a:endParaRPr lang="ro-RO" dirty="0" smtClean="0"/>
-          </a:p>
-          <a:p>
-            <a:r>
-              <a:rPr lang="ro-RO" dirty="0" smtClean="0"/>
+            <a:endParaRPr lang="ro-RO" dirty="0"/>
+          </a:p>
+          <a:p>
+            <a:r>
+              <a:rPr lang="ro-RO" dirty="0"/>
               <a:t>ETAPE VIITOARE</a:t>
             </a:r>
           </a:p>
           <a:p>
-            <a:endParaRPr lang="ro-RO" dirty="0" smtClean="0"/>
-          </a:p>
-          <a:p>
-            <a:r>
-              <a:rPr lang="ro-RO" dirty="0" smtClean="0"/>
+            <a:endParaRPr lang="ro-RO" dirty="0"/>
+          </a:p>
+          <a:p>
+            <a:r>
+              <a:rPr lang="ro-RO" dirty="0"/>
               <a:t>Q</a:t>
             </a:r>
             <a:r>
-              <a:rPr lang="ro-RO" dirty="0" smtClean="0">
+              <a:rPr lang="ro-RO" dirty="0">
                 <a:latin typeface="Arial" panose="020B0604020202020204" pitchFamily="34" charset="0"/>
                 <a:cs typeface="Arial" panose="020B0604020202020204" pitchFamily="34" charset="0"/>
               </a:rPr>
               <a:t>&amp;</a:t>
             </a:r>
             <a:r>
-              <a:rPr lang="ro-RO" dirty="0" smtClean="0"/>
+              <a:rPr lang="ro-RO" dirty="0"/>
               <a:t>A</a:t>
             </a:r>
           </a:p>
@@ -9525,11 +9562,7 @@
           <a:p>
             <a:r>
               <a:rPr lang="ro-RO" dirty="0"/>
-              <a:t>PROBLEMA </a:t>
-            </a:r>
-            <a:r>
-              <a:rPr lang="ro-RO" dirty="0" smtClean="0"/>
-              <a:t>EXISTENTĂ</a:t>
+              <a:t>PROBLEMA EXISTENTĂ</a:t>
             </a:r>
             <a:endParaRPr lang="en-US" dirty="0"/>
           </a:p>
@@ -9551,25 +9584,25 @@
           <a:lstStyle/>
           <a:p>
             <a:r>
-              <a:rPr lang="ro-RO" dirty="0" smtClean="0"/>
+              <a:rPr lang="ro-RO" dirty="0"/>
               <a:t>Dispozitivele de captare a imaginilor sunt limitate din punct de vedere al densității senzorilor. Un număr mai mare de sonzori implică un cost mărit.</a:t>
             </a:r>
           </a:p>
           <a:p>
-            <a:endParaRPr lang="ro-RO" dirty="0" smtClean="0"/>
-          </a:p>
-          <a:p>
-            <a:r>
-              <a:rPr lang="ro-RO" dirty="0" smtClean="0"/>
+            <a:endParaRPr lang="ro-RO" dirty="0"/>
+          </a:p>
+          <a:p>
+            <a:r>
+              <a:rPr lang="ro-RO" dirty="0"/>
               <a:t>Rezoluția spațială este limitată de senzori</a:t>
             </a:r>
           </a:p>
           <a:p>
-            <a:endParaRPr lang="ro-RO" dirty="0" smtClean="0"/>
-          </a:p>
-          <a:p>
-            <a:r>
-              <a:rPr lang="ro-RO" dirty="0" smtClean="0"/>
+            <a:endParaRPr lang="ro-RO" dirty="0"/>
+          </a:p>
+          <a:p>
+            <a:r>
+              <a:rPr lang="ro-RO" dirty="0"/>
               <a:t>Detallile imaginii(banda de frecvență înaltă) este limitată de lentile, PSF (blurr) și mișcare.</a:t>
             </a:r>
           </a:p>
@@ -9625,11 +9658,7 @@
           <a:p>
             <a:r>
               <a:rPr lang="ro-RO" dirty="0"/>
-              <a:t>PROBLEMA </a:t>
-            </a:r>
-            <a:r>
-              <a:rPr lang="ro-RO" dirty="0" smtClean="0"/>
-              <a:t>EXISTENTĂ</a:t>
+              <a:t>PROBLEMA EXISTENTĂ</a:t>
             </a:r>
             <a:endParaRPr lang="en-US" dirty="0"/>
           </a:p>
@@ -9711,11 +9740,7 @@
           <a:p>
             <a:r>
               <a:rPr lang="ro-RO" dirty="0"/>
-              <a:t>PROBLEMA </a:t>
-            </a:r>
-            <a:r>
-              <a:rPr lang="ro-RO" dirty="0" smtClean="0"/>
-              <a:t>EXISTENTĂ</a:t>
+              <a:t>PROBLEMA EXISTENTĂ</a:t>
             </a:r>
             <a:endParaRPr lang="en-US" dirty="0"/>
           </a:p>
@@ -9797,11 +9822,7 @@
           <a:p>
             <a:r>
               <a:rPr lang="ro-RO" dirty="0"/>
-              <a:t>SOLUȚIA </a:t>
-            </a:r>
-            <a:r>
-              <a:rPr lang="ro-RO" dirty="0" smtClean="0"/>
-              <a:t>PROPUSĂ</a:t>
+              <a:t>SOLUȚIA PROPUSĂ</a:t>
             </a:r>
             <a:endParaRPr lang="en-US" dirty="0"/>
           </a:p>
@@ -9828,9 +9849,116 @@
           <a:lstStyle/>
           <a:p>
             <a:r>
-              <a:rPr lang="ro-RO" dirty="0" smtClean="0"/>
-              <a:t>Super-rezolutia reprezintă conceptul de construire a unei imaginii de rezoluție ridicată dintr-un set de imagini cu o rezoluție mai mică</a:t>
-            </a:r>
+              <a:rPr lang="ro-RO" sz="1200" dirty="0"/>
+              <a:t>Super-rezolutia reprezintă conceptul de construire a unei imaginii de rezoluție ridicată dintr-un set de imagini cu o rezoluție mai mica</a:t>
+            </a:r>
+            <a:r>
+              <a:rPr lang="en-US" sz="1200" dirty="0"/>
+              <a:t>.</a:t>
+            </a:r>
+          </a:p>
+          <a:p>
+            <a:r>
+              <a:rPr lang="en-US" sz="1200" dirty="0"/>
+              <a:t>Ne </a:t>
+            </a:r>
+            <a:r>
+              <a:rPr lang="en-US" sz="1200" dirty="0" err="1"/>
+              <a:t>propunem</a:t>
+            </a:r>
+            <a:r>
+              <a:rPr lang="en-US" sz="1200" dirty="0"/>
+              <a:t> </a:t>
+            </a:r>
+            <a:r>
+              <a:rPr lang="en-US" sz="1200" dirty="0" err="1"/>
+              <a:t>inversarea</a:t>
+            </a:r>
+            <a:r>
+              <a:rPr lang="en-US" sz="1200" dirty="0"/>
+              <a:t> </a:t>
+            </a:r>
+            <a:r>
+              <a:rPr lang="en-US" sz="1200" dirty="0" err="1"/>
+              <a:t>procesului</a:t>
+            </a:r>
+            <a:r>
+              <a:rPr lang="en-US" sz="1200" dirty="0"/>
+              <a:t> de </a:t>
+            </a:r>
+            <a:r>
+              <a:rPr lang="en-US" sz="1200" dirty="0" err="1"/>
+              <a:t>capturare</a:t>
+            </a:r>
+            <a:r>
+              <a:rPr lang="en-US" sz="1200" dirty="0"/>
+              <a:t> al </a:t>
+            </a:r>
+            <a:r>
+              <a:rPr lang="en-US" sz="1200" dirty="0" err="1"/>
+              <a:t>imagini</a:t>
+            </a:r>
+            <a:r>
+              <a:rPr lang="en-US" sz="1200" dirty="0"/>
+              <a:t> </a:t>
+            </a:r>
+            <a:r>
+              <a:rPr lang="en-US" sz="1200" dirty="0" err="1"/>
+              <a:t>ce</a:t>
+            </a:r>
+            <a:r>
+              <a:rPr lang="en-US" sz="1200" dirty="0"/>
+              <a:t> </a:t>
+            </a:r>
+            <a:r>
+              <a:rPr lang="en-US" sz="1200" dirty="0" err="1"/>
+              <a:t>este</a:t>
+            </a:r>
+            <a:r>
+              <a:rPr lang="en-US" sz="1200" dirty="0"/>
+              <a:t> </a:t>
+            </a:r>
+            <a:r>
+              <a:rPr lang="en-US" sz="1200" dirty="0" err="1"/>
+              <a:t>aplicat</a:t>
+            </a:r>
+            <a:r>
+              <a:rPr lang="en-US" sz="1200" dirty="0"/>
+              <a:t> </a:t>
+            </a:r>
+            <a:r>
+              <a:rPr lang="en-US" sz="1200" dirty="0" err="1"/>
+              <a:t>unei</a:t>
+            </a:r>
+            <a:r>
+              <a:rPr lang="en-US" sz="1200" dirty="0"/>
+              <a:t> </a:t>
+            </a:r>
+            <a:r>
+              <a:rPr lang="en-US" sz="1200" dirty="0" err="1"/>
+              <a:t>imagini</a:t>
+            </a:r>
+            <a:r>
+              <a:rPr lang="en-US" sz="1200" dirty="0"/>
+              <a:t> de </a:t>
+            </a:r>
+            <a:r>
+              <a:rPr lang="en-US" sz="1200" dirty="0" err="1"/>
+              <a:t>rezolutie</a:t>
+            </a:r>
+            <a:r>
+              <a:rPr lang="en-US" sz="1200" dirty="0"/>
+              <a:t> </a:t>
+            </a:r>
+            <a:r>
+              <a:rPr lang="en-US" sz="1200" dirty="0" err="1"/>
+              <a:t>inalta</a:t>
+            </a:r>
+            <a:r>
+              <a:rPr lang="en-US" sz="1200" dirty="0"/>
+              <a:t>.</a:t>
+            </a:r>
+            <a:endParaRPr lang="ro-RO" sz="1200" dirty="0"/>
           </a:p>
           <a:p>
             <a:endParaRPr lang="ro-RO" dirty="0"/>
@@ -9862,8 +9990,44 @@
         </p:blipFill>
         <p:spPr>
           <a:xfrm>
-            <a:off x="4208206" y="1930400"/>
-            <a:ext cx="4613509" cy="3701941"/>
+            <a:off x="4689863" y="1387446"/>
+            <a:ext cx="3769724" cy="3024877"/>
+          </a:xfrm>
+          <a:prstGeom prst="rect">
+            <a:avLst/>
+          </a:prstGeom>
+        </p:spPr>
+      </p:pic>
+      <p:pic>
+        <p:nvPicPr>
+          <p:cNvPr id="6" name="Picture 5">
+            <a:extLst>
+              <a:ext uri="{FF2B5EF4-FFF2-40B4-BE49-F238E27FC236}">
+                <a16:creationId xmlns:a16="http://schemas.microsoft.com/office/drawing/2014/main" id="{95C3ED69-E001-486D-AF0B-AB36CE38AE96}"/>
+              </a:ext>
+            </a:extLst>
+          </p:cNvPr>
+          <p:cNvPicPr>
+            <a:picLocks noChangeAspect="1"/>
+          </p:cNvPicPr>
+          <p:nvPr/>
+        </p:nvPicPr>
+        <p:blipFill>
+          <a:blip r:embed="rId3">
+            <a:extLst>
+              <a:ext uri="{28A0092B-C50C-407E-A947-70E740481C1C}">
+                <a14:useLocalDpi xmlns:a14="http://schemas.microsoft.com/office/drawing/2010/main" val="0"/>
+              </a:ext>
+            </a:extLst>
+          </a:blip>
+          <a:stretch>
+            <a:fillRect/>
+          </a:stretch>
+        </p:blipFill>
+        <p:spPr>
+          <a:xfrm>
+            <a:off x="1472639" y="4544530"/>
+            <a:ext cx="7025669" cy="1496832"/>
           </a:xfrm>
           <a:prstGeom prst="rect">
             <a:avLst/>
@@ -9935,17 +10099,510 @@
         </p:nvSpPr>
         <p:spPr/>
         <p:txBody>
-          <a:bodyPr/>
+          <a:bodyPr>
+            <a:normAutofit/>
+          </a:bodyPr>
           <a:lstStyle/>
           <a:p>
             <a:r>
-              <a:rPr lang="ro-RO" dirty="0" smtClean="0"/>
+              <a:rPr lang="en-US" dirty="0"/>
+              <a:t>Ne </a:t>
+            </a:r>
+            <a:r>
+              <a:rPr lang="en-US" dirty="0" err="1"/>
+              <a:t>propunem</a:t>
+            </a:r>
+            <a:r>
+              <a:rPr lang="en-US" dirty="0"/>
+              <a:t> </a:t>
+            </a:r>
+            <a:r>
+              <a:rPr lang="en-US" dirty="0" err="1"/>
+              <a:t>atingerea</a:t>
+            </a:r>
+            <a:r>
+              <a:rPr lang="en-US" dirty="0"/>
+              <a:t> </a:t>
+            </a:r>
+            <a:r>
+              <a:rPr lang="en-US" dirty="0" err="1"/>
+              <a:t>spuer-rezolutiei</a:t>
+            </a:r>
+            <a:r>
+              <a:rPr lang="en-US" dirty="0"/>
+              <a:t> </a:t>
+            </a:r>
+            <a:r>
+              <a:rPr lang="en-US" dirty="0" err="1"/>
+              <a:t>pentru</a:t>
+            </a:r>
+            <a:r>
+              <a:rPr lang="en-US" dirty="0"/>
+              <a:t> o </a:t>
+            </a:r>
+            <a:r>
+              <a:rPr lang="en-US" dirty="0" err="1"/>
+              <a:t>serie</a:t>
+            </a:r>
+            <a:r>
+              <a:rPr lang="en-US" dirty="0"/>
+              <a:t> de </a:t>
+            </a:r>
+            <a:r>
+              <a:rPr lang="en-US" dirty="0" err="1"/>
+              <a:t>imagini</a:t>
+            </a:r>
+            <a:r>
+              <a:rPr lang="en-US" dirty="0"/>
+              <a:t> </a:t>
+            </a:r>
+            <a:r>
+              <a:rPr lang="en-US" dirty="0" err="1"/>
+              <a:t>capturate</a:t>
+            </a:r>
+            <a:r>
+              <a:rPr lang="en-US" dirty="0"/>
+              <a:t> video </a:t>
+            </a:r>
+            <a:r>
+              <a:rPr lang="en-US" dirty="0" err="1"/>
+              <a:t>prin</a:t>
+            </a:r>
+            <a:r>
+              <a:rPr lang="en-US" dirty="0"/>
+              <a:t> </a:t>
+            </a:r>
+            <a:r>
+              <a:rPr lang="en-US" dirty="0" err="1"/>
+              <a:t>metoda</a:t>
+            </a:r>
+            <a:r>
+              <a:rPr lang="en-US" dirty="0"/>
+              <a:t> </a:t>
+            </a:r>
+            <a:r>
+              <a:rPr lang="ro-RO" sz="1800" b="1" i="0" u="none" strike="noStrike" baseline="0" dirty="0">
+                <a:latin typeface="BookAntiqua-Bold"/>
+              </a:rPr>
+              <a:t>Bilateral TV-L1 (BTVL1)</a:t>
+            </a:r>
+            <a:r>
+              <a:rPr lang="en-US" sz="1800" b="1" i="0" u="none" strike="noStrike" baseline="0" dirty="0">
+                <a:latin typeface="BookAntiqua-Bold"/>
+              </a:rPr>
+              <a:t> </a:t>
+            </a:r>
+            <a:r>
+              <a:rPr lang="en-US" sz="1800" i="0" u="none" strike="noStrike" baseline="0" dirty="0" err="1">
+                <a:latin typeface="BookAntiqua-Bold"/>
+              </a:rPr>
+              <a:t>ce</a:t>
+            </a:r>
+            <a:r>
+              <a:rPr lang="en-US" sz="1800" i="0" u="none" strike="noStrike" baseline="0" dirty="0">
+                <a:latin typeface="BookAntiqua-Bold"/>
+              </a:rPr>
+              <a:t> </a:t>
+            </a:r>
+            <a:r>
+              <a:rPr lang="en-US" sz="1800" i="0" u="none" strike="noStrike" baseline="0" dirty="0" err="1">
+                <a:latin typeface="BookAntiqua-Bold"/>
+              </a:rPr>
+              <a:t>incearca</a:t>
+            </a:r>
+            <a:r>
+              <a:rPr lang="en-US" sz="1800" i="0" u="none" strike="noStrike" baseline="0" dirty="0">
+                <a:latin typeface="BookAntiqua-Bold"/>
+              </a:rPr>
+              <a:t> </a:t>
+            </a:r>
+            <a:r>
+              <a:rPr lang="en-US" sz="1800" i="0" u="none" strike="noStrike" baseline="0" dirty="0" err="1">
+                <a:latin typeface="BookAntiqua-Bold"/>
+              </a:rPr>
+              <a:t>sa</a:t>
+            </a:r>
+            <a:r>
+              <a:rPr lang="en-US" sz="1800" i="0" u="none" strike="noStrike" baseline="0" dirty="0">
+                <a:latin typeface="BookAntiqua-Bold"/>
+              </a:rPr>
+              <a:t> </a:t>
+            </a:r>
+            <a:r>
+              <a:rPr lang="en-US" sz="1800" i="0" u="none" strike="noStrike" baseline="0" dirty="0" err="1">
+                <a:latin typeface="BookAntiqua-Bold"/>
+              </a:rPr>
+              <a:t>aproximeze</a:t>
+            </a:r>
+            <a:r>
+              <a:rPr lang="en-US" sz="1800" i="0" u="none" strike="noStrike" baseline="0" dirty="0">
+                <a:latin typeface="BookAntiqua-Bold"/>
+              </a:rPr>
+              <a:t> </a:t>
+            </a:r>
+            <a:r>
+              <a:rPr lang="en-US" sz="1800" i="0" u="none" strike="noStrike" baseline="0" dirty="0" err="1">
+                <a:latin typeface="BookAntiqua-Bold"/>
+              </a:rPr>
+              <a:t>miscarea</a:t>
+            </a:r>
+            <a:r>
+              <a:rPr lang="en-US" sz="1800" i="0" u="none" strike="noStrike" baseline="0" dirty="0">
+                <a:latin typeface="BookAntiqua-Bold"/>
+              </a:rPr>
+              <a:t> </a:t>
+            </a:r>
+            <a:r>
+              <a:rPr lang="en-US" sz="1800" i="0" u="none" strike="noStrike" baseline="0" dirty="0" err="1">
+                <a:latin typeface="BookAntiqua-Bold"/>
+              </a:rPr>
+              <a:t>obiectelor</a:t>
+            </a:r>
+            <a:r>
+              <a:rPr lang="en-US" sz="1800" i="0" u="none" strike="noStrike" baseline="0" dirty="0">
+                <a:latin typeface="BookAntiqua-Bold"/>
+              </a:rPr>
+              <a:t> in scena </a:t>
+            </a:r>
+            <a:r>
+              <a:rPr lang="en-US" sz="1800" i="0" u="none" strike="noStrike" baseline="0" dirty="0" err="1">
+                <a:latin typeface="BookAntiqua-Bold"/>
+              </a:rPr>
+              <a:t>si</a:t>
+            </a:r>
+            <a:r>
+              <a:rPr lang="en-US" sz="1800" i="0" u="none" strike="noStrike" baseline="0" dirty="0">
+                <a:latin typeface="BookAntiqua-Bold"/>
+              </a:rPr>
+              <a:t> pe </a:t>
+            </a:r>
+            <a:r>
+              <a:rPr lang="en-US" sz="1800" i="0" u="none" strike="noStrike" baseline="0" dirty="0" err="1">
+                <a:latin typeface="BookAntiqua-Bold"/>
+              </a:rPr>
+              <a:t>baza</a:t>
+            </a:r>
+            <a:r>
+              <a:rPr lang="en-US" sz="1800" i="0" u="none" strike="noStrike" baseline="0" dirty="0">
+                <a:latin typeface="BookAntiqua-Bold"/>
+              </a:rPr>
+              <a:t> </a:t>
+            </a:r>
+            <a:r>
+              <a:rPr lang="en-US" sz="1800" i="0" u="none" strike="noStrike" baseline="0" dirty="0" err="1">
+                <a:latin typeface="BookAntiqua-Bold"/>
+              </a:rPr>
+              <a:t>acestor</a:t>
+            </a:r>
+            <a:r>
+              <a:rPr lang="en-US" sz="1800" i="0" u="none" strike="noStrike" baseline="0" dirty="0">
+                <a:latin typeface="BookAntiqua-Bold"/>
+              </a:rPr>
+              <a:t> </a:t>
+            </a:r>
+            <a:r>
+              <a:rPr lang="en-US" sz="1800" i="0" u="none" strike="noStrike" baseline="0" dirty="0" err="1">
+                <a:latin typeface="BookAntiqua-Bold"/>
+              </a:rPr>
+              <a:t>miscari</a:t>
+            </a:r>
+            <a:r>
+              <a:rPr lang="en-US" sz="1800" i="0" u="none" strike="noStrike" baseline="0" dirty="0">
+                <a:latin typeface="BookAntiqua-Bold"/>
+              </a:rPr>
+              <a:t> </a:t>
+            </a:r>
+            <a:r>
+              <a:rPr lang="en-US" sz="1800" i="0" u="none" strike="noStrike" baseline="0" dirty="0" err="1">
+                <a:latin typeface="BookAntiqua-Bold"/>
+              </a:rPr>
+              <a:t>sa</a:t>
+            </a:r>
+            <a:r>
+              <a:rPr lang="en-US" sz="1800" i="0" u="none" strike="noStrike" baseline="0" dirty="0">
+                <a:latin typeface="BookAntiqua-Bold"/>
+              </a:rPr>
+              <a:t> </a:t>
+            </a:r>
+            <a:r>
+              <a:rPr lang="en-US" sz="1800" i="0" u="none" strike="noStrike" baseline="0" dirty="0" err="1">
+                <a:latin typeface="BookAntiqua-Bold"/>
+              </a:rPr>
+              <a:t>obtina</a:t>
+            </a:r>
+            <a:r>
+              <a:rPr lang="en-US" sz="1800" i="0" u="none" strike="noStrike" baseline="0" dirty="0">
+                <a:latin typeface="BookAntiqua-Bold"/>
+              </a:rPr>
+              <a:t> </a:t>
+            </a:r>
+            <a:r>
+              <a:rPr lang="en-US" sz="1800" i="0" u="none" strike="noStrike" baseline="0" dirty="0" err="1">
+                <a:latin typeface="BookAntiqua-Bold"/>
+              </a:rPr>
+              <a:t>informatii</a:t>
+            </a:r>
+            <a:r>
+              <a:rPr lang="en-US" sz="1800" i="0" u="none" strike="noStrike" baseline="0" dirty="0">
+                <a:latin typeface="BookAntiqua-Bold"/>
+              </a:rPr>
+              <a:t> </a:t>
+            </a:r>
+            <a:r>
+              <a:rPr lang="en-US" sz="1800" i="0" u="none" strike="noStrike" baseline="0" dirty="0" err="1">
+                <a:latin typeface="BookAntiqua-Bold"/>
+              </a:rPr>
+              <a:t>noi</a:t>
+            </a:r>
+            <a:r>
+              <a:rPr lang="en-US" sz="1800" i="0" u="none" strike="noStrike" baseline="0" dirty="0">
+                <a:latin typeface="BookAntiqua-Bold"/>
+              </a:rPr>
+              <a:t> </a:t>
+            </a:r>
+            <a:r>
+              <a:rPr lang="en-US" sz="1800" i="0" u="none" strike="noStrike" baseline="0" dirty="0" err="1">
+                <a:latin typeface="BookAntiqua-Bold"/>
+              </a:rPr>
+              <a:t>ce</a:t>
+            </a:r>
+            <a:r>
+              <a:rPr lang="en-US" sz="1800" i="0" u="none" strike="noStrike" baseline="0" dirty="0">
+                <a:latin typeface="BookAntiqua-Bold"/>
+              </a:rPr>
+              <a:t> </a:t>
+            </a:r>
+            <a:r>
+              <a:rPr lang="en-US" sz="1800" i="0" u="none" strike="noStrike" baseline="0" dirty="0" err="1">
+                <a:latin typeface="BookAntiqua-Bold"/>
+              </a:rPr>
+              <a:t>ajuta</a:t>
+            </a:r>
+            <a:r>
+              <a:rPr lang="en-US" sz="1800" i="0" u="none" strike="noStrike" baseline="0" dirty="0">
+                <a:latin typeface="BookAntiqua-Bold"/>
+              </a:rPr>
+              <a:t> la </a:t>
+            </a:r>
+            <a:r>
+              <a:rPr lang="en-US" sz="1800" i="0" u="none" strike="noStrike" baseline="0" dirty="0" err="1">
+                <a:latin typeface="BookAntiqua-Bold"/>
+              </a:rPr>
+              <a:t>reconstructia</a:t>
+            </a:r>
+            <a:r>
+              <a:rPr lang="en-US" sz="1800" i="0" u="none" strike="noStrike" baseline="0" dirty="0">
+                <a:latin typeface="BookAntiqua-Bold"/>
+              </a:rPr>
+              <a:t> </a:t>
+            </a:r>
+            <a:r>
+              <a:rPr lang="en-US" sz="1800" i="0" u="none" strike="noStrike" baseline="0" dirty="0" err="1">
+                <a:latin typeface="BookAntiqua-Bold"/>
+              </a:rPr>
+              <a:t>mai</a:t>
+            </a:r>
+            <a:r>
+              <a:rPr lang="en-US" sz="1800" i="0" u="none" strike="noStrike" baseline="0" dirty="0">
+                <a:latin typeface="BookAntiqua-Bold"/>
+              </a:rPr>
+              <a:t> </a:t>
+            </a:r>
+            <a:r>
+              <a:rPr lang="en-US" sz="1800" i="0" u="none" strike="noStrike" baseline="0" dirty="0" err="1">
+                <a:latin typeface="BookAntiqua-Bold"/>
+              </a:rPr>
+              <a:t>fidela</a:t>
+            </a:r>
+            <a:r>
+              <a:rPr lang="en-US" sz="1800" i="0" u="none" strike="noStrike" baseline="0" dirty="0">
+                <a:latin typeface="BookAntiqua-Bold"/>
+              </a:rPr>
+              <a:t> a </a:t>
+            </a:r>
+            <a:r>
+              <a:rPr lang="en-US" sz="1800" i="0" u="none" strike="noStrike" baseline="0" dirty="0" err="1">
+                <a:latin typeface="BookAntiqua-Bold"/>
+              </a:rPr>
+              <a:t>imaginii</a:t>
+            </a:r>
+            <a:r>
+              <a:rPr lang="en-US" sz="1800" i="0" u="none" strike="noStrike" baseline="0" dirty="0">
+                <a:latin typeface="BookAntiqua-Bold"/>
+              </a:rPr>
+              <a:t> high-</a:t>
+            </a:r>
+            <a:r>
+              <a:rPr lang="en-US" sz="1800" i="0" u="none" strike="noStrike" baseline="0" dirty="0" err="1">
+                <a:latin typeface="BookAntiqua-Bold"/>
+              </a:rPr>
+              <a:t>rez</a:t>
+            </a:r>
+            <a:r>
+              <a:rPr lang="en-US" sz="1800" i="0" u="none" strike="noStrike" baseline="0" dirty="0">
+                <a:latin typeface="BookAntiqua-Bold"/>
+              </a:rPr>
+              <a:t>.</a:t>
+            </a:r>
+            <a:endParaRPr lang="en-US" dirty="0"/>
+          </a:p>
+          <a:p>
+            <a:endParaRPr lang="en-US" dirty="0"/>
+          </a:p>
+          <a:p>
+            <a:pPr marL="0" indent="0">
+              <a:buNone/>
+            </a:pPr>
+            <a:endParaRPr lang="en-US" dirty="0"/>
+          </a:p>
+          <a:p>
+            <a:r>
+              <a:rPr lang="ro-RO" dirty="0"/>
               <a:t>TODO</a:t>
             </a:r>
             <a:r>
-              <a:rPr lang="en-US" dirty="0" smtClean="0"/>
+              <a:rPr lang="en-US" dirty="0"/>
               <a:t>: ADD BEYOND STATE OF THE ART</a:t>
             </a:r>
+          </a:p>
+          <a:p>
+            <a:r>
+              <a:rPr lang="en-US" dirty="0" err="1"/>
+              <a:t>Metoda</a:t>
+            </a:r>
+            <a:r>
+              <a:rPr lang="en-US" dirty="0"/>
+              <a:t> </a:t>
+            </a:r>
+            <a:r>
+              <a:rPr lang="en-US" dirty="0" err="1"/>
+              <a:t>este</a:t>
+            </a:r>
+            <a:r>
+              <a:rPr lang="en-US" dirty="0"/>
+              <a:t> </a:t>
+            </a:r>
+            <a:r>
+              <a:rPr lang="en-US" dirty="0" err="1"/>
+              <a:t>destul</a:t>
+            </a:r>
+            <a:r>
+              <a:rPr lang="en-US" dirty="0"/>
+              <a:t> de </a:t>
+            </a:r>
+            <a:r>
+              <a:rPr lang="en-US" dirty="0" err="1"/>
+              <a:t>inceata</a:t>
+            </a:r>
+            <a:r>
+              <a:rPr lang="en-US" dirty="0"/>
+              <a:t> -&gt; </a:t>
+            </a:r>
+            <a:r>
+              <a:rPr lang="en-US" dirty="0" err="1"/>
+              <a:t>marirea</a:t>
+            </a:r>
+            <a:r>
+              <a:rPr lang="en-US" dirty="0"/>
+              <a:t> </a:t>
+            </a:r>
+            <a:r>
+              <a:rPr lang="en-US" dirty="0" err="1"/>
+              <a:t>preformantei</a:t>
+            </a:r>
+            <a:r>
+              <a:rPr lang="en-US" dirty="0"/>
+              <a:t> ?</a:t>
+            </a:r>
+          </a:p>
+          <a:p>
+            <a:r>
+              <a:rPr lang="en-US" dirty="0" err="1"/>
+              <a:t>Optimizai</a:t>
+            </a:r>
+            <a:r>
+              <a:rPr lang="en-US" dirty="0"/>
+              <a:t> in </a:t>
+            </a:r>
+            <a:r>
+              <a:rPr lang="en-US" dirty="0" err="1"/>
+              <a:t>functie</a:t>
+            </a:r>
+            <a:r>
+              <a:rPr lang="en-US" dirty="0"/>
+              <a:t> de scena? -&gt; scena </a:t>
+            </a:r>
+            <a:r>
+              <a:rPr lang="en-US" dirty="0" err="1"/>
+              <a:t>intens</a:t>
+            </a:r>
+            <a:r>
+              <a:rPr lang="en-US" dirty="0"/>
+              <a:t> </a:t>
+            </a:r>
+            <a:r>
+              <a:rPr lang="en-US" dirty="0" err="1"/>
+              <a:t>luminata</a:t>
+            </a:r>
+            <a:r>
+              <a:rPr lang="en-US" dirty="0"/>
+              <a:t>/scena </a:t>
+            </a:r>
+            <a:r>
+              <a:rPr lang="en-US" dirty="0" err="1"/>
+              <a:t>intunecata</a:t>
+            </a:r>
+            <a:r>
+              <a:rPr lang="en-US" dirty="0"/>
+              <a:t>?</a:t>
+            </a:r>
+          </a:p>
+          <a:p>
+            <a:r>
+              <a:rPr lang="en-US" dirty="0" err="1"/>
+              <a:t>Obtinerea</a:t>
+            </a:r>
+            <a:r>
+              <a:rPr lang="en-US" dirty="0"/>
+              <a:t> </a:t>
+            </a:r>
+            <a:r>
+              <a:rPr lang="en-US" dirty="0" err="1"/>
+              <a:t>unei</a:t>
+            </a:r>
+            <a:r>
+              <a:rPr lang="en-US" dirty="0"/>
+              <a:t> </a:t>
+            </a:r>
+            <a:r>
+              <a:rPr lang="en-US" dirty="0" err="1"/>
+              <a:t>calitati</a:t>
+            </a:r>
+            <a:r>
+              <a:rPr lang="en-US" dirty="0"/>
+              <a:t> </a:t>
+            </a:r>
+            <a:r>
+              <a:rPr lang="en-US" dirty="0" err="1"/>
+              <a:t>mai</a:t>
+            </a:r>
+            <a:r>
+              <a:rPr lang="en-US" dirty="0"/>
+              <a:t> </a:t>
+            </a:r>
+            <a:r>
+              <a:rPr lang="en-US" dirty="0" err="1"/>
+              <a:t>bune</a:t>
+            </a:r>
+            <a:r>
+              <a:rPr lang="en-US" dirty="0"/>
+              <a:t> ?</a:t>
+            </a:r>
+          </a:p>
+          <a:p>
+            <a:endParaRPr lang="en-US" dirty="0"/>
+          </a:p>
+          <a:p>
             <a:endParaRPr lang="en-US" dirty="0"/>
           </a:p>
         </p:txBody>
@@ -9982,7 +10639,13 @@
       </p:grpSpPr>
       <p:sp>
         <p:nvSpPr>
-          <p:cNvPr id="2" name="Title 1"/>
+          <p:cNvPr id="2" name="Title 1">
+            <a:extLst>
+              <a:ext uri="{FF2B5EF4-FFF2-40B4-BE49-F238E27FC236}">
+                <a16:creationId xmlns:a16="http://schemas.microsoft.com/office/drawing/2014/main" id="{E6798D75-C5F1-4671-B871-1796B18A8D51}"/>
+              </a:ext>
+            </a:extLst>
+          </p:cNvPr>
           <p:cNvSpPr>
             <a:spLocks noGrp="1"/>
           </p:cNvSpPr>
@@ -9996,47 +10659,738 @@
           <a:lstStyle/>
           <a:p>
             <a:r>
-              <a:rPr lang="ro-RO" dirty="0"/>
-              <a:t>SOLUȚII </a:t>
-            </a:r>
-            <a:r>
-              <a:rPr lang="ro-RO" dirty="0" smtClean="0"/>
-              <a:t>EXISTENTE</a:t>
-            </a:r>
-            <a:endParaRPr lang="en-US" dirty="0"/>
-          </a:p>
-        </p:txBody>
-      </p:sp>
-      <p:sp>
-        <p:nvSpPr>
-          <p:cNvPr id="3" name="Content Placeholder 2"/>
-          <p:cNvSpPr>
-            <a:spLocks noGrp="1"/>
-          </p:cNvSpPr>
+              <a:rPr lang="en-US" dirty="0"/>
+              <a:t>Solutia </a:t>
+            </a:r>
+            <a:r>
+              <a:rPr lang="en-US" dirty="0" err="1"/>
+              <a:t>Propusa</a:t>
+            </a:r>
+            <a:r>
+              <a:rPr lang="en-US" dirty="0"/>
+              <a:t> 2</a:t>
+            </a:r>
+            <a:endParaRPr lang="ro-RO" dirty="0"/>
+          </a:p>
+        </p:txBody>
+      </p:sp>
+      <p:pic>
+        <p:nvPicPr>
+          <p:cNvPr id="5" name="Content Placeholder 4">
+            <a:extLst>
+              <a:ext uri="{FF2B5EF4-FFF2-40B4-BE49-F238E27FC236}">
+                <a16:creationId xmlns:a16="http://schemas.microsoft.com/office/drawing/2014/main" id="{13B2532B-4C1B-47AE-837B-17F8A7351C03}"/>
+              </a:ext>
+            </a:extLst>
+          </p:cNvPr>
+          <p:cNvPicPr>
+            <a:picLocks noGrp="1" noChangeAspect="1"/>
+          </p:cNvPicPr>
           <p:nvPr>
             <p:ph idx="1"/>
           </p:nvPr>
-        </p:nvSpPr>
-        <p:spPr/>
-        <p:txBody>
-          <a:bodyPr>
-            <a:normAutofit/>
+        </p:nvPicPr>
+        <p:blipFill>
+          <a:blip r:embed="rId2">
+            <a:extLst>
+              <a:ext uri="{28A0092B-C50C-407E-A947-70E740481C1C}">
+                <a14:useLocalDpi xmlns:a14="http://schemas.microsoft.com/office/drawing/2010/main" val="0"/>
+              </a:ext>
+            </a:extLst>
+          </a:blip>
+          <a:stretch>
+            <a:fillRect/>
+          </a:stretch>
+        </p:blipFill>
+        <p:spPr>
+          <a:xfrm>
+            <a:off x="1320838" y="4697413"/>
+            <a:ext cx="2309675" cy="1622143"/>
+          </a:xfrm>
+        </p:spPr>
+      </p:pic>
+      <p:pic>
+        <p:nvPicPr>
+          <p:cNvPr id="7" name="Picture 6">
+            <a:extLst>
+              <a:ext uri="{FF2B5EF4-FFF2-40B4-BE49-F238E27FC236}">
+                <a16:creationId xmlns:a16="http://schemas.microsoft.com/office/drawing/2014/main" id="{73548EED-8E46-4B3F-8EBE-AC24F7B2F97E}"/>
+              </a:ext>
+            </a:extLst>
+          </p:cNvPr>
+          <p:cNvPicPr>
+            <a:picLocks noChangeAspect="1"/>
+          </p:cNvPicPr>
+          <p:nvPr/>
+        </p:nvPicPr>
+        <p:blipFill>
+          <a:blip r:embed="rId3">
+            <a:extLst>
+              <a:ext uri="{28A0092B-C50C-407E-A947-70E740481C1C}">
+                <a14:useLocalDpi xmlns:a14="http://schemas.microsoft.com/office/drawing/2010/main" val="0"/>
+              </a:ext>
+            </a:extLst>
+          </a:blip>
+          <a:stretch>
+            <a:fillRect/>
+          </a:stretch>
+        </p:blipFill>
+        <p:spPr>
+          <a:xfrm>
+            <a:off x="476075" y="2074690"/>
+            <a:ext cx="916257" cy="910458"/>
+          </a:xfrm>
+          <a:prstGeom prst="rect">
+            <a:avLst/>
+          </a:prstGeom>
+        </p:spPr>
+      </p:pic>
+      <p:pic>
+        <p:nvPicPr>
+          <p:cNvPr id="9" name="Picture 8">
+            <a:extLst>
+              <a:ext uri="{FF2B5EF4-FFF2-40B4-BE49-F238E27FC236}">
+                <a16:creationId xmlns:a16="http://schemas.microsoft.com/office/drawing/2014/main" id="{87561A05-17C5-4D86-A517-C289818367BC}"/>
+              </a:ext>
+            </a:extLst>
+          </p:cNvPr>
+          <p:cNvPicPr>
+            <a:picLocks noChangeAspect="1"/>
+          </p:cNvPicPr>
+          <p:nvPr/>
+        </p:nvPicPr>
+        <p:blipFill>
+          <a:blip r:embed="rId3">
+            <a:extLst>
+              <a:ext uri="{28A0092B-C50C-407E-A947-70E740481C1C}">
+                <a14:useLocalDpi xmlns:a14="http://schemas.microsoft.com/office/drawing/2010/main" val="0"/>
+              </a:ext>
+            </a:extLst>
+          </a:blip>
+          <a:stretch>
+            <a:fillRect/>
+          </a:stretch>
+        </p:blipFill>
+        <p:spPr>
+          <a:xfrm>
+            <a:off x="1190382" y="2071192"/>
+            <a:ext cx="916258" cy="910459"/>
+          </a:xfrm>
+          <a:prstGeom prst="rect">
+            <a:avLst/>
+          </a:prstGeom>
+        </p:spPr>
+      </p:pic>
+      <p:pic>
+        <p:nvPicPr>
+          <p:cNvPr id="11" name="Picture 10">
+            <a:extLst>
+              <a:ext uri="{FF2B5EF4-FFF2-40B4-BE49-F238E27FC236}">
+                <a16:creationId xmlns:a16="http://schemas.microsoft.com/office/drawing/2014/main" id="{4DF55943-4209-4945-9F58-E320951BADE9}"/>
+              </a:ext>
+            </a:extLst>
+          </p:cNvPr>
+          <p:cNvPicPr>
+            <a:picLocks noChangeAspect="1"/>
+          </p:cNvPicPr>
+          <p:nvPr/>
+        </p:nvPicPr>
+        <p:blipFill>
+          <a:blip r:embed="rId3">
+            <a:extLst>
+              <a:ext uri="{28A0092B-C50C-407E-A947-70E740481C1C}">
+                <a14:useLocalDpi xmlns:a14="http://schemas.microsoft.com/office/drawing/2010/main" val="0"/>
+              </a:ext>
+            </a:extLst>
+          </a:blip>
+          <a:stretch>
+            <a:fillRect/>
+          </a:stretch>
+        </p:blipFill>
+        <p:spPr>
+          <a:xfrm>
+            <a:off x="476076" y="2680748"/>
+            <a:ext cx="916257" cy="910458"/>
+          </a:xfrm>
+          <a:prstGeom prst="rect">
+            <a:avLst/>
+          </a:prstGeom>
+        </p:spPr>
+      </p:pic>
+      <p:pic>
+        <p:nvPicPr>
+          <p:cNvPr id="13" name="Picture 12">
+            <a:extLst>
+              <a:ext uri="{FF2B5EF4-FFF2-40B4-BE49-F238E27FC236}">
+                <a16:creationId xmlns:a16="http://schemas.microsoft.com/office/drawing/2014/main" id="{663DAC3E-361E-4A9E-B334-1030FF370425}"/>
+              </a:ext>
+            </a:extLst>
+          </p:cNvPr>
+          <p:cNvPicPr>
+            <a:picLocks noChangeAspect="1"/>
+          </p:cNvPicPr>
+          <p:nvPr/>
+        </p:nvPicPr>
+        <p:blipFill>
+          <a:blip r:embed="rId3">
+            <a:extLst>
+              <a:ext uri="{28A0092B-C50C-407E-A947-70E740481C1C}">
+                <a14:useLocalDpi xmlns:a14="http://schemas.microsoft.com/office/drawing/2010/main" val="0"/>
+              </a:ext>
+            </a:extLst>
+          </a:blip>
+          <a:stretch>
+            <a:fillRect/>
+          </a:stretch>
+        </p:blipFill>
+        <p:spPr>
+          <a:xfrm>
+            <a:off x="1190383" y="2714644"/>
+            <a:ext cx="916257" cy="910458"/>
+          </a:xfrm>
+          <a:prstGeom prst="rect">
+            <a:avLst/>
+          </a:prstGeom>
+        </p:spPr>
+      </p:pic>
+      <p:pic>
+        <p:nvPicPr>
+          <p:cNvPr id="15" name="Picture 14">
+            <a:extLst>
+              <a:ext uri="{FF2B5EF4-FFF2-40B4-BE49-F238E27FC236}">
+                <a16:creationId xmlns:a16="http://schemas.microsoft.com/office/drawing/2014/main" id="{531EC16D-3256-45D9-B043-468E62180256}"/>
+              </a:ext>
+            </a:extLst>
+          </p:cNvPr>
+          <p:cNvPicPr>
+            <a:picLocks noChangeAspect="1"/>
+          </p:cNvPicPr>
+          <p:nvPr/>
+        </p:nvPicPr>
+        <p:blipFill>
+          <a:blip r:embed="rId4">
+            <a:extLst>
+              <a:ext uri="{28A0092B-C50C-407E-A947-70E740481C1C}">
+                <a14:useLocalDpi xmlns:a14="http://schemas.microsoft.com/office/drawing/2010/main" val="0"/>
+              </a:ext>
+            </a:extLst>
+          </a:blip>
+          <a:stretch>
+            <a:fillRect/>
+          </a:stretch>
+        </p:blipFill>
+        <p:spPr>
+          <a:xfrm>
+            <a:off x="3873120" y="1707143"/>
+            <a:ext cx="1320800" cy="1320800"/>
+          </a:xfrm>
+          <a:prstGeom prst="rect">
+            <a:avLst/>
+          </a:prstGeom>
+        </p:spPr>
+      </p:pic>
+      <p:pic>
+        <p:nvPicPr>
+          <p:cNvPr id="17" name="Picture 16">
+            <a:extLst>
+              <a:ext uri="{FF2B5EF4-FFF2-40B4-BE49-F238E27FC236}">
+                <a16:creationId xmlns:a16="http://schemas.microsoft.com/office/drawing/2014/main" id="{7A49586A-0192-4C5F-9F4C-3A39CC249D40}"/>
+              </a:ext>
+            </a:extLst>
+          </p:cNvPr>
+          <p:cNvPicPr>
+            <a:picLocks noChangeAspect="1"/>
+          </p:cNvPicPr>
+          <p:nvPr/>
+        </p:nvPicPr>
+        <p:blipFill>
+          <a:blip r:embed="rId4">
+            <a:extLst>
+              <a:ext uri="{28A0092B-C50C-407E-A947-70E740481C1C}">
+                <a14:useLocalDpi xmlns:a14="http://schemas.microsoft.com/office/drawing/2010/main" val="0"/>
+              </a:ext>
+            </a:extLst>
+          </a:blip>
+          <a:stretch>
+            <a:fillRect/>
+          </a:stretch>
+        </p:blipFill>
+        <p:spPr>
+          <a:xfrm>
+            <a:off x="4775200" y="1569814"/>
+            <a:ext cx="1320800" cy="1320800"/>
+          </a:xfrm>
+          <a:prstGeom prst="rect">
+            <a:avLst/>
+          </a:prstGeom>
+        </p:spPr>
+      </p:pic>
+      <p:pic>
+        <p:nvPicPr>
+          <p:cNvPr id="19" name="Picture 18">
+            <a:extLst>
+              <a:ext uri="{FF2B5EF4-FFF2-40B4-BE49-F238E27FC236}">
+                <a16:creationId xmlns:a16="http://schemas.microsoft.com/office/drawing/2014/main" id="{8532D309-EB88-4CAE-974D-DA5B4FB18BB6}"/>
+              </a:ext>
+            </a:extLst>
+          </p:cNvPr>
+          <p:cNvPicPr>
+            <a:picLocks noChangeAspect="1"/>
+          </p:cNvPicPr>
+          <p:nvPr/>
+        </p:nvPicPr>
+        <p:blipFill>
+          <a:blip r:embed="rId4">
+            <a:extLst>
+              <a:ext uri="{28A0092B-C50C-407E-A947-70E740481C1C}">
+                <a14:useLocalDpi xmlns:a14="http://schemas.microsoft.com/office/drawing/2010/main" val="0"/>
+              </a:ext>
+            </a:extLst>
+          </a:blip>
+          <a:stretch>
+            <a:fillRect/>
+          </a:stretch>
+        </p:blipFill>
+        <p:spPr>
+          <a:xfrm>
+            <a:off x="3974589" y="2579828"/>
+            <a:ext cx="1320800" cy="1320800"/>
+          </a:xfrm>
+          <a:prstGeom prst="rect">
+            <a:avLst/>
+          </a:prstGeom>
+        </p:spPr>
+      </p:pic>
+      <p:pic>
+        <p:nvPicPr>
+          <p:cNvPr id="21" name="Picture 20">
+            <a:extLst>
+              <a:ext uri="{FF2B5EF4-FFF2-40B4-BE49-F238E27FC236}">
+                <a16:creationId xmlns:a16="http://schemas.microsoft.com/office/drawing/2014/main" id="{1DCD4CF7-93B7-428D-8D3E-2EE1947A9172}"/>
+              </a:ext>
+            </a:extLst>
+          </p:cNvPr>
+          <p:cNvPicPr>
+            <a:picLocks noChangeAspect="1"/>
+          </p:cNvPicPr>
+          <p:nvPr/>
+        </p:nvPicPr>
+        <p:blipFill>
+          <a:blip r:embed="rId4">
+            <a:extLst>
+              <a:ext uri="{28A0092B-C50C-407E-A947-70E740481C1C}">
+                <a14:useLocalDpi xmlns:a14="http://schemas.microsoft.com/office/drawing/2010/main" val="0"/>
+              </a:ext>
+            </a:extLst>
+          </a:blip>
+          <a:stretch>
+            <a:fillRect/>
+          </a:stretch>
+        </p:blipFill>
+        <p:spPr>
+          <a:xfrm>
+            <a:off x="5035295" y="2489330"/>
+            <a:ext cx="1320800" cy="1320800"/>
+          </a:xfrm>
+          <a:prstGeom prst="rect">
+            <a:avLst/>
+          </a:prstGeom>
+        </p:spPr>
+      </p:pic>
+      <p:cxnSp>
+        <p:nvCxnSpPr>
+          <p:cNvPr id="23" name="Straight Arrow Connector 22">
+            <a:extLst>
+              <a:ext uri="{FF2B5EF4-FFF2-40B4-BE49-F238E27FC236}">
+                <a16:creationId xmlns:a16="http://schemas.microsoft.com/office/drawing/2014/main" id="{A90F3D28-7503-4574-ACBB-FE92D374E653}"/>
+              </a:ext>
+            </a:extLst>
+          </p:cNvPr>
+          <p:cNvCxnSpPr>
+            <a:cxnSpLocks/>
+          </p:cNvCxnSpPr>
+          <p:nvPr/>
+        </p:nvCxnSpPr>
+        <p:spPr>
+          <a:xfrm>
+            <a:off x="803746" y="3836689"/>
+            <a:ext cx="664327" cy="1020537"/>
+          </a:xfrm>
+          <a:prstGeom prst="straightConnector1">
+            <a:avLst/>
+          </a:prstGeom>
+          <a:ln>
+            <a:tailEnd type="triangle"/>
+          </a:ln>
+        </p:spPr>
+        <p:style>
+          <a:lnRef idx="1">
+            <a:schemeClr val="accent1"/>
+          </a:lnRef>
+          <a:fillRef idx="0">
+            <a:schemeClr val="accent1"/>
+          </a:fillRef>
+          <a:effectRef idx="0">
+            <a:schemeClr val="accent1"/>
+          </a:effectRef>
+          <a:fontRef idx="minor">
+            <a:schemeClr val="tx1"/>
+          </a:fontRef>
+        </p:style>
+      </p:cxnSp>
+      <p:sp>
+        <p:nvSpPr>
+          <p:cNvPr id="24" name="TextBox 23">
+            <a:extLst>
+              <a:ext uri="{FF2B5EF4-FFF2-40B4-BE49-F238E27FC236}">
+                <a16:creationId xmlns:a16="http://schemas.microsoft.com/office/drawing/2014/main" id="{04DE702E-81D8-4A28-B06C-92F37DF86E18}"/>
+              </a:ext>
+            </a:extLst>
+          </p:cNvPr>
+          <p:cNvSpPr txBox="1"/>
+          <p:nvPr/>
+        </p:nvSpPr>
+        <p:spPr>
+          <a:xfrm>
+            <a:off x="1618420" y="6134890"/>
+            <a:ext cx="789700" cy="369332"/>
+          </a:xfrm>
+          <a:prstGeom prst="rect">
+            <a:avLst/>
+          </a:prstGeom>
+          <a:noFill/>
+        </p:spPr>
+        <p:txBody>
+          <a:bodyPr wrap="square" rtlCol="0">
+            <a:spAutoFit/>
           </a:bodyPr>
           <a:lstStyle/>
           <a:p>
-            <a:pPr algn="ctr"/>
-            <a:r>
-              <a:rPr lang="ro-RO" sz="8000" dirty="0" smtClean="0"/>
-              <a:t>TODO</a:t>
-            </a:r>
-            <a:endParaRPr lang="en-US" sz="8000" dirty="0"/>
+            <a:r>
+              <a:rPr lang="en-US" dirty="0"/>
+              <a:t>EDSR</a:t>
+            </a:r>
+            <a:endParaRPr lang="ro-RO" dirty="0"/>
+          </a:p>
+        </p:txBody>
+      </p:sp>
+      <p:sp>
+        <p:nvSpPr>
+          <p:cNvPr id="25" name="TextBox 24">
+            <a:extLst>
+              <a:ext uri="{FF2B5EF4-FFF2-40B4-BE49-F238E27FC236}">
+                <a16:creationId xmlns:a16="http://schemas.microsoft.com/office/drawing/2014/main" id="{D1A236C6-3381-4214-BCA7-83A828A550BC}"/>
+              </a:ext>
+            </a:extLst>
+          </p:cNvPr>
+          <p:cNvSpPr txBox="1"/>
+          <p:nvPr/>
+        </p:nvSpPr>
+        <p:spPr>
+          <a:xfrm>
+            <a:off x="137108" y="1663626"/>
+            <a:ext cx="2510447" cy="369332"/>
+          </a:xfrm>
+          <a:prstGeom prst="rect">
+            <a:avLst/>
+          </a:prstGeom>
+          <a:noFill/>
+        </p:spPr>
+        <p:txBody>
+          <a:bodyPr wrap="square" rtlCol="0">
+            <a:spAutoFit/>
+          </a:bodyPr>
+          <a:lstStyle/>
+          <a:p>
+            <a:r>
+              <a:rPr lang="en-US" dirty="0" err="1"/>
+              <a:t>Imagini</a:t>
+            </a:r>
+            <a:r>
+              <a:rPr lang="en-US" dirty="0"/>
+              <a:t> </a:t>
+            </a:r>
+            <a:r>
+              <a:rPr lang="en-US" dirty="0" err="1"/>
+              <a:t>Capturate</a:t>
+            </a:r>
+            <a:r>
+              <a:rPr lang="en-US" dirty="0"/>
+              <a:t> LR</a:t>
+            </a:r>
+            <a:endParaRPr lang="ro-RO" dirty="0"/>
+          </a:p>
+        </p:txBody>
+      </p:sp>
+      <p:cxnSp>
+        <p:nvCxnSpPr>
+          <p:cNvPr id="29" name="Straight Arrow Connector 28">
+            <a:extLst>
+              <a:ext uri="{FF2B5EF4-FFF2-40B4-BE49-F238E27FC236}">
+                <a16:creationId xmlns:a16="http://schemas.microsoft.com/office/drawing/2014/main" id="{C67D5D30-3CE7-4341-9D0A-8663D4709015}"/>
+              </a:ext>
+            </a:extLst>
+          </p:cNvPr>
+          <p:cNvCxnSpPr>
+            <a:cxnSpLocks/>
+          </p:cNvCxnSpPr>
+          <p:nvPr/>
+        </p:nvCxnSpPr>
+        <p:spPr>
+          <a:xfrm flipV="1">
+            <a:off x="3534967" y="3998973"/>
+            <a:ext cx="513394" cy="694137"/>
+          </a:xfrm>
+          <a:prstGeom prst="straightConnector1">
+            <a:avLst/>
+          </a:prstGeom>
+          <a:ln>
+            <a:tailEnd type="triangle"/>
+          </a:ln>
+        </p:spPr>
+        <p:style>
+          <a:lnRef idx="1">
+            <a:schemeClr val="accent1"/>
+          </a:lnRef>
+          <a:fillRef idx="0">
+            <a:schemeClr val="accent1"/>
+          </a:fillRef>
+          <a:effectRef idx="0">
+            <a:schemeClr val="accent1"/>
+          </a:effectRef>
+          <a:fontRef idx="minor">
+            <a:schemeClr val="tx1"/>
+          </a:fontRef>
+        </p:style>
+      </p:cxnSp>
+      <p:cxnSp>
+        <p:nvCxnSpPr>
+          <p:cNvPr id="31" name="Straight Arrow Connector 30">
+            <a:extLst>
+              <a:ext uri="{FF2B5EF4-FFF2-40B4-BE49-F238E27FC236}">
+                <a16:creationId xmlns:a16="http://schemas.microsoft.com/office/drawing/2014/main" id="{4CBEB4B6-2CC2-4B7C-998A-91AE765A339B}"/>
+              </a:ext>
+            </a:extLst>
+          </p:cNvPr>
+          <p:cNvCxnSpPr>
+            <a:cxnSpLocks/>
+          </p:cNvCxnSpPr>
+          <p:nvPr/>
+        </p:nvCxnSpPr>
+        <p:spPr>
+          <a:xfrm>
+            <a:off x="5865339" y="3998973"/>
+            <a:ext cx="1055578" cy="928628"/>
+          </a:xfrm>
+          <a:prstGeom prst="straightConnector1">
+            <a:avLst/>
+          </a:prstGeom>
+          <a:ln>
+            <a:tailEnd type="triangle"/>
+          </a:ln>
+        </p:spPr>
+        <p:style>
+          <a:lnRef idx="1">
+            <a:schemeClr val="accent1"/>
+          </a:lnRef>
+          <a:fillRef idx="0">
+            <a:schemeClr val="accent1"/>
+          </a:fillRef>
+          <a:effectRef idx="0">
+            <a:schemeClr val="accent1"/>
+          </a:effectRef>
+          <a:fontRef idx="minor">
+            <a:schemeClr val="tx1"/>
+          </a:fontRef>
+        </p:style>
+      </p:cxnSp>
+      <p:sp>
+        <p:nvSpPr>
+          <p:cNvPr id="32" name="TextBox 31">
+            <a:extLst>
+              <a:ext uri="{FF2B5EF4-FFF2-40B4-BE49-F238E27FC236}">
+                <a16:creationId xmlns:a16="http://schemas.microsoft.com/office/drawing/2014/main" id="{6AFA3080-6205-441B-A77D-5D842D3F7DDB}"/>
+              </a:ext>
+            </a:extLst>
+          </p:cNvPr>
+          <p:cNvSpPr txBox="1"/>
+          <p:nvPr/>
+        </p:nvSpPr>
+        <p:spPr>
+          <a:xfrm>
+            <a:off x="6326663" y="3998973"/>
+            <a:ext cx="1510019" cy="369332"/>
+          </a:xfrm>
+          <a:prstGeom prst="rect">
+            <a:avLst/>
+          </a:prstGeom>
+          <a:noFill/>
+        </p:spPr>
+        <p:txBody>
+          <a:bodyPr wrap="square" rtlCol="0">
+            <a:spAutoFit/>
+          </a:bodyPr>
+          <a:lstStyle/>
+          <a:p>
+            <a:r>
+              <a:rPr lang="en-US" dirty="0" err="1"/>
+              <a:t>Interpolare</a:t>
+            </a:r>
+            <a:endParaRPr lang="ro-RO" dirty="0"/>
+          </a:p>
+        </p:txBody>
+      </p:sp>
+      <p:pic>
+        <p:nvPicPr>
+          <p:cNvPr id="34" name="Picture 33">
+            <a:extLst>
+              <a:ext uri="{FF2B5EF4-FFF2-40B4-BE49-F238E27FC236}">
+                <a16:creationId xmlns:a16="http://schemas.microsoft.com/office/drawing/2014/main" id="{6FFDFD51-95B2-4372-AD28-355DAD00C458}"/>
+              </a:ext>
+            </a:extLst>
+          </p:cNvPr>
+          <p:cNvPicPr>
+            <a:picLocks noChangeAspect="1"/>
+          </p:cNvPicPr>
+          <p:nvPr/>
+        </p:nvPicPr>
+        <p:blipFill>
+          <a:blip r:embed="rId3">
+            <a:extLst>
+              <a:ext uri="{28A0092B-C50C-407E-A947-70E740481C1C}">
+                <a14:useLocalDpi xmlns:a14="http://schemas.microsoft.com/office/drawing/2010/main" val="0"/>
+              </a:ext>
+            </a:extLst>
+          </a:blip>
+          <a:stretch>
+            <a:fillRect/>
+          </a:stretch>
+        </p:blipFill>
+        <p:spPr>
+          <a:xfrm>
+            <a:off x="7208575" y="4440091"/>
+            <a:ext cx="1576657" cy="1566679"/>
+          </a:xfrm>
+          <a:prstGeom prst="rect">
+            <a:avLst/>
+          </a:prstGeom>
+        </p:spPr>
+      </p:pic>
+      <p:sp>
+        <p:nvSpPr>
+          <p:cNvPr id="35" name="TextBox 34">
+            <a:extLst>
+              <a:ext uri="{FF2B5EF4-FFF2-40B4-BE49-F238E27FC236}">
+                <a16:creationId xmlns:a16="http://schemas.microsoft.com/office/drawing/2014/main" id="{6C7F87AA-2A53-482E-8E09-38C562BF444A}"/>
+              </a:ext>
+            </a:extLst>
+          </p:cNvPr>
+          <p:cNvSpPr txBox="1"/>
+          <p:nvPr/>
+        </p:nvSpPr>
+        <p:spPr>
+          <a:xfrm>
+            <a:off x="4162373" y="3984200"/>
+            <a:ext cx="1702966" cy="369332"/>
+          </a:xfrm>
+          <a:prstGeom prst="rect">
+            <a:avLst/>
+          </a:prstGeom>
+          <a:noFill/>
+        </p:spPr>
+        <p:txBody>
+          <a:bodyPr wrap="square" rtlCol="0">
+            <a:spAutoFit/>
+          </a:bodyPr>
+          <a:lstStyle/>
+          <a:p>
+            <a:r>
+              <a:rPr lang="en-US" dirty="0"/>
+              <a:t>Upscale 2x/3x</a:t>
+            </a:r>
+          </a:p>
+        </p:txBody>
+      </p:sp>
+      <p:sp>
+        <p:nvSpPr>
+          <p:cNvPr id="36" name="TextBox 35">
+            <a:extLst>
+              <a:ext uri="{FF2B5EF4-FFF2-40B4-BE49-F238E27FC236}">
+                <a16:creationId xmlns:a16="http://schemas.microsoft.com/office/drawing/2014/main" id="{121CABD5-ADB2-43CD-8C73-5E2138A37F5A}"/>
+              </a:ext>
+            </a:extLst>
+          </p:cNvPr>
+          <p:cNvSpPr txBox="1"/>
+          <p:nvPr/>
+        </p:nvSpPr>
+        <p:spPr>
+          <a:xfrm>
+            <a:off x="7104359" y="5969540"/>
+            <a:ext cx="2205394" cy="369332"/>
+          </a:xfrm>
+          <a:prstGeom prst="rect">
+            <a:avLst/>
+          </a:prstGeom>
+          <a:noFill/>
+        </p:spPr>
+        <p:txBody>
+          <a:bodyPr wrap="square" rtlCol="0">
+            <a:spAutoFit/>
+          </a:bodyPr>
+          <a:lstStyle/>
+          <a:p>
+            <a:r>
+              <a:rPr lang="en-US" dirty="0"/>
+              <a:t>Super-</a:t>
+            </a:r>
+            <a:r>
+              <a:rPr lang="en-US" dirty="0" err="1"/>
+              <a:t>Rezolutie</a:t>
+            </a:r>
+            <a:endParaRPr lang="ro-RO" dirty="0"/>
+          </a:p>
+        </p:txBody>
+      </p:sp>
+      <p:sp>
+        <p:nvSpPr>
+          <p:cNvPr id="40" name="TextBox 39">
+            <a:extLst>
+              <a:ext uri="{FF2B5EF4-FFF2-40B4-BE49-F238E27FC236}">
+                <a16:creationId xmlns:a16="http://schemas.microsoft.com/office/drawing/2014/main" id="{9A561D6C-FE04-44BA-8E10-91DE3BDCA1F0}"/>
+              </a:ext>
+            </a:extLst>
+          </p:cNvPr>
+          <p:cNvSpPr txBox="1"/>
+          <p:nvPr/>
+        </p:nvSpPr>
+        <p:spPr>
+          <a:xfrm>
+            <a:off x="989314" y="3827932"/>
+            <a:ext cx="1832684" cy="369332"/>
+          </a:xfrm>
+          <a:prstGeom prst="rect">
+            <a:avLst/>
+          </a:prstGeom>
+          <a:noFill/>
+        </p:spPr>
+        <p:txBody>
+          <a:bodyPr wrap="square" rtlCol="0">
+            <a:spAutoFit/>
+          </a:bodyPr>
+          <a:lstStyle/>
+          <a:p>
+            <a:r>
+              <a:rPr lang="en-US" dirty="0"/>
+              <a:t>Single-Image SR</a:t>
+            </a:r>
+            <a:endParaRPr lang="ro-RO" dirty="0"/>
           </a:p>
         </p:txBody>
       </p:sp>
     </p:spTree>
     <p:extLst>
       <p:ext uri="{BB962C8B-B14F-4D97-AF65-F5344CB8AC3E}">
-        <p14:creationId xmlns:p14="http://schemas.microsoft.com/office/powerpoint/2010/main" val="1167193568"/>
+        <p14:creationId xmlns:p14="http://schemas.microsoft.com/office/powerpoint/2010/main" val="558742200"/>
       </p:ext>
     </p:extLst>
   </p:cSld>
@@ -10080,45 +11434,94 @@
           <a:p>
             <a:r>
               <a:rPr lang="ro-RO" dirty="0"/>
-              <a:t>ETAPE </a:t>
-            </a:r>
-            <a:r>
-              <a:rPr lang="ro-RO" dirty="0" smtClean="0"/>
-              <a:t>VIITOARE</a:t>
+              <a:t>SOLUȚII EXISTENTE</a:t>
             </a:r>
             <a:endParaRPr lang="en-US" dirty="0"/>
           </a:p>
         </p:txBody>
       </p:sp>
-      <p:graphicFrame>
-        <p:nvGraphicFramePr>
-          <p:cNvPr id="4" name="Content Placeholder 3"/>
-          <p:cNvGraphicFramePr>
-            <a:graphicFrameLocks noGrp="1"/>
-          </p:cNvGraphicFramePr>
+      <p:sp>
+        <p:nvSpPr>
+          <p:cNvPr id="3" name="Content Placeholder 2"/>
+          <p:cNvSpPr>
+            <a:spLocks noGrp="1"/>
+          </p:cNvSpPr>
           <p:nvPr>
             <p:ph idx="1"/>
-            <p:extLst>
-              <p:ext uri="{D42A27DB-BD31-4B8C-83A1-F6EECF244321}">
-                <p14:modId xmlns:p14="http://schemas.microsoft.com/office/powerpoint/2010/main" val="4155484168"/>
-              </p:ext>
-            </p:extLst>
           </p:nvPr>
-        </p:nvGraphicFramePr>
-        <p:xfrm>
-          <a:off x="677863" y="2160588"/>
-          <a:ext cx="8596312" cy="3881437"/>
-        </p:xfrm>
-        <a:graphic>
-          <a:graphicData uri="http://schemas.openxmlformats.org/drawingml/2006/diagram">
-            <dgm:relIds xmlns:dgm="http://schemas.openxmlformats.org/drawingml/2006/diagram" xmlns:r="http://schemas.openxmlformats.org/officeDocument/2006/relationships" r:dm="rId2" r:lo="rId3" r:qs="rId4" r:cs="rId5"/>
-          </a:graphicData>
-        </a:graphic>
-      </p:graphicFrame>
+        </p:nvSpPr>
+        <p:spPr>
+          <a:xfrm>
+            <a:off x="677334" y="2118644"/>
+            <a:ext cx="8596668" cy="3880773"/>
+          </a:xfrm>
+        </p:spPr>
+        <p:txBody>
+          <a:bodyPr>
+            <a:normAutofit/>
+          </a:bodyPr>
+          <a:lstStyle/>
+          <a:p>
+            <a:pPr algn="ctr"/>
+            <a:r>
+              <a:rPr lang="en-US" sz="1050" dirty="0"/>
+              <a:t>In general </a:t>
+            </a:r>
+            <a:r>
+              <a:rPr lang="en-US" sz="1050" dirty="0" err="1"/>
+              <a:t>problema</a:t>
+            </a:r>
+            <a:r>
+              <a:rPr lang="en-US" sz="1050" dirty="0"/>
+              <a:t> multi-image SR a </a:t>
+            </a:r>
+            <a:r>
+              <a:rPr lang="en-US" sz="1050" dirty="0" err="1"/>
+              <a:t>fost</a:t>
+            </a:r>
+            <a:r>
+              <a:rPr lang="en-US" sz="1050" dirty="0"/>
+              <a:t> </a:t>
+            </a:r>
+            <a:r>
+              <a:rPr lang="en-US" sz="1050" dirty="0" err="1"/>
+              <a:t>redusa</a:t>
+            </a:r>
+            <a:r>
+              <a:rPr lang="en-US" sz="1050" dirty="0"/>
+              <a:t> la </a:t>
+            </a:r>
+            <a:r>
+              <a:rPr lang="en-US" sz="1050" dirty="0" err="1"/>
+              <a:t>mai</a:t>
+            </a:r>
+            <a:r>
+              <a:rPr lang="en-US" sz="1050" dirty="0"/>
+              <a:t> </a:t>
+            </a:r>
+            <a:r>
+              <a:rPr lang="en-US" sz="1050" dirty="0" err="1"/>
+              <a:t>multe</a:t>
+            </a:r>
+            <a:r>
+              <a:rPr lang="en-US" sz="1050" dirty="0"/>
+              <a:t> </a:t>
+            </a:r>
+            <a:r>
+              <a:rPr lang="en-US" sz="1050" dirty="0" err="1"/>
+              <a:t>probleme</a:t>
+            </a:r>
+            <a:r>
+              <a:rPr lang="en-US" sz="1050" dirty="0"/>
+              <a:t> de single-image SR</a:t>
+            </a:r>
+          </a:p>
+        </p:txBody>
+      </p:sp>
     </p:spTree>
     <p:extLst>
       <p:ext uri="{BB962C8B-B14F-4D97-AF65-F5344CB8AC3E}">
-        <p14:creationId xmlns:p14="http://schemas.microsoft.com/office/powerpoint/2010/main" val="4201970213"/>
+        <p14:creationId xmlns:p14="http://schemas.microsoft.com/office/powerpoint/2010/main" val="1167193568"/>
       </p:ext>
     </p:extLst>
   </p:cSld>

</xml_diff>

<commit_message>
added special characters in .ppt + removed unused titles in .docx
</commit_message>
<xml_diff>
--- a/SUPER RESOLUTION A SPATIAL SUBPIXEL INTERPOLATION TECHNIQUE_sprint_1.pptx
+++ b/SUPER RESOLUTION A SPATIAL SUBPIXEL INTERPOLATION TECHNIQUE_sprint_1.pptx
@@ -1135,6 +1135,13 @@
         </dgm:presLayoutVars>
       </dgm:prSet>
       <dgm:spPr/>
+      <dgm:t>
+        <a:bodyPr/>
+        <a:lstStyle/>
+        <a:p>
+          <a:endParaRPr lang="en-US"/>
+        </a:p>
+      </dgm:t>
     </dgm:pt>
     <dgm:pt modelId="{80BCABE4-00EE-4FC3-848A-2356D404F8EE}" type="pres">
       <dgm:prSet presAssocID="{B093EBB4-CA57-4FC7-87F8-1B4942BD5DB3}" presName="circleA" presStyleLbl="node1" presStyleIdx="0" presStyleCnt="4"/>
@@ -1159,6 +1166,13 @@
         </dgm:presLayoutVars>
       </dgm:prSet>
       <dgm:spPr/>
+      <dgm:t>
+        <a:bodyPr/>
+        <a:lstStyle/>
+        <a:p>
+          <a:endParaRPr lang="en-US"/>
+        </a:p>
+      </dgm:t>
     </dgm:pt>
     <dgm:pt modelId="{CA7A90CA-427C-4833-80B2-AEBA5B559F35}" type="pres">
       <dgm:prSet presAssocID="{D207576D-F1AE-44B3-B41E-2EB34C4B9A4D}" presName="circleB" presStyleLbl="node1" presStyleIdx="1" presStyleCnt="4"/>
@@ -1183,6 +1197,13 @@
         </dgm:presLayoutVars>
       </dgm:prSet>
       <dgm:spPr/>
+      <dgm:t>
+        <a:bodyPr/>
+        <a:lstStyle/>
+        <a:p>
+          <a:endParaRPr lang="en-US"/>
+        </a:p>
+      </dgm:t>
     </dgm:pt>
     <dgm:pt modelId="{18C672A2-44A7-4897-AACB-572B0EA3B11F}" type="pres">
       <dgm:prSet presAssocID="{E5E0756C-C5A7-4B1E-8D75-700A7056605D}" presName="circleA" presStyleLbl="node1" presStyleIdx="2" presStyleCnt="4"/>
@@ -1207,6 +1228,13 @@
         </dgm:presLayoutVars>
       </dgm:prSet>
       <dgm:spPr/>
+      <dgm:t>
+        <a:bodyPr/>
+        <a:lstStyle/>
+        <a:p>
+          <a:endParaRPr lang="en-US"/>
+        </a:p>
+      </dgm:t>
     </dgm:pt>
     <dgm:pt modelId="{9626F961-E3D9-4D0D-AFC6-44C91624FF7B}" type="pres">
       <dgm:prSet presAssocID="{C84B7B7F-950E-4EC4-9205-A1C2934E2BC7}" presName="circleB" presStyleLbl="node1" presStyleIdx="3" presStyleCnt="4"/>
@@ -1218,14 +1246,14 @@
     </dgm:pt>
   </dgm:ptLst>
   <dgm:cxnLst>
-    <dgm:cxn modelId="{A2C53E02-11EC-4C7B-BA55-D4C519C6627C}" type="presOf" srcId="{B093EBB4-CA57-4FC7-87F8-1B4942BD5DB3}" destId="{AF890D11-33E8-43AC-BA34-484E088B95EF}" srcOrd="0" destOrd="0" presId="urn:microsoft.com/office/officeart/2005/8/layout/hProcess11"/>
+    <dgm:cxn modelId="{DE0E9ADF-5DE0-43CA-B275-46A5B9D91C28}" srcId="{02E4B288-630F-4BED-B8E5-518E334E0987}" destId="{D207576D-F1AE-44B3-B41E-2EB34C4B9A4D}" srcOrd="1" destOrd="0" parTransId="{52AFC437-E2A7-4B7F-A2F4-F1A2652BCA7F}" sibTransId="{EA385F1D-D6B1-4227-BB6E-1D13BC1227DD}"/>
     <dgm:cxn modelId="{A3694C5F-135B-41F2-B71F-94286ACF5EAF}" srcId="{02E4B288-630F-4BED-B8E5-518E334E0987}" destId="{C84B7B7F-950E-4EC4-9205-A1C2934E2BC7}" srcOrd="3" destOrd="0" parTransId="{26CEB5C0-9BBD-4447-83FE-96E2DAEBE0AC}" sibTransId="{857F7C61-3153-4642-972D-FBAB543B762C}"/>
     <dgm:cxn modelId="{64068667-281C-4730-A0D3-63F8CBE1A61C}" type="presOf" srcId="{C84B7B7F-950E-4EC4-9205-A1C2934E2BC7}" destId="{959B68E8-4C2E-4FB3-9564-0567A877267F}" srcOrd="0" destOrd="0" presId="urn:microsoft.com/office/officeart/2005/8/layout/hProcess11"/>
+    <dgm:cxn modelId="{03C508CE-0F8C-4EC6-A5D4-7DB731A563F6}" type="presOf" srcId="{D207576D-F1AE-44B3-B41E-2EB34C4B9A4D}" destId="{73B07B9A-B89A-4B87-901D-3820998D087F}" srcOrd="0" destOrd="0" presId="urn:microsoft.com/office/officeart/2005/8/layout/hProcess11"/>
+    <dgm:cxn modelId="{A2C53E02-11EC-4C7B-BA55-D4C519C6627C}" type="presOf" srcId="{B093EBB4-CA57-4FC7-87F8-1B4942BD5DB3}" destId="{AF890D11-33E8-43AC-BA34-484E088B95EF}" srcOrd="0" destOrd="0" presId="urn:microsoft.com/office/officeart/2005/8/layout/hProcess11"/>
+    <dgm:cxn modelId="{95DB4BE0-4F88-49C5-8226-D59F9390523D}" type="presOf" srcId="{02E4B288-630F-4BED-B8E5-518E334E0987}" destId="{295D31C4-C824-4ABD-820F-2371100D26A3}" srcOrd="0" destOrd="0" presId="urn:microsoft.com/office/officeart/2005/8/layout/hProcess11"/>
+    <dgm:cxn modelId="{55FDA48E-3384-4316-9BB0-9E092CF6EBBA}" type="presOf" srcId="{E5E0756C-C5A7-4B1E-8D75-700A7056605D}" destId="{81A495E0-7E59-411B-8238-01C780AD2D62}" srcOrd="0" destOrd="0" presId="urn:microsoft.com/office/officeart/2005/8/layout/hProcess11"/>
     <dgm:cxn modelId="{E23F1950-6D10-4BB2-86D7-823D1946E8D1}" srcId="{02E4B288-630F-4BED-B8E5-518E334E0987}" destId="{E5E0756C-C5A7-4B1E-8D75-700A7056605D}" srcOrd="2" destOrd="0" parTransId="{EDE22949-C4F0-4EFD-BFDF-E8BEA44913C0}" sibTransId="{36D277AF-874B-4674-A74A-1C19AD810C9D}"/>
-    <dgm:cxn modelId="{55FDA48E-3384-4316-9BB0-9E092CF6EBBA}" type="presOf" srcId="{E5E0756C-C5A7-4B1E-8D75-700A7056605D}" destId="{81A495E0-7E59-411B-8238-01C780AD2D62}" srcOrd="0" destOrd="0" presId="urn:microsoft.com/office/officeart/2005/8/layout/hProcess11"/>
-    <dgm:cxn modelId="{03C508CE-0F8C-4EC6-A5D4-7DB731A563F6}" type="presOf" srcId="{D207576D-F1AE-44B3-B41E-2EB34C4B9A4D}" destId="{73B07B9A-B89A-4B87-901D-3820998D087F}" srcOrd="0" destOrd="0" presId="urn:microsoft.com/office/officeart/2005/8/layout/hProcess11"/>
-    <dgm:cxn modelId="{DE0E9ADF-5DE0-43CA-B275-46A5B9D91C28}" srcId="{02E4B288-630F-4BED-B8E5-518E334E0987}" destId="{D207576D-F1AE-44B3-B41E-2EB34C4B9A4D}" srcOrd="1" destOrd="0" parTransId="{52AFC437-E2A7-4B7F-A2F4-F1A2652BCA7F}" sibTransId="{EA385F1D-D6B1-4227-BB6E-1D13BC1227DD}"/>
-    <dgm:cxn modelId="{95DB4BE0-4F88-49C5-8226-D59F9390523D}" type="presOf" srcId="{02E4B288-630F-4BED-B8E5-518E334E0987}" destId="{295D31C4-C824-4ABD-820F-2371100D26A3}" srcOrd="0" destOrd="0" presId="urn:microsoft.com/office/officeart/2005/8/layout/hProcess11"/>
     <dgm:cxn modelId="{1F06AAF6-6F87-4C4B-8813-01F7F99BEFF4}" srcId="{02E4B288-630F-4BED-B8E5-518E334E0987}" destId="{B093EBB4-CA57-4FC7-87F8-1B4942BD5DB3}" srcOrd="0" destOrd="0" parTransId="{15CA1CA6-6A8D-47EA-B081-2BB52A6C4D31}" sibTransId="{C4049946-14CA-42FC-9B41-C7F59EE339F4}"/>
     <dgm:cxn modelId="{A6232A5F-6555-495B-A9CB-F53B1F17613B}" type="presParOf" srcId="{295D31C4-C824-4ABD-820F-2371100D26A3}" destId="{C43680D1-882F-4F7D-8AAC-EBC503F990DF}" srcOrd="0" destOrd="0" presId="urn:microsoft.com/office/officeart/2005/8/layout/hProcess11"/>
     <dgm:cxn modelId="{7210B01B-1C47-4DE3-BEC1-1EE4C8A30005}" type="presParOf" srcId="{295D31C4-C824-4ABD-820F-2371100D26A3}" destId="{8E22B78D-23C6-4A0B-8E14-8B5BA83885E3}" srcOrd="1" destOrd="0" presId="urn:microsoft.com/office/officeart/2005/8/layout/hProcess11"/>
@@ -1364,7 +1392,7 @@
         </a:bodyPr>
         <a:lstStyle/>
         <a:p>
-          <a:pPr marL="0" lvl="0" indent="0" algn="ctr" defTabSz="1244600">
+          <a:pPr lvl="0" algn="ctr" defTabSz="1244600">
             <a:lnSpc>
               <a:spcPct val="90000"/>
             </a:lnSpc>
@@ -1374,7 +1402,6 @@
             <a:spcAft>
               <a:spcPct val="35000"/>
             </a:spcAft>
-            <a:buNone/>
           </a:pPr>
           <a:r>
             <a:rPr lang="ro-RO" sz="2800" kern="1200" dirty="0"/>
@@ -1382,7 +1409,7 @@
           </a:r>
         </a:p>
         <a:p>
-          <a:pPr marL="0" lvl="0" indent="0" algn="l" defTabSz="1244600">
+          <a:pPr lvl="0" algn="l" defTabSz="1244600">
             <a:lnSpc>
               <a:spcPct val="90000"/>
             </a:lnSpc>
@@ -1392,7 +1419,6 @@
             <a:spcAft>
               <a:spcPct val="35000"/>
             </a:spcAft>
-            <a:buNone/>
           </a:pPr>
           <a:r>
             <a:rPr lang="ro-RO" sz="1100" kern="1200" dirty="0"/>
@@ -1400,7 +1426,7 @@
           </a:r>
         </a:p>
         <a:p>
-          <a:pPr marL="0" lvl="0" indent="0" algn="l" defTabSz="1244600">
+          <a:pPr lvl="0" algn="l" defTabSz="1244600">
             <a:lnSpc>
               <a:spcPct val="90000"/>
             </a:lnSpc>
@@ -1410,7 +1436,6 @@
             <a:spcAft>
               <a:spcPct val="35000"/>
             </a:spcAft>
-            <a:buNone/>
           </a:pPr>
           <a:r>
             <a:rPr lang="ro-RO" sz="1100" kern="1200" dirty="0"/>
@@ -1418,7 +1443,7 @@
           </a:r>
         </a:p>
         <a:p>
-          <a:pPr marL="0" lvl="0" indent="0" algn="l" defTabSz="1244600">
+          <a:pPr lvl="0" algn="l" defTabSz="1244600">
             <a:lnSpc>
               <a:spcPct val="90000"/>
             </a:lnSpc>
@@ -1428,7 +1453,6 @@
             <a:spcAft>
               <a:spcPct val="35000"/>
             </a:spcAft>
-            <a:buNone/>
           </a:pPr>
           <a:r>
             <a:rPr lang="ro-RO" sz="1100" kern="1200" dirty="0"/>
@@ -1528,7 +1552,7 @@
         </a:bodyPr>
         <a:lstStyle/>
         <a:p>
-          <a:pPr marL="0" lvl="0" indent="0" algn="ctr" defTabSz="1244600">
+          <a:pPr lvl="0" algn="ctr" defTabSz="1244600">
             <a:lnSpc>
               <a:spcPct val="90000"/>
             </a:lnSpc>
@@ -1538,7 +1562,6 @@
             <a:spcAft>
               <a:spcPct val="35000"/>
             </a:spcAft>
-            <a:buNone/>
           </a:pPr>
           <a:r>
             <a:rPr lang="ro-RO" sz="2800" kern="1200" dirty="0"/>
@@ -1546,7 +1569,7 @@
           </a:r>
         </a:p>
         <a:p>
-          <a:pPr marL="0" lvl="0" indent="0" algn="l" defTabSz="1244600">
+          <a:pPr lvl="0" algn="l" defTabSz="1244600">
             <a:lnSpc>
               <a:spcPct val="90000"/>
             </a:lnSpc>
@@ -1556,7 +1579,6 @@
             <a:spcAft>
               <a:spcPct val="35000"/>
             </a:spcAft>
-            <a:buNone/>
           </a:pPr>
           <a:r>
             <a:rPr lang="ro-RO" sz="1100" kern="1200" dirty="0"/>
@@ -1564,7 +1586,7 @@
           </a:r>
         </a:p>
         <a:p>
-          <a:pPr marL="0" lvl="0" indent="0" algn="l" defTabSz="1244600">
+          <a:pPr lvl="0" algn="l" defTabSz="1244600">
             <a:lnSpc>
               <a:spcPct val="90000"/>
             </a:lnSpc>
@@ -1574,7 +1596,6 @@
             <a:spcAft>
               <a:spcPct val="35000"/>
             </a:spcAft>
-            <a:buNone/>
           </a:pPr>
           <a:r>
             <a:rPr lang="ro-RO" sz="1100" kern="1200" dirty="0"/>
@@ -1673,7 +1694,7 @@
         </a:bodyPr>
         <a:lstStyle/>
         <a:p>
-          <a:pPr marL="0" lvl="0" indent="0" algn="ctr" defTabSz="1244600">
+          <a:pPr lvl="0" algn="ctr" defTabSz="1244600">
             <a:lnSpc>
               <a:spcPct val="90000"/>
             </a:lnSpc>
@@ -1683,7 +1704,6 @@
             <a:spcAft>
               <a:spcPct val="35000"/>
             </a:spcAft>
-            <a:buNone/>
           </a:pPr>
           <a:r>
             <a:rPr lang="ro-RO" sz="2800" kern="1200" dirty="0"/>
@@ -1691,7 +1711,7 @@
           </a:r>
         </a:p>
         <a:p>
-          <a:pPr marL="0" lvl="0" indent="0" algn="l" defTabSz="1244600">
+          <a:pPr lvl="0" algn="l" defTabSz="1244600">
             <a:lnSpc>
               <a:spcPct val="90000"/>
             </a:lnSpc>
@@ -1701,7 +1721,6 @@
             <a:spcAft>
               <a:spcPct val="35000"/>
             </a:spcAft>
-            <a:buNone/>
           </a:pPr>
           <a:r>
             <a:rPr lang="ro-RO" sz="1100" kern="1200" dirty="0"/>
@@ -1709,7 +1728,7 @@
           </a:r>
         </a:p>
         <a:p>
-          <a:pPr marL="0" lvl="0" indent="0" algn="l" defTabSz="1244600">
+          <a:pPr lvl="0" algn="l" defTabSz="1244600">
             <a:lnSpc>
               <a:spcPct val="90000"/>
             </a:lnSpc>
@@ -1719,7 +1738,6 @@
             <a:spcAft>
               <a:spcPct val="35000"/>
             </a:spcAft>
-            <a:buNone/>
           </a:pPr>
           <a:r>
             <a:rPr lang="ro-RO" sz="1100" kern="1200" dirty="0"/>
@@ -1819,7 +1837,7 @@
         </a:bodyPr>
         <a:lstStyle/>
         <a:p>
-          <a:pPr marL="0" lvl="0" indent="0" algn="ctr" defTabSz="1244600">
+          <a:pPr lvl="0" algn="ctr" defTabSz="1244600">
             <a:lnSpc>
               <a:spcPct val="90000"/>
             </a:lnSpc>
@@ -1829,7 +1847,6 @@
             <a:spcAft>
               <a:spcPct val="35000"/>
             </a:spcAft>
-            <a:buNone/>
           </a:pPr>
           <a:r>
             <a:rPr lang="ro-RO" sz="2800" kern="1200" dirty="0"/>
@@ -1837,7 +1854,7 @@
           </a:r>
         </a:p>
         <a:p>
-          <a:pPr marL="0" lvl="0" indent="0" algn="l" defTabSz="1244600">
+          <a:pPr lvl="0" algn="l" defTabSz="1244600">
             <a:lnSpc>
               <a:spcPct val="90000"/>
             </a:lnSpc>
@@ -1847,7 +1864,6 @@
             <a:spcAft>
               <a:spcPct val="35000"/>
             </a:spcAft>
-            <a:buNone/>
           </a:pPr>
           <a:r>
             <a:rPr lang="ro-RO" sz="1100" kern="1200" dirty="0"/>
@@ -1855,7 +1871,7 @@
           </a:r>
         </a:p>
         <a:p>
-          <a:pPr marL="0" lvl="0" indent="0" algn="l" defTabSz="1244600">
+          <a:pPr lvl="0" algn="l" defTabSz="1244600">
             <a:lnSpc>
               <a:spcPct val="90000"/>
             </a:lnSpc>
@@ -1865,7 +1881,6 @@
             <a:spcAft>
               <a:spcPct val="35000"/>
             </a:spcAft>
-            <a:buNone/>
           </a:pPr>
           <a:r>
             <a:rPr lang="ro-RO" sz="1100" kern="1200" dirty="0"/>
@@ -9602,8 +9617,20 @@
           </a:p>
           <a:p>
             <a:r>
+              <a:rPr lang="ro-RO" dirty="0" smtClean="0"/>
+              <a:t>Detal</a:t>
+            </a:r>
+            <a:r>
+              <a:rPr lang="en-US" dirty="0" err="1" smtClean="0"/>
+              <a:t>i</a:t>
+            </a:r>
+            <a:r>
+              <a:rPr lang="ro-RO" dirty="0" smtClean="0"/>
+              <a:t>ile </a:t>
+            </a:r>
+            <a:r>
               <a:rPr lang="ro-RO" dirty="0"/>
-              <a:t>Detallile imaginii(banda de frecvență înaltă) este limitată de lentile, PSF (blurr) și mișcare.</a:t>
+              <a:t>imaginii(banda de frecvență înaltă) este limitată de lentile, PSF (blurr) și mișcare.</a:t>
             </a:r>
           </a:p>
           <a:p>
@@ -9943,19 +9970,35 @@
               <a:t> de </a:t>
             </a:r>
             <a:r>
-              <a:rPr lang="en-US" sz="1200" dirty="0" err="1"/>
-              <a:t>rezolutie</a:t>
-            </a:r>
-            <a:r>
-              <a:rPr lang="en-US" sz="1200" dirty="0"/>
+              <a:rPr lang="en-US" sz="1200" dirty="0" err="1" smtClean="0"/>
+              <a:t>rezolu</a:t>
+            </a:r>
+            <a:r>
+              <a:rPr lang="ro-RO" sz="1200" dirty="0"/>
+              <a:t>ț</a:t>
+            </a:r>
+            <a:r>
+              <a:rPr lang="en-US" sz="1200" dirty="0" err="1" smtClean="0"/>
+              <a:t>ie</a:t>
+            </a:r>
+            <a:r>
+              <a:rPr lang="en-US" sz="1200" dirty="0" smtClean="0"/>
               <a:t> </a:t>
             </a:r>
             <a:r>
-              <a:rPr lang="en-US" sz="1200" dirty="0" err="1"/>
-              <a:t>inalta</a:t>
-            </a:r>
-            <a:r>
-              <a:rPr lang="en-US" sz="1200" dirty="0"/>
+              <a:rPr lang="ro-RO" sz="1200" dirty="0" err="1" smtClean="0"/>
+              <a:t>î</a:t>
+            </a:r>
+            <a:r>
+              <a:rPr lang="en-US" sz="1200" dirty="0" err="1" smtClean="0"/>
+              <a:t>nalt</a:t>
+            </a:r>
+            <a:r>
+              <a:rPr lang="ro-RO" sz="1200" dirty="0" smtClean="0"/>
+              <a:t>ă</a:t>
+            </a:r>
+            <a:r>
+              <a:rPr lang="en-US" sz="1200" dirty="0" smtClean="0"/>
               <a:t>.</a:t>
             </a:r>
             <a:endParaRPr lang="ro-RO" sz="1200" dirty="0"/>
@@ -10125,11 +10168,19 @@
               <a:t> </a:t>
             </a:r>
             <a:r>
-              <a:rPr lang="en-US" dirty="0" err="1"/>
-              <a:t>spuer-rezolutiei</a:t>
-            </a:r>
-            <a:r>
-              <a:rPr lang="en-US" dirty="0"/>
+              <a:rPr lang="en-US" dirty="0" err="1" smtClean="0"/>
+              <a:t>spuer-rezolu</a:t>
+            </a:r>
+            <a:r>
+              <a:rPr lang="ro-RO" dirty="0" smtClean="0"/>
+              <a:t>ț</a:t>
+            </a:r>
+            <a:r>
+              <a:rPr lang="en-US" dirty="0" err="1" smtClean="0"/>
+              <a:t>iei</a:t>
+            </a:r>
+            <a:r>
+              <a:rPr lang="en-US" dirty="0" smtClean="0"/>
               <a:t> </a:t>
             </a:r>
             <a:r>
@@ -10205,10 +10256,40 @@
               <a:t> </a:t>
             </a:r>
             <a:r>
+              <a:rPr lang="en-US" sz="1800" i="0" u="none" strike="noStrike" baseline="0" dirty="0" err="1" smtClean="0">
+                <a:latin typeface="BookAntiqua-Bold"/>
+              </a:rPr>
+              <a:t>incearc</a:t>
+            </a:r>
+            <a:r>
+              <a:rPr lang="ro-RO" sz="1800" i="0" u="none" strike="noStrike" baseline="0" dirty="0" smtClean="0">
+                <a:latin typeface="BookAntiqua-Bold"/>
+              </a:rPr>
+              <a:t>ă</a:t>
+            </a:r>
+            <a:r>
+              <a:rPr lang="en-US" sz="1800" i="0" u="none" strike="noStrike" baseline="0" dirty="0" smtClean="0">
+                <a:latin typeface="BookAntiqua-Bold"/>
+              </a:rPr>
+              <a:t> s</a:t>
+            </a:r>
+            <a:r>
+              <a:rPr lang="ro-RO" sz="1800" i="0" u="none" strike="noStrike" baseline="0" dirty="0" smtClean="0">
+                <a:latin typeface="BookAntiqua-Bold"/>
+              </a:rPr>
+              <a:t>ă</a:t>
+            </a:r>
+            <a:r>
+              <a:rPr lang="en-US" sz="1800" i="0" u="none" strike="noStrike" baseline="0" dirty="0" smtClean="0">
+                <a:latin typeface="BookAntiqua-Bold"/>
+              </a:rPr>
+              <a:t> </a:t>
+            </a:r>
+            <a:r>
               <a:rPr lang="en-US" sz="1800" i="0" u="none" strike="noStrike" baseline="0" dirty="0" err="1">
                 <a:latin typeface="BookAntiqua-Bold"/>
               </a:rPr>
-              <a:t>incearca</a:t>
+              <a:t>aproximeze</a:t>
             </a:r>
             <a:r>
               <a:rPr lang="en-US" sz="1800" i="0" u="none" strike="noStrike" baseline="0" dirty="0">
@@ -10217,10 +10298,34 @@
               <a:t> </a:t>
             </a:r>
             <a:r>
+              <a:rPr lang="en-US" sz="1800" i="0" u="none" strike="noStrike" baseline="0" dirty="0" smtClean="0">
+                <a:latin typeface="BookAntiqua-Bold"/>
+              </a:rPr>
+              <a:t>mi</a:t>
+            </a:r>
+            <a:r>
+              <a:rPr lang="ro-RO" sz="1800" i="0" u="none" strike="noStrike" baseline="0" dirty="0" smtClean="0">
+                <a:latin typeface="BookAntiqua-Bold"/>
+              </a:rPr>
+              <a:t>ș</a:t>
+            </a:r>
+            <a:r>
+              <a:rPr lang="en-US" sz="1800" i="0" u="none" strike="noStrike" baseline="0" dirty="0" err="1" smtClean="0">
+                <a:latin typeface="BookAntiqua-Bold"/>
+              </a:rPr>
+              <a:t>carea</a:t>
+            </a:r>
+            <a:r>
+              <a:rPr lang="en-US" sz="1800" i="0" u="none" strike="noStrike" baseline="0" dirty="0" smtClean="0">
+                <a:latin typeface="BookAntiqua-Bold"/>
+              </a:rPr>
+              <a:t> </a:t>
+            </a:r>
+            <a:r>
               <a:rPr lang="en-US" sz="1800" i="0" u="none" strike="noStrike" baseline="0" dirty="0" err="1">
                 <a:latin typeface="BookAntiqua-Bold"/>
               </a:rPr>
-              <a:t>sa</a:t>
+              <a:t>obiectelor</a:t>
             </a:r>
             <a:r>
               <a:rPr lang="en-US" sz="1800" i="0" u="none" strike="noStrike" baseline="0" dirty="0">
@@ -10229,10 +10334,64 @@
               <a:t> </a:t>
             </a:r>
             <a:r>
+              <a:rPr lang="ro-RO" sz="1800" i="0" u="none" strike="noStrike" baseline="0" dirty="0" smtClean="0">
+                <a:latin typeface="BookAntiqua-Bold"/>
+              </a:rPr>
+              <a:t>î</a:t>
+            </a:r>
+            <a:r>
+              <a:rPr lang="en-US" sz="1800" i="0" u="none" strike="noStrike" baseline="0" dirty="0" smtClean="0">
+                <a:latin typeface="BookAntiqua-Bold"/>
+              </a:rPr>
+              <a:t>n </a:t>
+            </a:r>
+            <a:r>
+              <a:rPr lang="en-US" sz="1800" i="0" u="none" strike="noStrike" baseline="0" dirty="0" err="1" smtClean="0">
+                <a:latin typeface="BookAntiqua-Bold"/>
+              </a:rPr>
+              <a:t>scen</a:t>
+            </a:r>
+            <a:r>
+              <a:rPr lang="ro-RO" sz="1800" i="0" u="none" strike="noStrike" baseline="0" dirty="0" smtClean="0">
+                <a:latin typeface="BookAntiqua-Bold"/>
+              </a:rPr>
+              <a:t>ă</a:t>
+            </a:r>
+            <a:r>
+              <a:rPr lang="en-US" sz="1800" i="0" u="none" strike="noStrike" baseline="0" dirty="0" smtClean="0">
+                <a:latin typeface="BookAntiqua-Bold"/>
+              </a:rPr>
+              <a:t> </a:t>
+            </a:r>
+            <a:r>
+              <a:rPr lang="ro-RO" dirty="0" err="1">
+                <a:latin typeface="BookAntiqua-Bold"/>
+              </a:rPr>
+              <a:t>ș</a:t>
+            </a:r>
+            <a:r>
+              <a:rPr lang="en-US" sz="1800" i="0" u="none" strike="noStrike" baseline="0" dirty="0" err="1" smtClean="0">
+                <a:latin typeface="BookAntiqua-Bold"/>
+              </a:rPr>
+              <a:t>i</a:t>
+            </a:r>
+            <a:r>
+              <a:rPr lang="en-US" sz="1800" i="0" u="none" strike="noStrike" baseline="0" dirty="0" smtClean="0">
+                <a:latin typeface="BookAntiqua-Bold"/>
+              </a:rPr>
+              <a:t> </a:t>
+            </a:r>
+            <a:r>
+              <a:rPr lang="en-US" sz="1800" i="0" u="none" strike="noStrike" baseline="0" dirty="0">
+                <a:latin typeface="BookAntiqua-Bold"/>
+              </a:rPr>
+              <a:t>pe </a:t>
+            </a:r>
+            <a:r>
               <a:rPr lang="en-US" sz="1800" i="0" u="none" strike="noStrike" baseline="0" dirty="0" err="1">
                 <a:latin typeface="BookAntiqua-Bold"/>
               </a:rPr>
-              <a:t>aproximeze</a:t>
+              <a:t>baza</a:t>
             </a:r>
             <a:r>
               <a:rPr lang="en-US" sz="1800" i="0" u="none" strike="noStrike" baseline="0" dirty="0">
@@ -10244,7 +10403,7 @@
               <a:rPr lang="en-US" sz="1800" i="0" u="none" strike="noStrike" baseline="0" dirty="0" err="1">
                 <a:latin typeface="BookAntiqua-Bold"/>
               </a:rPr>
-              <a:t>miscarea</a:t>
+              <a:t>acestor</a:t>
             </a:r>
             <a:r>
               <a:rPr lang="en-US" sz="1800" i="0" u="none" strike="noStrike" baseline="0" dirty="0">
@@ -10253,34 +10412,106 @@
               <a:t> </a:t>
             </a:r>
             <a:r>
+              <a:rPr lang="en-US" sz="1800" i="0" u="none" strike="noStrike" baseline="0" dirty="0" smtClean="0">
+                <a:latin typeface="BookAntiqua-Bold"/>
+              </a:rPr>
+              <a:t>mi</a:t>
+            </a:r>
+            <a:r>
+              <a:rPr lang="ro-RO" sz="1800" i="0" u="none" strike="noStrike" baseline="0" dirty="0" smtClean="0">
+                <a:latin typeface="BookAntiqua-Bold"/>
+              </a:rPr>
+              <a:t>ș</a:t>
+            </a:r>
+            <a:r>
+              <a:rPr lang="en-US" sz="1800" i="0" u="none" strike="noStrike" baseline="0" dirty="0" smtClean="0">
+                <a:latin typeface="BookAntiqua-Bold"/>
+              </a:rPr>
+              <a:t>c</a:t>
+            </a:r>
+            <a:r>
+              <a:rPr lang="ro-RO" sz="1800" i="0" u="none" strike="noStrike" baseline="0" dirty="0" smtClean="0">
+                <a:latin typeface="BookAntiqua-Bold"/>
+              </a:rPr>
+              <a:t>ă</a:t>
+            </a:r>
+            <a:r>
+              <a:rPr lang="en-US" sz="1800" i="0" u="none" strike="noStrike" baseline="0" dirty="0" err="1" smtClean="0">
+                <a:latin typeface="BookAntiqua-Bold"/>
+              </a:rPr>
+              <a:t>ri</a:t>
+            </a:r>
+            <a:r>
+              <a:rPr lang="en-US" sz="1800" i="0" u="none" strike="noStrike" baseline="0" dirty="0" smtClean="0">
+                <a:latin typeface="BookAntiqua-Bold"/>
+              </a:rPr>
+              <a:t> s</a:t>
+            </a:r>
+            <a:r>
+              <a:rPr lang="ro-RO" sz="1800" i="0" u="none" strike="noStrike" baseline="0" dirty="0" smtClean="0">
+                <a:latin typeface="BookAntiqua-Bold"/>
+              </a:rPr>
+              <a:t>ă</a:t>
+            </a:r>
+            <a:r>
+              <a:rPr lang="en-US" sz="1800" i="0" u="none" strike="noStrike" baseline="0" dirty="0" smtClean="0">
+                <a:latin typeface="BookAntiqua-Bold"/>
+              </a:rPr>
+              <a:t> </a:t>
+            </a:r>
+            <a:r>
+              <a:rPr lang="en-US" sz="1800" i="0" u="none" strike="noStrike" baseline="0" dirty="0" err="1" smtClean="0">
+                <a:latin typeface="BookAntiqua-Bold"/>
+              </a:rPr>
+              <a:t>ob</a:t>
+            </a:r>
+            <a:r>
+              <a:rPr lang="ro-RO" sz="1800" i="0" u="none" strike="noStrike" baseline="0" dirty="0" smtClean="0">
+                <a:latin typeface="BookAntiqua-Bold"/>
+              </a:rPr>
+              <a:t>ț</a:t>
+            </a:r>
+            <a:r>
+              <a:rPr lang="en-US" sz="1800" i="0" u="none" strike="noStrike" baseline="0" dirty="0" smtClean="0">
+                <a:latin typeface="BookAntiqua-Bold"/>
+              </a:rPr>
+              <a:t>in</a:t>
+            </a:r>
+            <a:r>
+              <a:rPr lang="ro-RO" sz="1800" i="0" u="none" strike="noStrike" baseline="0" dirty="0" smtClean="0">
+                <a:latin typeface="BookAntiqua-Bold"/>
+              </a:rPr>
+              <a:t>ă</a:t>
+            </a:r>
+            <a:r>
+              <a:rPr lang="en-US" sz="1800" i="0" u="none" strike="noStrike" baseline="0" dirty="0" smtClean="0">
+                <a:latin typeface="BookAntiqua-Bold"/>
+              </a:rPr>
+              <a:t> </a:t>
+            </a:r>
+            <a:r>
+              <a:rPr lang="en-US" sz="1800" i="0" u="none" strike="noStrike" baseline="0" dirty="0" err="1" smtClean="0">
+                <a:latin typeface="BookAntiqua-Bold"/>
+              </a:rPr>
+              <a:t>informa</a:t>
+            </a:r>
+            <a:r>
+              <a:rPr lang="ro-RO" sz="1800" i="0" u="none" strike="noStrike" baseline="0" dirty="0" smtClean="0">
+                <a:latin typeface="BookAntiqua-Bold"/>
+              </a:rPr>
+              <a:t>ț</a:t>
+            </a:r>
+            <a:r>
+              <a:rPr lang="en-US" sz="1800" i="0" u="none" strike="noStrike" baseline="0" dirty="0" smtClean="0">
+                <a:latin typeface="BookAntiqua-Bold"/>
+              </a:rPr>
+              <a:t>ii </a:t>
+            </a:r>
+            <a:r>
               <a:rPr lang="en-US" sz="1800" i="0" u="none" strike="noStrike" baseline="0" dirty="0" err="1">
                 <a:latin typeface="BookAntiqua-Bold"/>
               </a:rPr>
-              <a:t>obiectelor</a:t>
-            </a:r>
-            <a:r>
-              <a:rPr lang="en-US" sz="1800" i="0" u="none" strike="noStrike" baseline="0" dirty="0">
-                <a:latin typeface="BookAntiqua-Bold"/>
-              </a:rPr>
-              <a:t> in scena </a:t>
-            </a:r>
-            <a:r>
-              <a:rPr lang="en-US" sz="1800" i="0" u="none" strike="noStrike" baseline="0" dirty="0" err="1">
-                <a:latin typeface="BookAntiqua-Bold"/>
-              </a:rPr>
-              <a:t>si</a:t>
-            </a:r>
-            <a:r>
-              <a:rPr lang="en-US" sz="1800" i="0" u="none" strike="noStrike" baseline="0" dirty="0">
-                <a:latin typeface="BookAntiqua-Bold"/>
-              </a:rPr>
-              <a:t> pe </a:t>
-            </a:r>
-            <a:r>
-              <a:rPr lang="en-US" sz="1800" i="0" u="none" strike="noStrike" baseline="0" dirty="0" err="1">
-                <a:latin typeface="BookAntiqua-Bold"/>
-              </a:rPr>
-              <a:t>baza</a:t>
+              <a:t>noi</a:t>
             </a:r>
             <a:r>
               <a:rPr lang="en-US" sz="1800" i="0" u="none" strike="noStrike" baseline="0" dirty="0">
@@ -10292,7 +10523,7 @@
               <a:rPr lang="en-US" sz="1800" i="0" u="none" strike="noStrike" baseline="0" dirty="0" err="1">
                 <a:latin typeface="BookAntiqua-Bold"/>
               </a:rPr>
-              <a:t>acestor</a:t>
+              <a:t>ce</a:t>
             </a:r>
             <a:r>
               <a:rPr lang="en-US" sz="1800" i="0" u="none" strike="noStrike" baseline="0" dirty="0">
@@ -10301,10 +10532,58 @@
               <a:t> </a:t>
             </a:r>
             <a:r>
+              <a:rPr lang="en-US" sz="1800" i="0" u="none" strike="noStrike" baseline="0" dirty="0" err="1" smtClean="0">
+                <a:latin typeface="BookAntiqua-Bold"/>
+              </a:rPr>
+              <a:t>ajut</a:t>
+            </a:r>
+            <a:r>
+              <a:rPr lang="ro-RO" sz="1800" i="0" u="none" strike="noStrike" baseline="0" dirty="0" smtClean="0">
+                <a:latin typeface="BookAntiqua-Bold"/>
+              </a:rPr>
+              <a:t>ă</a:t>
+            </a:r>
+            <a:r>
+              <a:rPr lang="en-US" sz="1800" i="0" u="none" strike="noStrike" baseline="0" dirty="0" smtClean="0">
+                <a:latin typeface="BookAntiqua-Bold"/>
+              </a:rPr>
+              <a:t> </a:t>
+            </a:r>
+            <a:r>
+              <a:rPr lang="en-US" sz="1800" i="0" u="none" strike="noStrike" baseline="0" dirty="0">
+                <a:latin typeface="BookAntiqua-Bold"/>
+              </a:rPr>
+              <a:t>la </a:t>
+            </a:r>
+            <a:r>
+              <a:rPr lang="en-US" sz="1800" i="0" u="none" strike="noStrike" baseline="0" dirty="0" err="1" smtClean="0">
+                <a:latin typeface="BookAntiqua-Bold"/>
+              </a:rPr>
+              <a:t>reconstruc</a:t>
+            </a:r>
+            <a:r>
+              <a:rPr lang="ro-RO" sz="1800" i="0" u="none" strike="noStrike" baseline="0" dirty="0" smtClean="0">
+                <a:latin typeface="BookAntiqua-Bold"/>
+              </a:rPr>
+              <a:t>ț</a:t>
+            </a:r>
+            <a:r>
+              <a:rPr lang="en-US" sz="1800" i="0" u="none" strike="noStrike" baseline="0" dirty="0" err="1" smtClean="0">
+                <a:latin typeface="BookAntiqua-Bold"/>
+              </a:rPr>
+              <a:t>ia</a:t>
+            </a:r>
+            <a:r>
+              <a:rPr lang="en-US" sz="1800" i="0" u="none" strike="noStrike" baseline="0" dirty="0" smtClean="0">
+                <a:latin typeface="BookAntiqua-Bold"/>
+              </a:rPr>
+              <a:t> </a:t>
+            </a:r>
+            <a:r>
               <a:rPr lang="en-US" sz="1800" i="0" u="none" strike="noStrike" baseline="0" dirty="0" err="1">
                 <a:latin typeface="BookAntiqua-Bold"/>
               </a:rPr>
-              <a:t>miscari</a:t>
+              <a:t>mai</a:t>
             </a:r>
             <a:r>
               <a:rPr lang="en-US" sz="1800" i="0" u="none" strike="noStrike" baseline="0" dirty="0">
@@ -10313,112 +10592,28 @@
               <a:t> </a:t>
             </a:r>
             <a:r>
-              <a:rPr lang="en-US" sz="1800" i="0" u="none" strike="noStrike" baseline="0" dirty="0" err="1">
+              <a:rPr lang="en-US" sz="1800" i="0" u="none" strike="noStrike" baseline="0" dirty="0" err="1" smtClean="0">
                 <a:latin typeface="BookAntiqua-Bold"/>
               </a:rPr>
-              <a:t>sa</a:t>
+              <a:t>fidel</a:t>
+            </a:r>
+            <a:r>
+              <a:rPr lang="ro-RO" sz="1800" i="0" u="none" strike="noStrike" baseline="0" dirty="0" smtClean="0">
+                <a:latin typeface="BookAntiqua-Bold"/>
+              </a:rPr>
+              <a:t>ă</a:t>
+            </a:r>
+            <a:r>
+              <a:rPr lang="en-US" sz="1800" i="0" u="none" strike="noStrike" baseline="0" dirty="0" smtClean="0">
+                <a:latin typeface="BookAntiqua-Bold"/>
+              </a:rPr>
+              <a:t> </a:t>
             </a:r>
             <a:r>
               <a:rPr lang="en-US" sz="1800" i="0" u="none" strike="noStrike" baseline="0" dirty="0">
                 <a:latin typeface="BookAntiqua-Bold"/>
               </a:rPr>
-              <a:t> </a:t>
-            </a:r>
-            <a:r>
-              <a:rPr lang="en-US" sz="1800" i="0" u="none" strike="noStrike" baseline="0" dirty="0" err="1">
-                <a:latin typeface="BookAntiqua-Bold"/>
-              </a:rPr>
-              <a:t>obtina</a:t>
-            </a:r>
-            <a:r>
-              <a:rPr lang="en-US" sz="1800" i="0" u="none" strike="noStrike" baseline="0" dirty="0">
-                <a:latin typeface="BookAntiqua-Bold"/>
-              </a:rPr>
-              <a:t> </a:t>
-            </a:r>
-            <a:r>
-              <a:rPr lang="en-US" sz="1800" i="0" u="none" strike="noStrike" baseline="0" dirty="0" err="1">
-                <a:latin typeface="BookAntiqua-Bold"/>
-              </a:rPr>
-              <a:t>informatii</a:t>
-            </a:r>
-            <a:r>
-              <a:rPr lang="en-US" sz="1800" i="0" u="none" strike="noStrike" baseline="0" dirty="0">
-                <a:latin typeface="BookAntiqua-Bold"/>
-              </a:rPr>
-              <a:t> </a:t>
-            </a:r>
-            <a:r>
-              <a:rPr lang="en-US" sz="1800" i="0" u="none" strike="noStrike" baseline="0" dirty="0" err="1">
-                <a:latin typeface="BookAntiqua-Bold"/>
-              </a:rPr>
-              <a:t>noi</a:t>
-            </a:r>
-            <a:r>
-              <a:rPr lang="en-US" sz="1800" i="0" u="none" strike="noStrike" baseline="0" dirty="0">
-                <a:latin typeface="BookAntiqua-Bold"/>
-              </a:rPr>
-              <a:t> </a:t>
-            </a:r>
-            <a:r>
-              <a:rPr lang="en-US" sz="1800" i="0" u="none" strike="noStrike" baseline="0" dirty="0" err="1">
-                <a:latin typeface="BookAntiqua-Bold"/>
-              </a:rPr>
-              <a:t>ce</a:t>
-            </a:r>
-            <a:r>
-              <a:rPr lang="en-US" sz="1800" i="0" u="none" strike="noStrike" baseline="0" dirty="0">
-                <a:latin typeface="BookAntiqua-Bold"/>
-              </a:rPr>
-              <a:t> </a:t>
-            </a:r>
-            <a:r>
-              <a:rPr lang="en-US" sz="1800" i="0" u="none" strike="noStrike" baseline="0" dirty="0" err="1">
-                <a:latin typeface="BookAntiqua-Bold"/>
-              </a:rPr>
-              <a:t>ajuta</a:t>
-            </a:r>
-            <a:r>
-              <a:rPr lang="en-US" sz="1800" i="0" u="none" strike="noStrike" baseline="0" dirty="0">
-                <a:latin typeface="BookAntiqua-Bold"/>
-              </a:rPr>
-              <a:t> la </a:t>
-            </a:r>
-            <a:r>
-              <a:rPr lang="en-US" sz="1800" i="0" u="none" strike="noStrike" baseline="0" dirty="0" err="1">
-                <a:latin typeface="BookAntiqua-Bold"/>
-              </a:rPr>
-              <a:t>reconstructia</a:t>
-            </a:r>
-            <a:r>
-              <a:rPr lang="en-US" sz="1800" i="0" u="none" strike="noStrike" baseline="0" dirty="0">
-                <a:latin typeface="BookAntiqua-Bold"/>
-              </a:rPr>
-              <a:t> </a:t>
-            </a:r>
-            <a:r>
-              <a:rPr lang="en-US" sz="1800" i="0" u="none" strike="noStrike" baseline="0" dirty="0" err="1">
-                <a:latin typeface="BookAntiqua-Bold"/>
-              </a:rPr>
-              <a:t>mai</a:t>
-            </a:r>
-            <a:r>
-              <a:rPr lang="en-US" sz="1800" i="0" u="none" strike="noStrike" baseline="0" dirty="0">
-                <a:latin typeface="BookAntiqua-Bold"/>
-              </a:rPr>
-              <a:t> </a:t>
-            </a:r>
-            <a:r>
-              <a:rPr lang="en-US" sz="1800" i="0" u="none" strike="noStrike" baseline="0" dirty="0" err="1">
-                <a:latin typeface="BookAntiqua-Bold"/>
-              </a:rPr>
-              <a:t>fidela</a:t>
-            </a:r>
-            <a:r>
-              <a:rPr lang="en-US" sz="1800" i="0" u="none" strike="noStrike" baseline="0" dirty="0">
-                <a:latin typeface="BookAntiqua-Bold"/>
-              </a:rPr>
-              <a:t> a </a:t>
+              <a:t>a </a:t>
             </a:r>
             <a:r>
               <a:rPr lang="en-US" sz="1800" i="0" u="none" strike="noStrike" baseline="0" dirty="0" err="1">
@@ -10457,18 +10652,80 @@
           </a:p>
           <a:p>
             <a:r>
-              <a:rPr lang="ro-RO" dirty="0"/>
-              <a:t>TODO</a:t>
+              <a:rPr lang="en-US" dirty="0" smtClean="0"/>
+              <a:t>BEYOND </a:t>
             </a:r>
             <a:r>
               <a:rPr lang="en-US" dirty="0"/>
-              <a:t>: ADD BEYOND STATE OF THE ART</a:t>
-            </a:r>
-          </a:p>
-          <a:p>
+              <a:t>STATE OF THE </a:t>
+            </a:r>
+            <a:r>
+              <a:rPr lang="en-US" dirty="0" smtClean="0"/>
+              <a:t>ART : </a:t>
+            </a:r>
+            <a:r>
+              <a:rPr lang="en-US" dirty="0" err="1" smtClean="0"/>
+              <a:t>Oricare</a:t>
+            </a:r>
+            <a:r>
+              <a:rPr lang="en-US" dirty="0" smtClean="0"/>
+              <a:t> </a:t>
+            </a:r>
+            <a:r>
+              <a:rPr lang="en-US" dirty="0" err="1" smtClean="0"/>
+              <a:t>dintre</a:t>
+            </a:r>
+            <a:r>
+              <a:rPr lang="en-US" dirty="0"/>
+              <a:t>:</a:t>
+            </a:r>
+            <a:endParaRPr lang="en-US" dirty="0"/>
+          </a:p>
+          <a:p>
+            <a:pPr lvl="1"/>
+            <a:r>
+              <a:rPr lang="en-US" dirty="0" smtClean="0"/>
+              <a:t>M</a:t>
+            </a:r>
+            <a:r>
+              <a:rPr lang="ro-RO" dirty="0" smtClean="0"/>
+              <a:t>ă</a:t>
+            </a:r>
+            <a:r>
+              <a:rPr lang="en-US" dirty="0" err="1" smtClean="0"/>
+              <a:t>rirea</a:t>
+            </a:r>
+            <a:r>
+              <a:rPr lang="en-US" dirty="0" smtClean="0"/>
+              <a:t> </a:t>
+            </a:r>
+            <a:r>
+              <a:rPr lang="en-US" dirty="0" err="1" smtClean="0"/>
+              <a:t>preforman</a:t>
+            </a:r>
+            <a:r>
+              <a:rPr lang="ro-RO" dirty="0" smtClean="0"/>
+              <a:t>ț</a:t>
+            </a:r>
+            <a:r>
+              <a:rPr lang="en-US" dirty="0" err="1" smtClean="0"/>
+              <a:t>ei</a:t>
+            </a:r>
+            <a:r>
+              <a:rPr lang="en-US" dirty="0" smtClean="0"/>
+              <a:t> (</a:t>
+            </a:r>
+            <a:r>
+              <a:rPr lang="en-US" dirty="0" err="1" smtClean="0"/>
+              <a:t>metoda</a:t>
+            </a:r>
+            <a:r>
+              <a:rPr lang="en-US" dirty="0" smtClean="0"/>
+              <a:t> </a:t>
+            </a:r>
             <a:r>
               <a:rPr lang="en-US" dirty="0" err="1"/>
-              <a:t>Metoda</a:t>
+              <a:t>este</a:t>
             </a:r>
             <a:r>
               <a:rPr lang="en-US" dirty="0"/>
@@ -10476,128 +10733,201 @@
             </a:r>
             <a:r>
               <a:rPr lang="en-US" dirty="0" err="1"/>
-              <a:t>este</a:t>
+              <a:t>destul</a:t>
+            </a:r>
+            <a:r>
+              <a:rPr lang="en-US" dirty="0"/>
+              <a:t> de </a:t>
+            </a:r>
+            <a:r>
+              <a:rPr lang="ro-RO" dirty="0" smtClean="0"/>
+              <a:t>lentă</a:t>
+            </a:r>
+            <a:r>
+              <a:rPr lang="en-US" dirty="0" smtClean="0"/>
+              <a:t>)</a:t>
+            </a:r>
+            <a:endParaRPr lang="en-US" dirty="0"/>
+          </a:p>
+          <a:p>
+            <a:pPr lvl="1"/>
+            <a:r>
+              <a:rPr lang="en-US" dirty="0" err="1" smtClean="0"/>
+              <a:t>Optimiz</a:t>
+            </a:r>
+            <a:r>
+              <a:rPr lang="ro-RO" dirty="0" smtClean="0"/>
+              <a:t>ă</a:t>
+            </a:r>
+            <a:r>
+              <a:rPr lang="en-US" dirty="0" err="1" smtClean="0"/>
+              <a:t>ri</a:t>
+            </a:r>
+            <a:r>
+              <a:rPr lang="en-US" dirty="0" smtClean="0"/>
+              <a:t> </a:t>
+            </a:r>
+            <a:r>
+              <a:rPr lang="ro-RO" dirty="0"/>
+              <a:t>î</a:t>
+            </a:r>
+            <a:r>
+              <a:rPr lang="en-US" dirty="0" smtClean="0"/>
+              <a:t>n </a:t>
+            </a:r>
+            <a:r>
+              <a:rPr lang="en-US" dirty="0" err="1" smtClean="0"/>
+              <a:t>func</a:t>
+            </a:r>
+            <a:r>
+              <a:rPr lang="ro-RO" dirty="0" smtClean="0"/>
+              <a:t>ț</a:t>
+            </a:r>
+            <a:r>
+              <a:rPr lang="en-US" dirty="0" err="1" smtClean="0"/>
+              <a:t>ie</a:t>
+            </a:r>
+            <a:r>
+              <a:rPr lang="en-US" dirty="0" smtClean="0"/>
+              <a:t> </a:t>
+            </a:r>
+            <a:r>
+              <a:rPr lang="en-US" dirty="0"/>
+              <a:t>de </a:t>
+            </a:r>
+            <a:r>
+              <a:rPr lang="en-US" dirty="0" err="1" smtClean="0"/>
+              <a:t>scen</a:t>
+            </a:r>
+            <a:r>
+              <a:rPr lang="ro-RO" dirty="0" smtClean="0"/>
+              <a:t>ă</a:t>
+            </a:r>
+            <a:r>
+              <a:rPr lang="en-US" dirty="0" smtClean="0"/>
+              <a:t> (</a:t>
+            </a:r>
+            <a:r>
+              <a:rPr lang="en-US" dirty="0" err="1" smtClean="0"/>
+              <a:t>scen</a:t>
+            </a:r>
+            <a:r>
+              <a:rPr lang="ro-RO" dirty="0" smtClean="0"/>
+              <a:t>ă</a:t>
+            </a:r>
+            <a:r>
+              <a:rPr lang="en-US" dirty="0" smtClean="0"/>
+              <a:t> </a:t>
+            </a:r>
+            <a:r>
+              <a:rPr lang="en-US" dirty="0" err="1"/>
+              <a:t>intens</a:t>
             </a:r>
             <a:r>
               <a:rPr lang="en-US" dirty="0"/>
               <a:t> </a:t>
             </a:r>
             <a:r>
+              <a:rPr lang="en-US" dirty="0" err="1" smtClean="0"/>
+              <a:t>luminat</a:t>
+            </a:r>
+            <a:r>
+              <a:rPr lang="ro-RO" dirty="0" smtClean="0"/>
+              <a:t>ă</a:t>
+            </a:r>
+            <a:r>
+              <a:rPr lang="en-US" dirty="0" smtClean="0"/>
+              <a:t>/</a:t>
+            </a:r>
+            <a:r>
+              <a:rPr lang="en-US" dirty="0" err="1" smtClean="0"/>
+              <a:t>scen</a:t>
+            </a:r>
+            <a:r>
+              <a:rPr lang="ro-RO" dirty="0" smtClean="0"/>
+              <a:t>ă</a:t>
+            </a:r>
+            <a:r>
+              <a:rPr lang="en-US" dirty="0" smtClean="0"/>
+              <a:t> </a:t>
+            </a:r>
+            <a:r>
+              <a:rPr lang="ro-RO" dirty="0"/>
+              <a:t>î</a:t>
+            </a:r>
+            <a:r>
+              <a:rPr lang="en-US" dirty="0" err="1" smtClean="0"/>
+              <a:t>ntunecat</a:t>
+            </a:r>
+            <a:r>
+              <a:rPr lang="ro-RO" dirty="0" smtClean="0"/>
+              <a:t>ă</a:t>
+            </a:r>
+            <a:r>
+              <a:rPr lang="en-US" dirty="0" smtClean="0"/>
+              <a:t>)</a:t>
+            </a:r>
+            <a:endParaRPr lang="en-US" dirty="0"/>
+          </a:p>
+          <a:p>
+            <a:pPr lvl="1"/>
+            <a:r>
+              <a:rPr lang="en-US" dirty="0" smtClean="0"/>
+              <a:t>Ob</a:t>
+            </a:r>
+            <a:r>
+              <a:rPr lang="ro-RO" dirty="0" smtClean="0"/>
+              <a:t>ț</a:t>
+            </a:r>
+            <a:r>
+              <a:rPr lang="en-US" dirty="0" err="1" smtClean="0"/>
+              <a:t>inerea</a:t>
+            </a:r>
+            <a:r>
+              <a:rPr lang="en-US" dirty="0" smtClean="0"/>
+              <a:t> </a:t>
+            </a:r>
+            <a:r>
               <a:rPr lang="en-US" dirty="0" err="1"/>
-              <a:t>destul</a:t>
-            </a:r>
-            <a:r>
-              <a:rPr lang="en-US" dirty="0"/>
-              <a:t> de </a:t>
-            </a:r>
-            <a:r>
-              <a:rPr lang="en-US" dirty="0" err="1"/>
-              <a:t>inceata</a:t>
-            </a:r>
-            <a:r>
-              <a:rPr lang="en-US" dirty="0"/>
-              <a:t> -&gt; </a:t>
-            </a:r>
-            <a:r>
-              <a:rPr lang="en-US" dirty="0" err="1"/>
-              <a:t>marirea</a:t>
+              <a:t>unei</a:t>
             </a:r>
             <a:r>
               <a:rPr lang="en-US" dirty="0"/>
               <a:t> </a:t>
             </a:r>
             <a:r>
+              <a:rPr lang="en-US" dirty="0" err="1" smtClean="0"/>
+              <a:t>calit</a:t>
+            </a:r>
+            <a:r>
+              <a:rPr lang="ro-RO" dirty="0" smtClean="0"/>
+              <a:t>ă</a:t>
+            </a:r>
+            <a:r>
+              <a:rPr lang="ro-RO" dirty="0"/>
+              <a:t>ț</a:t>
+            </a:r>
+            <a:r>
+              <a:rPr lang="en-US" dirty="0" err="1" smtClean="0"/>
+              <a:t>i</a:t>
+            </a:r>
+            <a:r>
+              <a:rPr lang="en-US" dirty="0" smtClean="0"/>
+              <a:t> </a:t>
+            </a:r>
+            <a:r>
               <a:rPr lang="en-US" dirty="0" err="1"/>
-              <a:t>preformantei</a:t>
-            </a:r>
-            <a:r>
-              <a:rPr lang="en-US" dirty="0"/>
-              <a:t> ?</a:t>
-            </a:r>
-          </a:p>
-          <a:p>
-            <a:r>
-              <a:rPr lang="en-US" dirty="0" err="1"/>
-              <a:t>Optimizai</a:t>
-            </a:r>
-            <a:r>
-              <a:rPr lang="en-US" dirty="0"/>
-              <a:t> in </a:t>
-            </a:r>
-            <a:r>
-              <a:rPr lang="en-US" dirty="0" err="1"/>
-              <a:t>functie</a:t>
-            </a:r>
-            <a:r>
-              <a:rPr lang="en-US" dirty="0"/>
-              <a:t> de scena? -&gt; scena </a:t>
-            </a:r>
-            <a:r>
-              <a:rPr lang="en-US" dirty="0" err="1"/>
-              <a:t>intens</a:t>
+              <a:t>mai</a:t>
             </a:r>
             <a:r>
               <a:rPr lang="en-US" dirty="0"/>
               <a:t> </a:t>
             </a:r>
             <a:r>
-              <a:rPr lang="en-US" dirty="0" err="1"/>
-              <a:t>luminata</a:t>
-            </a:r>
-            <a:r>
-              <a:rPr lang="en-US" dirty="0"/>
-              <a:t>/scena </a:t>
-            </a:r>
-            <a:r>
-              <a:rPr lang="en-US" dirty="0" err="1"/>
-              <a:t>intunecata</a:t>
-            </a:r>
-            <a:r>
-              <a:rPr lang="en-US" dirty="0"/>
-              <a:t>?</a:t>
-            </a:r>
-          </a:p>
-          <a:p>
-            <a:r>
-              <a:rPr lang="en-US" dirty="0" err="1"/>
-              <a:t>Obtinerea</a:t>
-            </a:r>
-            <a:r>
-              <a:rPr lang="en-US" dirty="0"/>
-              <a:t> </a:t>
-            </a:r>
-            <a:r>
-              <a:rPr lang="en-US" dirty="0" err="1"/>
-              <a:t>unei</a:t>
-            </a:r>
-            <a:r>
-              <a:rPr lang="en-US" dirty="0"/>
-              <a:t> </a:t>
-            </a:r>
-            <a:r>
-              <a:rPr lang="en-US" dirty="0" err="1"/>
-              <a:t>calitati</a:t>
-            </a:r>
-            <a:r>
-              <a:rPr lang="en-US" dirty="0"/>
-              <a:t> </a:t>
-            </a:r>
-            <a:r>
-              <a:rPr lang="en-US" dirty="0" err="1"/>
-              <a:t>mai</a:t>
-            </a:r>
-            <a:r>
-              <a:rPr lang="en-US" dirty="0"/>
-              <a:t> </a:t>
-            </a:r>
-            <a:r>
-              <a:rPr lang="en-US" dirty="0" err="1"/>
+              <a:rPr lang="en-US" dirty="0" err="1" smtClean="0"/>
               <a:t>bune</a:t>
             </a:r>
-            <a:r>
-              <a:rPr lang="en-US" dirty="0"/>
-              <a:t> ?</a:t>
-            </a:r>
+            <a:endParaRPr lang="en-US" dirty="0"/>
           </a:p>
           <a:p>
             <a:endParaRPr lang="en-US" dirty="0"/>
@@ -10659,16 +10989,28 @@
           <a:lstStyle/>
           <a:p>
             <a:r>
+              <a:rPr lang="en-US" dirty="0" smtClean="0"/>
+              <a:t>S</a:t>
+            </a:r>
+            <a:r>
+              <a:rPr lang="ro-RO" dirty="0" smtClean="0"/>
+              <a:t>OLUȚIA</a:t>
+            </a:r>
+            <a:r>
+              <a:rPr lang="en-US" dirty="0" smtClean="0"/>
+              <a:t> P</a:t>
+            </a:r>
+            <a:r>
+              <a:rPr lang="ro-RO" dirty="0" smtClean="0"/>
+              <a:t>ROPUSĂ</a:t>
+            </a:r>
+            <a:r>
+              <a:rPr lang="en-US" dirty="0" smtClean="0"/>
+              <a:t> </a:t>
+            </a:r>
+            <a:r>
               <a:rPr lang="en-US" dirty="0"/>
-              <a:t>Solutia </a:t>
-            </a:r>
-            <a:r>
-              <a:rPr lang="en-US" dirty="0" err="1"/>
-              <a:t>Propusa</a:t>
-            </a:r>
-            <a:r>
-              <a:rPr lang="en-US" dirty="0"/>
-              <a:t> 2</a:t>
+              <a:t>2</a:t>
             </a:r>
             <a:endParaRPr lang="ro-RO" dirty="0"/>
           </a:p>

</xml_diff>

<commit_message>
adding small changes to sprint 1 upload files.
</commit_message>
<xml_diff>
--- a/SUPER RESOLUTION A SPATIAL SUBPIXEL INTERPOLATION TECHNIQUE_sprint_1.pptx
+++ b/SUPER RESOLUTION A SPATIAL SUBPIXEL INTERPOLATION TECHNIQUE_sprint_1.pptx
@@ -3975,7 +3975,7 @@
           <a:p>
             <a:fld id="{4A30D792-577E-4294-AC98-BDD92C8FEA57}" type="datetimeFigureOut">
               <a:rPr lang="en-US" smtClean="0"/>
-              <a:t>11/2/2020</a:t>
+              <a:t>11/4/2020</a:t>
             </a:fld>
             <a:endParaRPr lang="en-US"/>
           </a:p>
@@ -4226,7 +4226,7 @@
           <a:p>
             <a:fld id="{4A30D792-577E-4294-AC98-BDD92C8FEA57}" type="datetimeFigureOut">
               <a:rPr lang="en-US" smtClean="0"/>
-              <a:t>11/2/2020</a:t>
+              <a:t>11/4/2020</a:t>
             </a:fld>
             <a:endParaRPr lang="en-US"/>
           </a:p>
@@ -4540,7 +4540,7 @@
           <a:p>
             <a:fld id="{4A30D792-577E-4294-AC98-BDD92C8FEA57}" type="datetimeFigureOut">
               <a:rPr lang="en-US" smtClean="0"/>
-              <a:t>11/2/2020</a:t>
+              <a:t>11/4/2020</a:t>
             </a:fld>
             <a:endParaRPr lang="en-US"/>
           </a:p>
@@ -4881,7 +4881,7 @@
           <a:p>
             <a:fld id="{4A30D792-577E-4294-AC98-BDD92C8FEA57}" type="datetimeFigureOut">
               <a:rPr lang="en-US" smtClean="0"/>
-              <a:t>11/2/2020</a:t>
+              <a:t>11/4/2020</a:t>
             </a:fld>
             <a:endParaRPr lang="en-US"/>
           </a:p>
@@ -5195,7 +5195,7 @@
           <a:p>
             <a:fld id="{4A30D792-577E-4294-AC98-BDD92C8FEA57}" type="datetimeFigureOut">
               <a:rPr lang="en-US" smtClean="0"/>
-              <a:t>11/2/2020</a:t>
+              <a:t>11/4/2020</a:t>
             </a:fld>
             <a:endParaRPr lang="en-US"/>
           </a:p>
@@ -5588,7 +5588,7 @@
           <a:p>
             <a:fld id="{4A30D792-577E-4294-AC98-BDD92C8FEA57}" type="datetimeFigureOut">
               <a:rPr lang="en-US" smtClean="0"/>
-              <a:t>11/2/2020</a:t>
+              <a:t>11/4/2020</a:t>
             </a:fld>
             <a:endParaRPr lang="en-US"/>
           </a:p>
@@ -5758,7 +5758,7 @@
           <a:p>
             <a:fld id="{4A30D792-577E-4294-AC98-BDD92C8FEA57}" type="datetimeFigureOut">
               <a:rPr lang="en-US" smtClean="0"/>
-              <a:t>11/2/2020</a:t>
+              <a:t>11/4/2020</a:t>
             </a:fld>
             <a:endParaRPr lang="en-US"/>
           </a:p>
@@ -5938,7 +5938,7 @@
           <a:p>
             <a:fld id="{4A30D792-577E-4294-AC98-BDD92C8FEA57}" type="datetimeFigureOut">
               <a:rPr lang="en-US" smtClean="0"/>
-              <a:t>11/2/2020</a:t>
+              <a:t>11/4/2020</a:t>
             </a:fld>
             <a:endParaRPr lang="en-US"/>
           </a:p>
@@ -6114,7 +6114,7 @@
           <a:p>
             <a:fld id="{4A30D792-577E-4294-AC98-BDD92C8FEA57}" type="datetimeFigureOut">
               <a:rPr lang="en-US" smtClean="0"/>
-              <a:t>11/2/2020</a:t>
+              <a:t>11/4/2020</a:t>
             </a:fld>
             <a:endParaRPr lang="en-US"/>
           </a:p>
@@ -6361,7 +6361,7 @@
           <a:p>
             <a:fld id="{4A30D792-577E-4294-AC98-BDD92C8FEA57}" type="datetimeFigureOut">
               <a:rPr lang="en-US" smtClean="0"/>
-              <a:t>11/2/2020</a:t>
+              <a:t>11/4/2020</a:t>
             </a:fld>
             <a:endParaRPr lang="en-US"/>
           </a:p>
@@ -6593,7 +6593,7 @@
           <a:p>
             <a:fld id="{4A30D792-577E-4294-AC98-BDD92C8FEA57}" type="datetimeFigureOut">
               <a:rPr lang="en-US" smtClean="0"/>
-              <a:t>11/2/2020</a:t>
+              <a:t>11/4/2020</a:t>
             </a:fld>
             <a:endParaRPr lang="en-US"/>
           </a:p>
@@ -6967,7 +6967,7 @@
           <a:p>
             <a:fld id="{4A30D792-577E-4294-AC98-BDD92C8FEA57}" type="datetimeFigureOut">
               <a:rPr lang="en-US" smtClean="0"/>
-              <a:t>11/2/2020</a:t>
+              <a:t>11/4/2020</a:t>
             </a:fld>
             <a:endParaRPr lang="en-US"/>
           </a:p>
@@ -7090,7 +7090,7 @@
           <a:p>
             <a:fld id="{4A30D792-577E-4294-AC98-BDD92C8FEA57}" type="datetimeFigureOut">
               <a:rPr lang="en-US" smtClean="0"/>
-              <a:t>11/2/2020</a:t>
+              <a:t>11/4/2020</a:t>
             </a:fld>
             <a:endParaRPr lang="en-US"/>
           </a:p>
@@ -7185,7 +7185,7 @@
           <a:p>
             <a:fld id="{4A30D792-577E-4294-AC98-BDD92C8FEA57}" type="datetimeFigureOut">
               <a:rPr lang="en-US" smtClean="0"/>
-              <a:t>11/2/2020</a:t>
+              <a:t>11/4/2020</a:t>
             </a:fld>
             <a:endParaRPr lang="en-US"/>
           </a:p>
@@ -7440,7 +7440,7 @@
           <a:p>
             <a:fld id="{4A30D792-577E-4294-AC98-BDD92C8FEA57}" type="datetimeFigureOut">
               <a:rPr lang="en-US" smtClean="0"/>
-              <a:t>11/2/2020</a:t>
+              <a:t>11/4/2020</a:t>
             </a:fld>
             <a:endParaRPr lang="en-US"/>
           </a:p>
@@ -7703,7 +7703,7 @@
           <a:p>
             <a:fld id="{4A30D792-577E-4294-AC98-BDD92C8FEA57}" type="datetimeFigureOut">
               <a:rPr lang="en-US" smtClean="0"/>
-              <a:t>11/2/2020</a:t>
+              <a:t>11/4/2020</a:t>
             </a:fld>
             <a:endParaRPr lang="en-US"/>
           </a:p>
@@ -8446,7 +8446,7 @@
           <a:p>
             <a:fld id="{4A30D792-577E-4294-AC98-BDD92C8FEA57}" type="datetimeFigureOut">
               <a:rPr lang="en-US" smtClean="0"/>
-              <a:t>11/2/2020</a:t>
+              <a:t>11/4/2020</a:t>
             </a:fld>
             <a:endParaRPr lang="en-US"/>
           </a:p>
@@ -9626,11 +9626,7 @@
             </a:r>
             <a:r>
               <a:rPr lang="ro-RO" dirty="0" smtClean="0"/>
-              <a:t>ile </a:t>
-            </a:r>
-            <a:r>
-              <a:rPr lang="ro-RO" dirty="0"/>
-              <a:t>imaginii(banda de frecvență înaltă) este limitată de lentile, PSF (blurr) și mișcare.</a:t>
+              <a:t>ile imaginii(banda de frecvență înaltă) este limitată de lentile, PSF (blurr) și mișcare.</a:t>
             </a:r>
           </a:p>
           <a:p>
@@ -9867,22 +9863,308 @@
         </p:nvSpPr>
         <p:spPr>
           <a:xfrm>
-            <a:off x="677334" y="2160589"/>
-            <a:ext cx="3055081" cy="3880773"/>
+            <a:off x="677334" y="1387447"/>
+            <a:ext cx="3736724" cy="3157084"/>
           </a:xfrm>
         </p:spPr>
         <p:txBody>
-          <a:bodyPr/>
+          <a:bodyPr>
+            <a:normAutofit/>
+          </a:bodyPr>
           <a:lstStyle/>
           <a:p>
             <a:r>
               <a:rPr lang="ro-RO" sz="1200" dirty="0"/>
-              <a:t>Super-rezolutia reprezintă conceptul de construire a unei imaginii de rezoluție ridicată dintr-un set de imagini cu o rezoluție mai mica</a:t>
+              <a:t>Super-rezolutia reprezintă conceptul de construire a unei </a:t>
+            </a:r>
+            <a:r>
+              <a:rPr lang="ro-RO" sz="1200" dirty="0" smtClean="0"/>
+              <a:t>imagini </a:t>
+            </a:r>
+            <a:r>
+              <a:rPr lang="ro-RO" sz="1200" dirty="0"/>
+              <a:t>de rezoluție ridicată dintr-un set de imagini cu o rezoluție </a:t>
+            </a:r>
+            <a:r>
+              <a:rPr lang="ro-RO" sz="1200"/>
+              <a:t>mai </a:t>
+            </a:r>
+            <a:r>
+              <a:rPr lang="ro-RO" sz="1200" smtClean="0"/>
+              <a:t>mică</a:t>
+            </a:r>
+            <a:r>
+              <a:rPr lang="en-US" sz="1200" smtClean="0"/>
+              <a:t>.</a:t>
+            </a:r>
+            <a:endParaRPr lang="ro-RO" sz="1200" dirty="0" smtClean="0"/>
+          </a:p>
+          <a:p>
+            <a:r>
+              <a:rPr lang="ro-RO" sz="1200" dirty="0"/>
+              <a:t>Î</a:t>
             </a:r>
             <a:r>
               <a:rPr lang="en-US" sz="1200" dirty="0"/>
+              <a:t>n </a:t>
+            </a:r>
+            <a:r>
+              <a:rPr lang="en-US" sz="1200" dirty="0" err="1"/>
+              <a:t>procesul</a:t>
+            </a:r>
+            <a:r>
+              <a:rPr lang="en-US" sz="1200" dirty="0"/>
+              <a:t> de </a:t>
+            </a:r>
+            <a:r>
+              <a:rPr lang="en-US" sz="1200" dirty="0" err="1"/>
+              <a:t>capturare</a:t>
+            </a:r>
+            <a:r>
+              <a:rPr lang="en-US" sz="1200" dirty="0"/>
+              <a:t> </a:t>
+            </a:r>
+            <a:r>
+              <a:rPr lang="en-US" sz="1200" dirty="0" err="1"/>
+              <a:t>detaliile</a:t>
+            </a:r>
+            <a:r>
+              <a:rPr lang="en-US" sz="1200" dirty="0"/>
+              <a:t> </a:t>
+            </a:r>
+            <a:r>
+              <a:rPr lang="en-US" sz="1200" dirty="0" err="1"/>
+              <a:t>scenei</a:t>
+            </a:r>
+            <a:r>
+              <a:rPr lang="en-US" sz="1200" dirty="0"/>
+              <a:t> </a:t>
+            </a:r>
+            <a:r>
+              <a:rPr lang="en-US" sz="1200" dirty="0" err="1"/>
+              <a:t>sunt</a:t>
+            </a:r>
+            <a:r>
+              <a:rPr lang="en-US" sz="1200" dirty="0"/>
+              <a:t> integrate de </a:t>
+            </a:r>
+            <a:r>
+              <a:rPr lang="en-US" sz="1200" dirty="0" err="1"/>
+              <a:t>diferi</a:t>
+            </a:r>
+            <a:r>
+              <a:rPr lang="ro-RO" sz="1200" dirty="0"/>
+              <a:t>ț</a:t>
+            </a:r>
+            <a:r>
+              <a:rPr lang="en-US" sz="1200" dirty="0" err="1"/>
+              <a:t>i</a:t>
+            </a:r>
+            <a:r>
+              <a:rPr lang="en-US" sz="1200" dirty="0"/>
+              <a:t> </a:t>
+            </a:r>
+            <a:r>
+              <a:rPr lang="en-US" sz="1200" dirty="0" err="1"/>
+              <a:t>senzori</a:t>
+            </a:r>
+            <a:r>
+              <a:rPr lang="en-US" sz="1200" dirty="0"/>
+              <a:t> </a:t>
+            </a:r>
+            <a:r>
+              <a:rPr lang="en-US" sz="1200" dirty="0" err="1"/>
+              <a:t>astfel</a:t>
+            </a:r>
+            <a:r>
+              <a:rPr lang="en-US" sz="1200" dirty="0"/>
+              <a:t> </a:t>
+            </a:r>
+            <a:r>
+              <a:rPr lang="ro-RO" sz="1200" dirty="0"/>
+              <a:t>î</a:t>
+            </a:r>
+            <a:r>
+              <a:rPr lang="en-US" sz="1200" dirty="0" err="1"/>
+              <a:t>ncat</a:t>
+            </a:r>
+            <a:r>
+              <a:rPr lang="en-US" sz="1200" dirty="0"/>
+              <a:t> </a:t>
+            </a:r>
+            <a:r>
+              <a:rPr lang="en-US" sz="1200" dirty="0" err="1"/>
+              <a:t>fiecare</a:t>
+            </a:r>
+            <a:r>
+              <a:rPr lang="en-US" sz="1200" dirty="0"/>
+              <a:t> </a:t>
+            </a:r>
+            <a:r>
+              <a:rPr lang="en-US" sz="1200" dirty="0" err="1"/>
+              <a:t>captur</a:t>
+            </a:r>
+            <a:r>
+              <a:rPr lang="ro-RO" sz="1200" dirty="0"/>
+              <a:t>ă</a:t>
+            </a:r>
+            <a:r>
+              <a:rPr lang="en-US" sz="1200" dirty="0"/>
+              <a:t> s</a:t>
+            </a:r>
+            <a:r>
+              <a:rPr lang="ro-RO" sz="1200" dirty="0"/>
+              <a:t>ă</a:t>
+            </a:r>
+            <a:r>
+              <a:rPr lang="en-US" sz="1200" dirty="0"/>
+              <a:t> </a:t>
+            </a:r>
+            <a:r>
+              <a:rPr lang="en-US" sz="1200" dirty="0" err="1"/>
+              <a:t>includ</a:t>
+            </a:r>
+            <a:r>
+              <a:rPr lang="ro-RO" sz="1200" dirty="0"/>
+              <a:t>ă</a:t>
+            </a:r>
+            <a:r>
+              <a:rPr lang="en-US" sz="1200" dirty="0"/>
+              <a:t> </a:t>
+            </a:r>
+            <a:r>
+              <a:rPr lang="en-US" sz="1200" dirty="0" err="1"/>
+              <a:t>informa</a:t>
+            </a:r>
+            <a:r>
+              <a:rPr lang="ro-RO" sz="1200" dirty="0"/>
+              <a:t>ț</a:t>
+            </a:r>
+            <a:r>
+              <a:rPr lang="en-US" sz="1200" dirty="0"/>
+              <a:t>ii </a:t>
+            </a:r>
+            <a:r>
+              <a:rPr lang="en-US" sz="1200" dirty="0" err="1"/>
+              <a:t>diferite</a:t>
+            </a:r>
+            <a:r>
+              <a:rPr lang="en-US" sz="1200" dirty="0"/>
+              <a:t>. Super</a:t>
+            </a:r>
+            <a:r>
+              <a:rPr lang="ro-RO" sz="1200" dirty="0"/>
+              <a:t>R</a:t>
+            </a:r>
+            <a:r>
+              <a:rPr lang="en-US" sz="1200" dirty="0" err="1"/>
+              <a:t>ezolu</a:t>
+            </a:r>
+            <a:r>
+              <a:rPr lang="ro-RO" sz="1200" dirty="0"/>
+              <a:t>ț</a:t>
+            </a:r>
+            <a:r>
+              <a:rPr lang="en-US" sz="1200" dirty="0" err="1"/>
+              <a:t>ia</a:t>
+            </a:r>
+            <a:r>
+              <a:rPr lang="en-US" sz="1200" dirty="0"/>
+              <a:t> is </a:t>
+            </a:r>
+            <a:r>
+              <a:rPr lang="en-US" sz="1200" dirty="0" err="1"/>
+              <a:t>propune</a:t>
+            </a:r>
+            <a:r>
+              <a:rPr lang="en-US" sz="1200" dirty="0"/>
+              <a:t> s</a:t>
+            </a:r>
+            <a:r>
+              <a:rPr lang="ro-RO" sz="1200" dirty="0"/>
+              <a:t>ă</a:t>
+            </a:r>
+            <a:r>
+              <a:rPr lang="en-US" sz="1200" dirty="0"/>
+              <a:t> </a:t>
+            </a:r>
+            <a:r>
+              <a:rPr lang="en-US" sz="1200" dirty="0" err="1"/>
+              <a:t>regenereze</a:t>
+            </a:r>
+            <a:r>
+              <a:rPr lang="en-US" sz="1200" dirty="0"/>
+              <a:t> o </a:t>
+            </a:r>
+            <a:r>
+              <a:rPr lang="en-US" sz="1200" dirty="0" err="1"/>
+              <a:t>scen</a:t>
+            </a:r>
+            <a:r>
+              <a:rPr lang="ro-RO" sz="1200" dirty="0"/>
+              <a:t>ă</a:t>
+            </a:r>
+            <a:r>
+              <a:rPr lang="en-US" sz="1200" dirty="0"/>
+              <a:t> </a:t>
+            </a:r>
+            <a:r>
+              <a:rPr lang="en-US" sz="1200" dirty="0" err="1"/>
+              <a:t>discretizat</a:t>
+            </a:r>
+            <a:r>
+              <a:rPr lang="ro-RO" sz="1200" dirty="0"/>
+              <a:t>ă</a:t>
+            </a:r>
+            <a:r>
+              <a:rPr lang="en-US" sz="1200" dirty="0"/>
+              <a:t> </a:t>
+            </a:r>
+            <a:r>
+              <a:rPr lang="en-US" sz="1200" dirty="0" err="1"/>
+              <a:t>aduc</a:t>
+            </a:r>
+            <a:r>
+              <a:rPr lang="ro-RO" sz="1200" dirty="0"/>
+              <a:t>â</a:t>
+            </a:r>
+            <a:r>
+              <a:rPr lang="en-US" sz="1200" dirty="0" err="1"/>
+              <a:t>nd</a:t>
+            </a:r>
+            <a:r>
+              <a:rPr lang="en-US" sz="1200" dirty="0"/>
+              <a:t>-o la o </a:t>
+            </a:r>
+            <a:r>
+              <a:rPr lang="en-US" sz="1200" dirty="0" err="1"/>
+              <a:t>rezolu</a:t>
+            </a:r>
+            <a:r>
+              <a:rPr lang="ro-RO" sz="1200" dirty="0"/>
+              <a:t>ț</a:t>
+            </a:r>
+            <a:r>
+              <a:rPr lang="en-US" sz="1200" dirty="0" err="1"/>
+              <a:t>ie</a:t>
+            </a:r>
+            <a:r>
+              <a:rPr lang="en-US" sz="1200" dirty="0"/>
+              <a:t> </a:t>
+            </a:r>
+            <a:r>
+              <a:rPr lang="en-US" sz="1200" dirty="0" err="1"/>
+              <a:t>mai</a:t>
+            </a:r>
+            <a:r>
+              <a:rPr lang="en-US" sz="1200" dirty="0"/>
+              <a:t> mare</a:t>
+            </a:r>
+            <a:r>
+              <a:rPr lang="en-US" sz="1200" dirty="0" smtClean="0"/>
               <a:t>.</a:t>
             </a:r>
+            <a:endParaRPr lang="en-US" sz="1200" dirty="0"/>
           </a:p>
           <a:p>
             <a:r>
@@ -10679,7 +10961,6 @@
               <a:rPr lang="en-US" dirty="0"/>
               <a:t>:</a:t>
             </a:r>
-            <a:endParaRPr lang="en-US" dirty="0"/>
           </a:p>
           <a:p>
             <a:pPr lvl="1"/>
@@ -11775,8 +12056,16 @@
           <a:lstStyle/>
           <a:p>
             <a:r>
-              <a:rPr lang="ro-RO" dirty="0"/>
-              <a:t>SOLUȚII EXISTENTE</a:t>
+              <a:rPr lang="ro-RO" dirty="0" smtClean="0"/>
+              <a:t>SOLUȚI</a:t>
+            </a:r>
+            <a:r>
+              <a:rPr lang="en-US" dirty="0" smtClean="0"/>
+              <a:t>E</a:t>
+            </a:r>
+            <a:r>
+              <a:rPr lang="ro-RO" dirty="0" smtClean="0"/>
+              <a:t> EXISTENTĂ</a:t>
             </a:r>
             <a:endParaRPr lang="en-US" dirty="0"/>
           </a:p>
@@ -11804,59 +12093,721 @@
           </a:bodyPr>
           <a:lstStyle/>
           <a:p>
-            <a:pPr algn="ctr"/>
-            <a:r>
-              <a:rPr lang="en-US" sz="1050" dirty="0"/>
-              <a:t>In general </a:t>
-            </a:r>
-            <a:r>
-              <a:rPr lang="en-US" sz="1050" dirty="0" err="1"/>
-              <a:t>problema</a:t>
-            </a:r>
-            <a:r>
-              <a:rPr lang="en-US" sz="1050" dirty="0"/>
-              <a:t> multi-image SR a </a:t>
-            </a:r>
-            <a:r>
-              <a:rPr lang="en-US" sz="1050" dirty="0" err="1"/>
-              <a:t>fost</a:t>
-            </a:r>
-            <a:r>
-              <a:rPr lang="en-US" sz="1050" dirty="0"/>
+            <a:r>
+              <a:rPr lang="en-US" dirty="0" err="1"/>
+              <a:t>Procesul</a:t>
+            </a:r>
+            <a:r>
+              <a:rPr lang="en-US" dirty="0"/>
+              <a:t> de </a:t>
+            </a:r>
+            <a:r>
+              <a:rPr lang="en-US" dirty="0" err="1"/>
+              <a:t>c</a:t>
+            </a:r>
+            <a:r>
+              <a:rPr lang="en-US" dirty="0" err="1" smtClean="0"/>
+              <a:t>apturare</a:t>
+            </a:r>
+            <a:r>
+              <a:rPr lang="en-US" dirty="0"/>
+              <a:t>:</a:t>
+            </a:r>
+          </a:p>
+          <a:p>
+            <a:pPr lvl="1"/>
+            <a:r>
+              <a:rPr lang="en-US" dirty="0"/>
+              <a:t>Sampling – </a:t>
+            </a:r>
+            <a:r>
+              <a:rPr lang="en-US" dirty="0" err="1"/>
+              <a:t>Captare</a:t>
+            </a:r>
+            <a:r>
+              <a:rPr lang="en-US" dirty="0"/>
               <a:t> </a:t>
             </a:r>
             <a:r>
-              <a:rPr lang="en-US" sz="1050" dirty="0" err="1"/>
-              <a:t>redusa</a:t>
-            </a:r>
-            <a:r>
-              <a:rPr lang="en-US" sz="1050" dirty="0"/>
+              <a:rPr lang="en-US" dirty="0" smtClean="0"/>
+              <a:t>constant</a:t>
+            </a:r>
+            <a:r>
+              <a:rPr lang="ro-RO" dirty="0" smtClean="0"/>
+              <a:t>ă</a:t>
+            </a:r>
+            <a:endParaRPr lang="en-US" dirty="0"/>
+          </a:p>
+          <a:p>
+            <a:pPr lvl="1"/>
+            <a:r>
+              <a:rPr lang="en-US" dirty="0"/>
+              <a:t>Geometric </a:t>
+            </a:r>
+            <a:r>
+              <a:rPr lang="en-US" dirty="0" smtClean="0"/>
+              <a:t>transformation</a:t>
+            </a:r>
+            <a:r>
+              <a:rPr lang="ro-RO" dirty="0" smtClean="0"/>
+              <a:t> - i</a:t>
+            </a:r>
+            <a:r>
+              <a:rPr lang="en-US" dirty="0" err="1" smtClean="0"/>
+              <a:t>mplic</a:t>
+            </a:r>
+            <a:r>
+              <a:rPr lang="ro-RO" dirty="0" smtClean="0"/>
+              <a:t>ă</a:t>
+            </a:r>
+            <a:r>
+              <a:rPr lang="en-US" dirty="0" smtClean="0"/>
+              <a:t> </a:t>
+            </a:r>
+            <a:r>
+              <a:rPr lang="en-US" dirty="0" err="1"/>
+              <a:t>aplicarea</a:t>
+            </a:r>
+            <a:r>
+              <a:rPr lang="en-US" dirty="0"/>
+              <a:t> </a:t>
+            </a:r>
+            <a:r>
+              <a:rPr lang="en-US" dirty="0" err="1"/>
+              <a:t>unor</a:t>
+            </a:r>
+            <a:r>
+              <a:rPr lang="en-US" dirty="0"/>
+              <a:t> </a:t>
+            </a:r>
+            <a:r>
+              <a:rPr lang="en-US" dirty="0" err="1"/>
+              <a:t>transformate</a:t>
+            </a:r>
+            <a:r>
+              <a:rPr lang="en-US" dirty="0"/>
+              <a:t> de </a:t>
+            </a:r>
+            <a:r>
+              <a:rPr lang="en-US" dirty="0" err="1" smtClean="0"/>
+              <a:t>transla</a:t>
+            </a:r>
+            <a:r>
+              <a:rPr lang="ro-RO" dirty="0" smtClean="0"/>
+              <a:t>ț</a:t>
+            </a:r>
+            <a:r>
+              <a:rPr lang="en-US" dirty="0" err="1" smtClean="0"/>
+              <a:t>ie</a:t>
+            </a:r>
+            <a:r>
+              <a:rPr lang="en-US" dirty="0" smtClean="0"/>
+              <a:t> </a:t>
+            </a:r>
+            <a:r>
+              <a:rPr lang="en-US" dirty="0" err="1"/>
+              <a:t>sau</a:t>
+            </a:r>
+            <a:r>
+              <a:rPr lang="en-US" dirty="0"/>
+              <a:t> </a:t>
+            </a:r>
+            <a:r>
+              <a:rPr lang="en-US" dirty="0" err="1" smtClean="0"/>
+              <a:t>rota</a:t>
+            </a:r>
+            <a:r>
+              <a:rPr lang="ro-RO" dirty="0" smtClean="0"/>
+              <a:t>ț</a:t>
+            </a:r>
+            <a:r>
+              <a:rPr lang="en-US" dirty="0" err="1" smtClean="0"/>
+              <a:t>ie</a:t>
+            </a:r>
+            <a:r>
+              <a:rPr lang="en-US" dirty="0" smtClean="0"/>
+              <a:t> </a:t>
+            </a:r>
+            <a:r>
+              <a:rPr lang="en-US" dirty="0"/>
+              <a:t>din </a:t>
+            </a:r>
+            <a:r>
+              <a:rPr lang="en-US" dirty="0" err="1"/>
+              <a:t>cauza</a:t>
+            </a:r>
+            <a:r>
+              <a:rPr lang="en-US" dirty="0"/>
+              <a:t> </a:t>
+            </a:r>
+            <a:r>
+              <a:rPr lang="en-US" dirty="0" err="1"/>
+              <a:t>obiectelor</a:t>
+            </a:r>
+            <a:r>
+              <a:rPr lang="en-US" dirty="0"/>
+              <a:t> din </a:t>
+            </a:r>
+            <a:r>
+              <a:rPr lang="en-US" dirty="0" err="1" smtClean="0"/>
+              <a:t>scen</a:t>
+            </a:r>
+            <a:r>
+              <a:rPr lang="ro-RO" dirty="0" smtClean="0"/>
+              <a:t>ă</a:t>
+            </a:r>
+            <a:r>
+              <a:rPr lang="ro-RO" dirty="0"/>
+              <a:t> </a:t>
+            </a:r>
+            <a:r>
+              <a:rPr lang="ro-RO" dirty="0" smtClean="0"/>
+              <a:t>sau a mișcării </a:t>
+            </a:r>
+            <a:r>
+              <a:rPr lang="en-US" dirty="0" err="1" smtClean="0"/>
+              <a:t>camerei</a:t>
+            </a:r>
+            <a:endParaRPr lang="en-US" dirty="0"/>
+          </a:p>
+          <a:p>
+            <a:pPr lvl="1"/>
+            <a:r>
+              <a:rPr lang="en-US" dirty="0"/>
+              <a:t>Blur – </a:t>
+            </a:r>
+            <a:r>
+              <a:rPr lang="en-US" dirty="0" err="1" smtClean="0"/>
+              <a:t>Datorit</a:t>
+            </a:r>
+            <a:r>
+              <a:rPr lang="ro-RO" dirty="0" smtClean="0"/>
+              <a:t>ă</a:t>
+            </a:r>
+            <a:r>
+              <a:rPr lang="en-US" dirty="0" smtClean="0"/>
+              <a:t> </a:t>
+            </a:r>
+            <a:r>
+              <a:rPr lang="en-US" dirty="0" err="1"/>
+              <a:t>sistemului</a:t>
+            </a:r>
+            <a:r>
+              <a:rPr lang="en-US" dirty="0"/>
+              <a:t> de </a:t>
+            </a:r>
+            <a:r>
+              <a:rPr lang="en-US" dirty="0" err="1"/>
+              <a:t>lentile</a:t>
+            </a:r>
+            <a:r>
+              <a:rPr lang="en-US" dirty="0"/>
+              <a:t> / </a:t>
+            </a:r>
+            <a:r>
+              <a:rPr lang="en-US" dirty="0" err="1"/>
+              <a:t>vapori</a:t>
+            </a:r>
+            <a:r>
+              <a:rPr lang="en-US" dirty="0"/>
+              <a:t> de </a:t>
+            </a:r>
+            <a:r>
+              <a:rPr lang="en-US" dirty="0" err="1" smtClean="0"/>
+              <a:t>ap</a:t>
+            </a:r>
+            <a:r>
+              <a:rPr lang="ro-RO" dirty="0" smtClean="0"/>
+              <a:t>ă</a:t>
+            </a:r>
+            <a:r>
+              <a:rPr lang="en-US" dirty="0" smtClean="0"/>
+              <a:t>, mi</a:t>
+            </a:r>
+            <a:r>
+              <a:rPr lang="ro-RO" dirty="0" smtClean="0"/>
+              <a:t>ș</a:t>
+            </a:r>
+            <a:r>
+              <a:rPr lang="en-US" dirty="0" smtClean="0"/>
+              <a:t>care </a:t>
+            </a:r>
+            <a:r>
+              <a:rPr lang="en-US" dirty="0"/>
+              <a:t>a </a:t>
+            </a:r>
+            <a:r>
+              <a:rPr lang="en-US" dirty="0" err="1"/>
+              <a:t>obiectelor</a:t>
+            </a:r>
+            <a:r>
+              <a:rPr lang="en-US" dirty="0"/>
+              <a:t> </a:t>
+            </a:r>
+            <a:r>
+              <a:rPr lang="ro-RO" dirty="0"/>
+              <a:t>î</a:t>
+            </a:r>
+            <a:r>
+              <a:rPr lang="en-US" dirty="0" smtClean="0"/>
+              <a:t>n </a:t>
+            </a:r>
+            <a:r>
+              <a:rPr lang="en-US" dirty="0" err="1" smtClean="0"/>
+              <a:t>scen</a:t>
+            </a:r>
+            <a:r>
+              <a:rPr lang="ro-RO" dirty="0" smtClean="0"/>
+              <a:t>ă</a:t>
+            </a:r>
+            <a:r>
+              <a:rPr lang="en-US" dirty="0" smtClean="0"/>
+              <a:t> </a:t>
+            </a:r>
+            <a:endParaRPr lang="en-US" dirty="0"/>
+          </a:p>
+          <a:p>
+            <a:pPr lvl="1"/>
+            <a:r>
+              <a:rPr lang="en-US" dirty="0"/>
+              <a:t>Subsampling – </a:t>
+            </a:r>
+            <a:r>
+              <a:rPr lang="en-US" dirty="0" err="1"/>
+              <a:t>Senzorul</a:t>
+            </a:r>
+            <a:r>
+              <a:rPr lang="en-US" dirty="0"/>
+              <a:t> </a:t>
+            </a:r>
+            <a:r>
+              <a:rPr lang="en-US" dirty="0" err="1" smtClean="0"/>
+              <a:t>integreaz</a:t>
+            </a:r>
+            <a:r>
+              <a:rPr lang="ro-RO" dirty="0" smtClean="0"/>
+              <a:t>ă</a:t>
+            </a:r>
+            <a:r>
+              <a:rPr lang="en-US" dirty="0" smtClean="0"/>
+              <a:t> </a:t>
+            </a:r>
+            <a:r>
+              <a:rPr lang="en-US" dirty="0" err="1"/>
+              <a:t>numai</a:t>
+            </a:r>
+            <a:r>
+              <a:rPr lang="en-US" dirty="0"/>
+              <a:t> </a:t>
+            </a:r>
+            <a:r>
+              <a:rPr lang="en-US" dirty="0" err="1" smtClean="0"/>
+              <a:t>num</a:t>
+            </a:r>
+            <a:r>
+              <a:rPr lang="ro-RO" dirty="0" smtClean="0"/>
+              <a:t>ă</a:t>
+            </a:r>
+            <a:r>
+              <a:rPr lang="en-US" dirty="0" err="1" smtClean="0"/>
+              <a:t>rul</a:t>
+            </a:r>
+            <a:r>
+              <a:rPr lang="en-US" dirty="0" smtClean="0"/>
+              <a:t> </a:t>
+            </a:r>
+            <a:r>
+              <a:rPr lang="en-US" dirty="0"/>
+              <a:t>de </a:t>
+            </a:r>
+            <a:r>
+              <a:rPr lang="en-US" dirty="0" err="1"/>
+              <a:t>pixeli</a:t>
+            </a:r>
+            <a:r>
+              <a:rPr lang="en-US" dirty="0"/>
+              <a:t> </a:t>
+            </a:r>
+            <a:r>
+              <a:rPr lang="en-US" dirty="0" err="1"/>
+              <a:t>avut</a:t>
+            </a:r>
+            <a:r>
+              <a:rPr lang="en-US" dirty="0"/>
               <a:t> la </a:t>
             </a:r>
             <a:r>
-              <a:rPr lang="en-US" sz="1050" dirty="0" err="1"/>
-              <a:t>mai</a:t>
-            </a:r>
-            <a:r>
-              <a:rPr lang="en-US" sz="1050" dirty="0"/>
+              <a:rPr lang="en-US" dirty="0" err="1" smtClean="0"/>
+              <a:t>dispozi</a:t>
+            </a:r>
+            <a:r>
+              <a:rPr lang="ro-RO" dirty="0" smtClean="0"/>
+              <a:t>ț</a:t>
+            </a:r>
+            <a:r>
+              <a:rPr lang="en-US" dirty="0" err="1" smtClean="0"/>
+              <a:t>ie</a:t>
+            </a:r>
+            <a:endParaRPr lang="en-US" dirty="0"/>
+          </a:p>
+          <a:p>
+            <a:r>
+              <a:rPr lang="ro-RO" dirty="0" smtClean="0"/>
+              <a:t>Î</a:t>
+            </a:r>
+            <a:r>
+              <a:rPr lang="en-US" dirty="0" smtClean="0"/>
+              <a:t>n </a:t>
+            </a:r>
+            <a:r>
+              <a:rPr lang="en-US" dirty="0"/>
+              <a:t>general </a:t>
+            </a:r>
+            <a:r>
+              <a:rPr lang="en-US" dirty="0" err="1" smtClean="0"/>
+              <a:t>SuperRezolu</a:t>
+            </a:r>
+            <a:r>
+              <a:rPr lang="ro-RO" dirty="0"/>
+              <a:t>ț</a:t>
+            </a:r>
+            <a:r>
+              <a:rPr lang="en-US" dirty="0" err="1" smtClean="0"/>
+              <a:t>ia</a:t>
+            </a:r>
+            <a:r>
+              <a:rPr lang="en-US" dirty="0" smtClean="0"/>
               <a:t> </a:t>
             </a:r>
             <a:r>
-              <a:rPr lang="en-US" sz="1050" dirty="0" err="1"/>
-              <a:t>multe</a:t>
-            </a:r>
-            <a:r>
-              <a:rPr lang="en-US" sz="1050" dirty="0"/>
+              <a:rPr lang="en-US" dirty="0"/>
+              <a:t>are un cost </a:t>
+            </a:r>
+            <a:r>
+              <a:rPr lang="en-US" dirty="0" err="1" smtClean="0"/>
+              <a:t>computa</a:t>
+            </a:r>
+            <a:r>
+              <a:rPr lang="ro-RO" dirty="0"/>
+              <a:t>ț</a:t>
+            </a:r>
+            <a:r>
+              <a:rPr lang="en-US" dirty="0" err="1" smtClean="0"/>
+              <a:t>ional</a:t>
+            </a:r>
+            <a:r>
+              <a:rPr lang="en-US" dirty="0" smtClean="0"/>
               <a:t> </a:t>
             </a:r>
             <a:r>
-              <a:rPr lang="en-US" sz="1050" dirty="0" err="1"/>
-              <a:t>probleme</a:t>
-            </a:r>
-            <a:r>
-              <a:rPr lang="en-US" sz="1050" dirty="0"/>
-              <a:t> de single-image SR</a:t>
-            </a:r>
+              <a:rPr lang="en-US" dirty="0"/>
+              <a:t>mare, </a:t>
+            </a:r>
+            <a:r>
+              <a:rPr lang="en-US" dirty="0" smtClean="0"/>
+              <a:t>at</a:t>
+            </a:r>
+            <a:r>
+              <a:rPr lang="ro-RO" dirty="0" smtClean="0"/>
+              <a:t>â</a:t>
+            </a:r>
+            <a:r>
+              <a:rPr lang="en-US" dirty="0" smtClean="0"/>
+              <a:t>t </a:t>
+            </a:r>
+            <a:r>
+              <a:rPr lang="ro-RO" dirty="0"/>
+              <a:t>î</a:t>
+            </a:r>
+            <a:r>
+              <a:rPr lang="en-US" dirty="0" smtClean="0"/>
+              <a:t>n </a:t>
+            </a:r>
+            <a:r>
+              <a:rPr lang="en-US" dirty="0" err="1"/>
+              <a:t>domeniul</a:t>
+            </a:r>
+            <a:r>
+              <a:rPr lang="en-US" dirty="0"/>
+              <a:t> </a:t>
+            </a:r>
+            <a:r>
+              <a:rPr lang="en-US" dirty="0" smtClean="0"/>
+              <a:t>spa</a:t>
+            </a:r>
+            <a:r>
+              <a:rPr lang="ro-RO" dirty="0"/>
+              <a:t>ț</a:t>
+            </a:r>
+            <a:r>
+              <a:rPr lang="en-US" dirty="0" err="1" smtClean="0"/>
+              <a:t>iu</a:t>
+            </a:r>
+            <a:r>
+              <a:rPr lang="en-US" dirty="0" smtClean="0"/>
+              <a:t> c</a:t>
+            </a:r>
+            <a:r>
+              <a:rPr lang="ro-RO" dirty="0" smtClean="0"/>
+              <a:t>â</a:t>
+            </a:r>
+            <a:r>
+              <a:rPr lang="en-US" dirty="0" smtClean="0"/>
+              <a:t>t </a:t>
+            </a:r>
+            <a:r>
+              <a:rPr lang="ro-RO" dirty="0" err="1"/>
+              <a:t>ș</a:t>
+            </a:r>
+            <a:r>
+              <a:rPr lang="en-US" dirty="0" err="1" smtClean="0"/>
+              <a:t>i</a:t>
+            </a:r>
+            <a:r>
+              <a:rPr lang="en-US" dirty="0" smtClean="0"/>
+              <a:t> </a:t>
+            </a:r>
+            <a:r>
+              <a:rPr lang="en-US" dirty="0" err="1"/>
+              <a:t>timp.</a:t>
+            </a:r>
+            <a:r>
+              <a:rPr lang="en-US" dirty="0"/>
+              <a:t> </a:t>
+            </a:r>
+            <a:r>
+              <a:rPr lang="ro-RO" dirty="0" smtClean="0"/>
+              <a:t>P</a:t>
+            </a:r>
+            <a:r>
+              <a:rPr lang="en-US" dirty="0" err="1" smtClean="0"/>
+              <a:t>entru</a:t>
+            </a:r>
+            <a:r>
+              <a:rPr lang="en-US" dirty="0" smtClean="0"/>
+              <a:t> </a:t>
+            </a:r>
+            <a:r>
+              <a:rPr lang="en-US" dirty="0"/>
+              <a:t>a reduce </a:t>
+            </a:r>
+            <a:r>
+              <a:rPr lang="en-US" dirty="0" smtClean="0"/>
+              <a:t>ace</a:t>
+            </a:r>
+            <a:r>
+              <a:rPr lang="ro-RO" dirty="0"/>
+              <a:t>ș</a:t>
+            </a:r>
+            <a:r>
+              <a:rPr lang="en-US" dirty="0" err="1" smtClean="0"/>
+              <a:t>ti</a:t>
+            </a:r>
+            <a:r>
+              <a:rPr lang="en-US" dirty="0" smtClean="0"/>
+              <a:t> </a:t>
+            </a:r>
+            <a:r>
+              <a:rPr lang="en-US" dirty="0" err="1"/>
+              <a:t>timpi</a:t>
+            </a:r>
+            <a:r>
+              <a:rPr lang="en-US" dirty="0"/>
+              <a:t> </a:t>
+            </a:r>
+            <a:r>
+              <a:rPr lang="en-US" dirty="0" err="1"/>
+              <a:t>putem</a:t>
+            </a:r>
+            <a:r>
+              <a:rPr lang="en-US" dirty="0"/>
+              <a:t> </a:t>
+            </a:r>
+            <a:r>
+              <a:rPr lang="en-US" dirty="0" err="1"/>
+              <a:t>recurge</a:t>
+            </a:r>
+            <a:r>
+              <a:rPr lang="en-US" dirty="0"/>
+              <a:t> la </a:t>
+            </a:r>
+            <a:r>
+              <a:rPr lang="en-US" dirty="0" err="1" smtClean="0"/>
+              <a:t>condi</a:t>
+            </a:r>
+            <a:r>
+              <a:rPr lang="ro-RO" dirty="0"/>
+              <a:t>ț</a:t>
+            </a:r>
+            <a:r>
+              <a:rPr lang="en-US" dirty="0" smtClean="0"/>
+              <a:t>ii </a:t>
+            </a:r>
+            <a:r>
+              <a:rPr lang="en-US" dirty="0" err="1" smtClean="0"/>
+              <a:t>ini</a:t>
+            </a:r>
+            <a:r>
+              <a:rPr lang="ro-RO" dirty="0" smtClean="0"/>
+              <a:t>ț</a:t>
+            </a:r>
+            <a:r>
+              <a:rPr lang="en-US" dirty="0" err="1" smtClean="0"/>
+              <a:t>iale</a:t>
+            </a:r>
+            <a:r>
+              <a:rPr lang="en-US" dirty="0" smtClean="0"/>
+              <a:t> </a:t>
+            </a:r>
+            <a:r>
+              <a:rPr lang="en-US" dirty="0"/>
+              <a:t>care ne pot </a:t>
+            </a:r>
+            <a:r>
+              <a:rPr lang="en-US" dirty="0" err="1"/>
+              <a:t>simplifica</a:t>
+            </a:r>
+            <a:r>
+              <a:rPr lang="en-US" dirty="0"/>
+              <a:t> </a:t>
+            </a:r>
+            <a:r>
+              <a:rPr lang="en-US" dirty="0" err="1"/>
+              <a:t>calculele</a:t>
+            </a:r>
+            <a:r>
+              <a:rPr lang="en-US" dirty="0"/>
+              <a:t> </a:t>
+            </a:r>
+            <a:r>
+              <a:rPr lang="en-US" dirty="0" err="1"/>
+              <a:t>sau</a:t>
+            </a:r>
+            <a:r>
+              <a:rPr lang="en-US" dirty="0"/>
+              <a:t> </a:t>
+            </a:r>
+            <a:r>
+              <a:rPr lang="en-US" dirty="0" smtClean="0"/>
+              <a:t>s</a:t>
+            </a:r>
+            <a:r>
+              <a:rPr lang="ro-RO" dirty="0"/>
+              <a:t>ă</a:t>
+            </a:r>
+            <a:r>
+              <a:rPr lang="en-US" dirty="0" smtClean="0"/>
+              <a:t> </a:t>
+            </a:r>
+            <a:r>
+              <a:rPr lang="en-US" dirty="0" err="1" smtClean="0"/>
+              <a:t>utiliz</a:t>
+            </a:r>
+            <a:r>
+              <a:rPr lang="ro-RO" dirty="0" smtClean="0"/>
+              <a:t>ă</a:t>
+            </a:r>
+            <a:r>
+              <a:rPr lang="en-US" dirty="0" smtClean="0"/>
+              <a:t>m </a:t>
+            </a:r>
+            <a:r>
+              <a:rPr lang="en-US" dirty="0" err="1"/>
+              <a:t>procesarea</a:t>
+            </a:r>
+            <a:r>
+              <a:rPr lang="en-US" dirty="0"/>
+              <a:t> GPU.</a:t>
+            </a:r>
+          </a:p>
+          <a:p>
+            <a:r>
+              <a:rPr lang="en-US" dirty="0"/>
+              <a:t>Bilateral TV-L1 - </a:t>
+            </a:r>
+            <a:r>
+              <a:rPr lang="ro-RO" dirty="0"/>
+              <a:t>î</a:t>
+            </a:r>
+            <a:r>
+              <a:rPr lang="en-US" dirty="0" err="1" smtClean="0"/>
+              <a:t>ncearc</a:t>
+            </a:r>
+            <a:r>
+              <a:rPr lang="ro-RO" dirty="0" smtClean="0"/>
+              <a:t>ă</a:t>
+            </a:r>
+            <a:r>
+              <a:rPr lang="en-US" dirty="0" smtClean="0"/>
+              <a:t> s</a:t>
+            </a:r>
+            <a:r>
+              <a:rPr lang="ro-RO" dirty="0" smtClean="0"/>
+              <a:t>ă</a:t>
+            </a:r>
+            <a:r>
+              <a:rPr lang="en-US" dirty="0" smtClean="0"/>
+              <a:t> </a:t>
+            </a:r>
+            <a:r>
+              <a:rPr lang="en-US" dirty="0" err="1"/>
+              <a:t>aproximexe</a:t>
+            </a:r>
+            <a:r>
+              <a:rPr lang="en-US" dirty="0"/>
+              <a:t> flow-</a:t>
+            </a:r>
+            <a:r>
+              <a:rPr lang="en-US" dirty="0" err="1"/>
+              <a:t>ul</a:t>
+            </a:r>
+            <a:r>
+              <a:rPr lang="en-US" dirty="0"/>
+              <a:t> optic al </a:t>
+            </a:r>
+            <a:r>
+              <a:rPr lang="en-US" dirty="0" err="1"/>
+              <a:t>imaginii</a:t>
+            </a:r>
+            <a:r>
+              <a:rPr lang="en-US" dirty="0"/>
+              <a:t> </a:t>
+            </a:r>
+          </a:p>
+          <a:p>
+            <a:r>
+              <a:rPr lang="en-US" dirty="0" err="1"/>
+              <a:t>Alte</a:t>
+            </a:r>
+            <a:r>
+              <a:rPr lang="en-US" dirty="0"/>
+              <a:t> </a:t>
+            </a:r>
+            <a:r>
+              <a:rPr lang="en-US" dirty="0" err="1" smtClean="0"/>
+              <a:t>metode</a:t>
+            </a:r>
+            <a:r>
+              <a:rPr lang="ro-RO" dirty="0" smtClean="0"/>
+              <a:t> de aproximare a flow-ului optim</a:t>
+            </a:r>
+            <a:r>
+              <a:rPr lang="en-US" dirty="0" smtClean="0"/>
+              <a:t>: </a:t>
+            </a:r>
+            <a:r>
+              <a:rPr lang="en-US" dirty="0" err="1"/>
+              <a:t>Farneback</a:t>
+            </a:r>
+            <a:r>
+              <a:rPr lang="en-US" dirty="0"/>
+              <a:t> / </a:t>
+            </a:r>
+            <a:r>
+              <a:rPr lang="en-US" dirty="0" err="1"/>
+              <a:t>Brox</a:t>
+            </a:r>
+            <a:endParaRPr lang="en-US" dirty="0"/>
           </a:p>
         </p:txBody>
       </p:sp>

</xml_diff>